<commit_message>
--Ali- part of presentation --Ali--
</commit_message>
<xml_diff>
--- a/Documents/Presentation.pptx
+++ b/Documents/Presentation.pptx
@@ -6,6 +6,12 @@
   </p:sldMasterIdLst>
   <p:sldIdLst>
     <p:sldId id="256" r:id="rId2"/>
+    <p:sldId id="257" r:id="rId3"/>
+    <p:sldId id="258" r:id="rId4"/>
+    <p:sldId id="259" r:id="rId5"/>
+    <p:sldId id="260" r:id="rId6"/>
+    <p:sldId id="261" r:id="rId7"/>
+    <p:sldId id="262" r:id="rId8"/>
   </p:sldIdLst>
   <p:sldSz cx="12192000" cy="6858000"/>
   <p:notesSz cx="6858000" cy="9144000"/>
@@ -104,6 +110,11 @@
       </a:defRPr>
     </a:lvl9pPr>
   </p:defaultTextStyle>
+  <p:extLst>
+    <p:ext uri="{EFAFB233-063F-42B5-8137-9DF3F51BA10A}">
+      <p15:sldGuideLst xmlns:p15="http://schemas.microsoft.com/office/powerpoint/2012/main"/>
+    </p:ext>
+  </p:extLst>
 </p:presentation>
 </file>
 
@@ -151,7 +162,7 @@
           </a:lstStyle>
           <a:p>
             <a:r>
-              <a:rPr lang="en-US" smtClean="0"/>
+              <a:rPr lang="en-US"/>
               <a:t>Click to edit Master title style</a:t>
             </a:r>
             <a:endParaRPr lang="en-US" dirty="0"/>
@@ -271,7 +282,7 @@
           </a:lstStyle>
           <a:p>
             <a:r>
-              <a:rPr lang="en-US" smtClean="0"/>
+              <a:rPr lang="en-US"/>
               <a:t>Click to edit Master subtitle style</a:t>
             </a:r>
             <a:endParaRPr lang="en-US" dirty="0"/>
@@ -484,7 +495,7 @@
           </a:lstStyle>
           <a:p>
             <a:r>
-              <a:rPr lang="en-US" smtClean="0"/>
+              <a:rPr lang="en-US"/>
               <a:t>Click to edit Master title style</a:t>
             </a:r>
             <a:endParaRPr lang="en-US" dirty="0"/>
@@ -607,7 +618,7 @@
           <a:p>
             <a:pPr lvl="0"/>
             <a:r>
-              <a:rPr lang="en-US" smtClean="0"/>
+              <a:rPr lang="en-US"/>
               <a:t>Click to edit Master text styles</a:t>
             </a:r>
           </a:p>
@@ -819,7 +830,7 @@
           </a:lstStyle>
           <a:p>
             <a:r>
-              <a:rPr lang="en-US" smtClean="0"/>
+              <a:rPr lang="en-US"/>
               <a:t>Click to edit Master title style</a:t>
             </a:r>
             <a:endParaRPr lang="en-US" dirty="0"/>
@@ -883,7 +894,7 @@
           <a:p>
             <a:pPr lvl="0"/>
             <a:r>
-              <a:rPr lang="en-US" smtClean="0"/>
+              <a:rPr lang="en-US"/>
               <a:t>Click to edit Master text styles</a:t>
             </a:r>
           </a:p>
@@ -1005,7 +1016,7 @@
           <a:p>
             <a:pPr lvl="0"/>
             <a:r>
-              <a:rPr lang="en-US" smtClean="0"/>
+              <a:rPr lang="en-US"/>
               <a:t>Click to edit Master text styles</a:t>
             </a:r>
           </a:p>
@@ -1293,7 +1304,7 @@
           </a:lstStyle>
           <a:p>
             <a:r>
-              <a:rPr lang="en-US" smtClean="0"/>
+              <a:rPr lang="en-US"/>
               <a:t>Click to edit Master title style</a:t>
             </a:r>
             <a:endParaRPr lang="en-US" dirty="0"/>
@@ -1338,7 +1349,7 @@
               <a:buNone/>
             </a:pPr>
             <a:r>
-              <a:rPr lang="en-US" smtClean="0"/>
+              <a:rPr lang="en-US"/>
               <a:t>Click to edit Master text styles</a:t>
             </a:r>
           </a:p>
@@ -1550,7 +1561,7 @@
           </a:lstStyle>
           <a:p>
             <a:r>
-              <a:rPr lang="en-US" smtClean="0"/>
+              <a:rPr lang="en-US"/>
               <a:t>Click to edit Master title style</a:t>
             </a:r>
             <a:endParaRPr lang="en-US" dirty="0"/>
@@ -1611,7 +1622,7 @@
           <a:p>
             <a:pPr lvl="0"/>
             <a:r>
-              <a:rPr lang="en-US" smtClean="0"/>
+              <a:rPr lang="en-US"/>
               <a:t>Click to edit Master text styles</a:t>
             </a:r>
           </a:p>
@@ -1655,7 +1666,7 @@
               <a:buNone/>
             </a:pPr>
             <a:r>
-              <a:rPr lang="en-US" smtClean="0"/>
+              <a:rPr lang="en-US"/>
               <a:t>Click to edit Master text styles</a:t>
             </a:r>
           </a:p>
@@ -1943,7 +1954,7 @@
           </a:lstStyle>
           <a:p>
             <a:r>
-              <a:rPr lang="en-US" smtClean="0"/>
+              <a:rPr lang="en-US"/>
               <a:t>Click to edit Master title style</a:t>
             </a:r>
             <a:endParaRPr lang="en-US" dirty="0"/>
@@ -2004,7 +2015,7 @@
           <a:p>
             <a:pPr lvl="0"/>
             <a:r>
-              <a:rPr lang="en-US" smtClean="0"/>
+              <a:rPr lang="en-US"/>
               <a:t>Click to edit Master text styles</a:t>
             </a:r>
           </a:p>
@@ -2048,7 +2059,7 @@
               <a:buNone/>
             </a:pPr>
             <a:r>
-              <a:rPr lang="en-US" smtClean="0"/>
+              <a:rPr lang="en-US"/>
               <a:t>Click to edit Master text styles</a:t>
             </a:r>
           </a:p>
@@ -2249,7 +2260,7 @@
           <a:lstStyle/>
           <a:p>
             <a:r>
-              <a:rPr lang="en-US" smtClean="0"/>
+              <a:rPr lang="en-US"/>
               <a:t>Click to edit Master title style</a:t>
             </a:r>
             <a:endParaRPr lang="en-US" dirty="0"/>
@@ -2273,35 +2284,35 @@
           <a:p>
             <a:pPr lvl="0"/>
             <a:r>
-              <a:rPr lang="en-US" smtClean="0"/>
+              <a:rPr lang="en-US"/>
               <a:t>Click to edit Master text styles</a:t>
             </a:r>
           </a:p>
           <a:p>
             <a:pPr lvl="1"/>
             <a:r>
-              <a:rPr lang="en-US" smtClean="0"/>
+              <a:rPr lang="en-US"/>
               <a:t>Second level</a:t>
             </a:r>
           </a:p>
           <a:p>
             <a:pPr lvl="2"/>
             <a:r>
-              <a:rPr lang="en-US" smtClean="0"/>
+              <a:rPr lang="en-US"/>
               <a:t>Third level</a:t>
             </a:r>
           </a:p>
           <a:p>
             <a:pPr lvl="3"/>
             <a:r>
-              <a:rPr lang="en-US" smtClean="0"/>
+              <a:rPr lang="en-US"/>
               <a:t>Fourth level</a:t>
             </a:r>
           </a:p>
           <a:p>
             <a:pPr lvl="4"/>
             <a:r>
-              <a:rPr lang="en-US" smtClean="0"/>
+              <a:rPr lang="en-US"/>
               <a:t>Fifth level</a:t>
             </a:r>
             <a:endParaRPr lang="en-US" dirty="0"/>
@@ -2503,7 +2514,7 @@
           <a:lstStyle/>
           <a:p>
             <a:r>
-              <a:rPr lang="en-US" smtClean="0"/>
+              <a:rPr lang="en-US"/>
               <a:t>Click to edit Master title style</a:t>
             </a:r>
             <a:endParaRPr lang="en-US" dirty="0"/>
@@ -2532,35 +2543,35 @@
           <a:p>
             <a:pPr lvl="0"/>
             <a:r>
-              <a:rPr lang="en-US" smtClean="0"/>
+              <a:rPr lang="en-US"/>
               <a:t>Click to edit Master text styles</a:t>
             </a:r>
           </a:p>
           <a:p>
             <a:pPr lvl="1"/>
             <a:r>
-              <a:rPr lang="en-US" smtClean="0"/>
+              <a:rPr lang="en-US"/>
               <a:t>Second level</a:t>
             </a:r>
           </a:p>
           <a:p>
             <a:pPr lvl="2"/>
             <a:r>
-              <a:rPr lang="en-US" smtClean="0"/>
+              <a:rPr lang="en-US"/>
               <a:t>Third level</a:t>
             </a:r>
           </a:p>
           <a:p>
             <a:pPr lvl="3"/>
             <a:r>
-              <a:rPr lang="en-US" smtClean="0"/>
+              <a:rPr lang="en-US"/>
               <a:t>Fourth level</a:t>
             </a:r>
           </a:p>
           <a:p>
             <a:pPr lvl="4"/>
             <a:r>
-              <a:rPr lang="en-US" smtClean="0"/>
+              <a:rPr lang="en-US"/>
               <a:t>Fifth level</a:t>
             </a:r>
             <a:endParaRPr lang="en-US" dirty="0"/>
@@ -2762,7 +2773,7 @@
           <a:lstStyle/>
           <a:p>
             <a:r>
-              <a:rPr lang="en-US" smtClean="0"/>
+              <a:rPr lang="en-US"/>
               <a:t>Click to edit Master title style</a:t>
             </a:r>
             <a:endParaRPr lang="en-US" dirty="0"/>
@@ -2791,35 +2802,35 @@
           <a:p>
             <a:pPr lvl="0"/>
             <a:r>
-              <a:rPr lang="en-US" smtClean="0"/>
+              <a:rPr lang="en-US"/>
               <a:t>Click to edit Master text styles</a:t>
             </a:r>
           </a:p>
           <a:p>
             <a:pPr lvl="1"/>
             <a:r>
-              <a:rPr lang="en-US" smtClean="0"/>
+              <a:rPr lang="en-US"/>
               <a:t>Second level</a:t>
             </a:r>
           </a:p>
           <a:p>
             <a:pPr lvl="2"/>
             <a:r>
-              <a:rPr lang="en-US" smtClean="0"/>
+              <a:rPr lang="en-US"/>
               <a:t>Third level</a:t>
             </a:r>
           </a:p>
           <a:p>
             <a:pPr lvl="3"/>
             <a:r>
-              <a:rPr lang="en-US" smtClean="0"/>
+              <a:rPr lang="en-US"/>
               <a:t>Fourth level</a:t>
             </a:r>
           </a:p>
           <a:p>
             <a:pPr lvl="4"/>
             <a:r>
-              <a:rPr lang="en-US" smtClean="0"/>
+              <a:rPr lang="en-US"/>
               <a:t>Fifth level</a:t>
             </a:r>
             <a:endParaRPr lang="en-US" dirty="0"/>
@@ -3025,7 +3036,7 @@
           </a:lstStyle>
           <a:p>
             <a:r>
-              <a:rPr lang="en-US" smtClean="0"/>
+              <a:rPr lang="en-US"/>
               <a:t>Click to edit Master title style</a:t>
             </a:r>
             <a:endParaRPr lang="en-US" dirty="0"/>
@@ -3146,7 +3157,7 @@
           <a:p>
             <a:pPr lvl="0"/>
             <a:r>
-              <a:rPr lang="en-US" smtClean="0"/>
+              <a:rPr lang="en-US"/>
               <a:t>Click to edit Master text styles</a:t>
             </a:r>
           </a:p>
@@ -3347,7 +3358,7 @@
           <a:lstStyle/>
           <a:p>
             <a:r>
-              <a:rPr lang="en-US" smtClean="0"/>
+              <a:rPr lang="en-US"/>
               <a:t>Click to edit Master title style</a:t>
             </a:r>
             <a:endParaRPr lang="en-US" dirty="0"/>
@@ -3378,35 +3389,35 @@
           <a:p>
             <a:pPr lvl="0"/>
             <a:r>
-              <a:rPr lang="en-US" smtClean="0"/>
+              <a:rPr lang="en-US"/>
               <a:t>Click to edit Master text styles</a:t>
             </a:r>
           </a:p>
           <a:p>
             <a:pPr lvl="1"/>
             <a:r>
-              <a:rPr lang="en-US" smtClean="0"/>
+              <a:rPr lang="en-US"/>
               <a:t>Second level</a:t>
             </a:r>
           </a:p>
           <a:p>
             <a:pPr lvl="2"/>
             <a:r>
-              <a:rPr lang="en-US" smtClean="0"/>
+              <a:rPr lang="en-US"/>
               <a:t>Third level</a:t>
             </a:r>
           </a:p>
           <a:p>
             <a:pPr lvl="3"/>
             <a:r>
-              <a:rPr lang="en-US" smtClean="0"/>
+              <a:rPr lang="en-US"/>
               <a:t>Fourth level</a:t>
             </a:r>
           </a:p>
           <a:p>
             <a:pPr lvl="4"/>
             <a:r>
-              <a:rPr lang="en-US" smtClean="0"/>
+              <a:rPr lang="en-US"/>
               <a:t>Fifth level</a:t>
             </a:r>
             <a:endParaRPr lang="en-US" dirty="0"/>
@@ -3437,35 +3448,35 @@
           <a:p>
             <a:pPr lvl="0"/>
             <a:r>
-              <a:rPr lang="en-US" smtClean="0"/>
+              <a:rPr lang="en-US"/>
               <a:t>Click to edit Master text styles</a:t>
             </a:r>
           </a:p>
           <a:p>
             <a:pPr lvl="1"/>
             <a:r>
-              <a:rPr lang="en-US" smtClean="0"/>
+              <a:rPr lang="en-US"/>
               <a:t>Second level</a:t>
             </a:r>
           </a:p>
           <a:p>
             <a:pPr lvl="2"/>
             <a:r>
-              <a:rPr lang="en-US" smtClean="0"/>
+              <a:rPr lang="en-US"/>
               <a:t>Third level</a:t>
             </a:r>
           </a:p>
           <a:p>
             <a:pPr lvl="3"/>
             <a:r>
-              <a:rPr lang="en-US" smtClean="0"/>
+              <a:rPr lang="en-US"/>
               <a:t>Fourth level</a:t>
             </a:r>
           </a:p>
           <a:p>
             <a:pPr lvl="4"/>
             <a:r>
-              <a:rPr lang="en-US" smtClean="0"/>
+              <a:rPr lang="en-US"/>
               <a:t>Fifth level</a:t>
             </a:r>
             <a:endParaRPr lang="en-US" dirty="0"/>
@@ -3667,7 +3678,7 @@
           <a:lstStyle/>
           <a:p>
             <a:r>
-              <a:rPr lang="en-US" smtClean="0"/>
+              <a:rPr lang="en-US"/>
               <a:t>Click to edit Master title style</a:t>
             </a:r>
             <a:endParaRPr lang="en-US" dirty="0"/>
@@ -3735,7 +3746,7 @@
           <a:p>
             <a:pPr lvl="0"/>
             <a:r>
-              <a:rPr lang="en-US" smtClean="0"/>
+              <a:rPr lang="en-US"/>
               <a:t>Click to edit Master text styles</a:t>
             </a:r>
           </a:p>
@@ -3765,35 +3776,35 @@
           <a:p>
             <a:pPr lvl="0"/>
             <a:r>
-              <a:rPr lang="en-US" smtClean="0"/>
+              <a:rPr lang="en-US"/>
               <a:t>Click to edit Master text styles</a:t>
             </a:r>
           </a:p>
           <a:p>
             <a:pPr lvl="1"/>
             <a:r>
-              <a:rPr lang="en-US" smtClean="0"/>
+              <a:rPr lang="en-US"/>
               <a:t>Second level</a:t>
             </a:r>
           </a:p>
           <a:p>
             <a:pPr lvl="2"/>
             <a:r>
-              <a:rPr lang="en-US" smtClean="0"/>
+              <a:rPr lang="en-US"/>
               <a:t>Third level</a:t>
             </a:r>
           </a:p>
           <a:p>
             <a:pPr lvl="3"/>
             <a:r>
-              <a:rPr lang="en-US" smtClean="0"/>
+              <a:rPr lang="en-US"/>
               <a:t>Fourth level</a:t>
             </a:r>
           </a:p>
           <a:p>
             <a:pPr lvl="4"/>
             <a:r>
-              <a:rPr lang="en-US" smtClean="0"/>
+              <a:rPr lang="en-US"/>
               <a:t>Fifth level</a:t>
             </a:r>
             <a:endParaRPr lang="en-US" dirty="0"/>
@@ -3861,7 +3872,7 @@
           <a:p>
             <a:pPr lvl="0"/>
             <a:r>
-              <a:rPr lang="en-US" smtClean="0"/>
+              <a:rPr lang="en-US"/>
               <a:t>Click to edit Master text styles</a:t>
             </a:r>
           </a:p>
@@ -3891,35 +3902,35 @@
           <a:p>
             <a:pPr lvl="0"/>
             <a:r>
-              <a:rPr lang="en-US" smtClean="0"/>
+              <a:rPr lang="en-US"/>
               <a:t>Click to edit Master text styles</a:t>
             </a:r>
           </a:p>
           <a:p>
             <a:pPr lvl="1"/>
             <a:r>
-              <a:rPr lang="en-US" smtClean="0"/>
+              <a:rPr lang="en-US"/>
               <a:t>Second level</a:t>
             </a:r>
           </a:p>
           <a:p>
             <a:pPr lvl="2"/>
             <a:r>
-              <a:rPr lang="en-US" smtClean="0"/>
+              <a:rPr lang="en-US"/>
               <a:t>Third level</a:t>
             </a:r>
           </a:p>
           <a:p>
             <a:pPr lvl="3"/>
             <a:r>
-              <a:rPr lang="en-US" smtClean="0"/>
+              <a:rPr lang="en-US"/>
               <a:t>Fourth level</a:t>
             </a:r>
           </a:p>
           <a:p>
             <a:pPr lvl="4"/>
             <a:r>
-              <a:rPr lang="en-US" smtClean="0"/>
+              <a:rPr lang="en-US"/>
               <a:t>Fifth level</a:t>
             </a:r>
             <a:endParaRPr lang="en-US" dirty="0"/>
@@ -4121,7 +4132,7 @@
           <a:lstStyle/>
           <a:p>
             <a:r>
-              <a:rPr lang="en-US" smtClean="0"/>
+              <a:rPr lang="en-US"/>
               <a:t>Click to edit Master title style</a:t>
             </a:r>
             <a:endParaRPr lang="en-US" dirty="0"/>
@@ -4501,7 +4512,7 @@
           </a:lstStyle>
           <a:p>
             <a:r>
-              <a:rPr lang="en-US" smtClean="0"/>
+              <a:rPr lang="en-US"/>
               <a:t>Click to edit Master title style</a:t>
             </a:r>
             <a:endParaRPr lang="en-US" dirty="0"/>
@@ -4532,35 +4543,35 @@
           <a:p>
             <a:pPr lvl="0"/>
             <a:r>
-              <a:rPr lang="en-US" smtClean="0"/>
+              <a:rPr lang="en-US"/>
               <a:t>Click to edit Master text styles</a:t>
             </a:r>
           </a:p>
           <a:p>
             <a:pPr lvl="1"/>
             <a:r>
-              <a:rPr lang="en-US" smtClean="0"/>
+              <a:rPr lang="en-US"/>
               <a:t>Second level</a:t>
             </a:r>
           </a:p>
           <a:p>
             <a:pPr lvl="2"/>
             <a:r>
-              <a:rPr lang="en-US" smtClean="0"/>
+              <a:rPr lang="en-US"/>
               <a:t>Third level</a:t>
             </a:r>
           </a:p>
           <a:p>
             <a:pPr lvl="3"/>
             <a:r>
-              <a:rPr lang="en-US" smtClean="0"/>
+              <a:rPr lang="en-US"/>
               <a:t>Fourth level</a:t>
             </a:r>
           </a:p>
           <a:p>
             <a:pPr lvl="4"/>
             <a:r>
-              <a:rPr lang="en-US" smtClean="0"/>
+              <a:rPr lang="en-US"/>
               <a:t>Fifth level</a:t>
             </a:r>
             <a:endParaRPr lang="en-US" dirty="0"/>
@@ -4626,7 +4637,7 @@
           <a:p>
             <a:pPr lvl="0"/>
             <a:r>
-              <a:rPr lang="en-US" smtClean="0"/>
+              <a:rPr lang="en-US"/>
               <a:t>Click to edit Master text styles</a:t>
             </a:r>
           </a:p>
@@ -4833,7 +4844,7 @@
           </a:lstStyle>
           <a:p>
             <a:r>
-              <a:rPr lang="en-US" smtClean="0"/>
+              <a:rPr lang="en-US"/>
               <a:t>Click to edit Master title style</a:t>
             </a:r>
             <a:endParaRPr lang="en-US" dirty="0"/>
@@ -4900,7 +4911,7 @@
           </a:lstStyle>
           <a:p>
             <a:r>
-              <a:rPr lang="en-US" smtClean="0"/>
+              <a:rPr lang="en-US"/>
               <a:t>Click icon to add picture</a:t>
             </a:r>
             <a:endParaRPr lang="en-US" dirty="0"/>
@@ -4968,7 +4979,7 @@
           <a:p>
             <a:pPr lvl="0"/>
             <a:r>
-              <a:rPr lang="en-US" smtClean="0"/>
+              <a:rPr lang="en-US"/>
               <a:t>Click to edit Master text styles</a:t>
             </a:r>
           </a:p>
@@ -7001,7 +7012,7 @@
           <a:lstStyle/>
           <a:p>
             <a:r>
-              <a:rPr lang="en-US" smtClean="0"/>
+              <a:rPr lang="en-US"/>
               <a:t>Click to edit Master title style</a:t>
             </a:r>
             <a:endParaRPr lang="en-US" dirty="0"/>
@@ -7035,35 +7046,35 @@
           <a:p>
             <a:pPr lvl="0"/>
             <a:r>
-              <a:rPr lang="en-US" smtClean="0"/>
+              <a:rPr lang="en-US"/>
               <a:t>Click to edit Master text styles</a:t>
             </a:r>
           </a:p>
           <a:p>
             <a:pPr lvl="1"/>
             <a:r>
-              <a:rPr lang="en-US" smtClean="0"/>
+              <a:rPr lang="en-US"/>
               <a:t>Second level</a:t>
             </a:r>
           </a:p>
           <a:p>
             <a:pPr lvl="2"/>
             <a:r>
-              <a:rPr lang="en-US" smtClean="0"/>
+              <a:rPr lang="en-US"/>
               <a:t>Third level</a:t>
             </a:r>
           </a:p>
           <a:p>
             <a:pPr lvl="3"/>
             <a:r>
-              <a:rPr lang="en-US" smtClean="0"/>
+              <a:rPr lang="en-US"/>
               <a:t>Fourth level</a:t>
             </a:r>
           </a:p>
           <a:p>
             <a:pPr lvl="4"/>
             <a:r>
-              <a:rPr lang="en-US" smtClean="0"/>
+              <a:rPr lang="en-US"/>
               <a:t>Fifth level</a:t>
             </a:r>
             <a:endParaRPr lang="en-US" dirty="0"/>
@@ -7630,12 +7641,29 @@
             <p:ph type="ctrTitle"/>
           </p:nvPr>
         </p:nvSpPr>
-        <p:spPr/>
-        <p:txBody>
-          <a:bodyPr/>
+        <p:spPr>
+          <a:xfrm>
+            <a:off x="2589214" y="853579"/>
+            <a:ext cx="7527910" cy="3290583"/>
+          </a:xfrm>
+        </p:spPr>
+        <p:txBody>
+          <a:bodyPr>
+            <a:normAutofit/>
+          </a:bodyPr>
           <a:lstStyle/>
           <a:p>
-            <a:endParaRPr lang="en-US"/>
+            <a:r>
+              <a:rPr lang="en-US" sz="6000" dirty="0"/>
+              <a:t>Small Store System</a:t>
+            </a:r>
+            <a:br>
+              <a:rPr lang="en-US" sz="6000" dirty="0"/>
+            </a:br>
+            <a:r>
+              <a:rPr lang="en-US" sz="6000" dirty="0"/>
+              <a:t>Presentation</a:t>
+            </a:r>
           </a:p>
         </p:txBody>
       </p:sp>
@@ -7649,12 +7677,44 @@
             <p:ph type="subTitle" idx="1"/>
           </p:nvPr>
         </p:nvSpPr>
-        <p:spPr/>
-        <p:txBody>
-          <a:bodyPr/>
+        <p:spPr>
+          <a:xfrm>
+            <a:off x="2589213" y="4777379"/>
+            <a:ext cx="7821525" cy="1690533"/>
+          </a:xfrm>
+        </p:spPr>
+        <p:txBody>
+          <a:bodyPr>
+            <a:normAutofit/>
+          </a:bodyPr>
           <a:lstStyle/>
           <a:p>
-            <a:endParaRPr lang="en-US"/>
+            <a:r>
+              <a:rPr lang="en-US" dirty="0"/>
+              <a:t>An application for who needs to manage his business systematically in a simple, applied and smart way</a:t>
+            </a:r>
+          </a:p>
+          <a:p>
+            <a:endParaRPr lang="en-US" dirty="0"/>
+          </a:p>
+          <a:p>
+            <a:r>
+              <a:rPr lang="en-US" dirty="0"/>
+              <a:t>By:	Ali Torabi	,	</a:t>
+            </a:r>
+            <a:r>
+              <a:rPr lang="en-US" dirty="0" err="1"/>
+              <a:t>Behnaz</a:t>
+            </a:r>
+            <a:r>
+              <a:rPr lang="en-US" dirty="0"/>
+              <a:t> </a:t>
+            </a:r>
+            <a:r>
+              <a:rPr lang="en-US" dirty="0" err="1"/>
+              <a:t>Afshar</a:t>
+            </a:r>
+            <a:endParaRPr lang="en-US" dirty="0"/>
           </a:p>
         </p:txBody>
       </p:sp>
@@ -7662,6 +7722,498 @@
     <p:extLst>
       <p:ext uri="{BB962C8B-B14F-4D97-AF65-F5344CB8AC3E}">
         <p14:creationId xmlns:p14="http://schemas.microsoft.com/office/powerpoint/2010/main" val="258814143"/>
+      </p:ext>
+    </p:extLst>
+  </p:cSld>
+  <p:clrMapOvr>
+    <a:masterClrMapping/>
+  </p:clrMapOvr>
+</p:sld>
+</file>
+
+<file path=ppt/slides/slide2.xml><?xml version="1.0" encoding="utf-8"?>
+<p:sld xmlns:a="http://schemas.openxmlformats.org/drawingml/2006/main" xmlns:r="http://schemas.openxmlformats.org/officeDocument/2006/relationships" xmlns:p="http://schemas.openxmlformats.org/presentationml/2006/main">
+  <p:cSld>
+    <p:spTree>
+      <p:nvGrpSpPr>
+        <p:cNvPr id="1" name=""/>
+        <p:cNvGrpSpPr/>
+        <p:nvPr/>
+      </p:nvGrpSpPr>
+      <p:grpSpPr>
+        <a:xfrm>
+          <a:off x="0" y="0"/>
+          <a:ext cx="0" cy="0"/>
+          <a:chOff x="0" y="0"/>
+          <a:chExt cx="0" cy="0"/>
+        </a:xfrm>
+      </p:grpSpPr>
+      <p:sp>
+        <p:nvSpPr>
+          <p:cNvPr id="2" name="Title 1"/>
+          <p:cNvSpPr>
+            <a:spLocks noGrp="1"/>
+          </p:cNvSpPr>
+          <p:nvPr>
+            <p:ph type="title"/>
+          </p:nvPr>
+        </p:nvSpPr>
+        <p:spPr>
+          <a:xfrm>
+            <a:off x="3669435" y="211671"/>
+            <a:ext cx="4492432" cy="953003"/>
+          </a:xfrm>
+        </p:spPr>
+        <p:txBody>
+          <a:bodyPr>
+            <a:normAutofit/>
+          </a:bodyPr>
+          <a:lstStyle/>
+          <a:p>
+            <a:r>
+              <a:rPr lang="en-US" dirty="0"/>
+              <a:t>Login page</a:t>
+            </a:r>
+          </a:p>
+        </p:txBody>
+      </p:sp>
+      <p:pic>
+        <p:nvPicPr>
+          <p:cNvPr id="6" name="Content Placeholder 5"/>
+          <p:cNvPicPr>
+            <a:picLocks noGrp="1" noChangeAspect="1"/>
+          </p:cNvPicPr>
+          <p:nvPr>
+            <p:ph idx="1"/>
+          </p:nvPr>
+        </p:nvPicPr>
+        <p:blipFill>
+          <a:blip r:embed="rId2"/>
+          <a:stretch>
+            <a:fillRect/>
+          </a:stretch>
+        </p:blipFill>
+        <p:spPr>
+          <a:xfrm>
+            <a:off x="3643533" y="1903445"/>
+            <a:ext cx="6262291" cy="4149248"/>
+          </a:xfrm>
+        </p:spPr>
+      </p:pic>
+    </p:spTree>
+    <p:extLst>
+      <p:ext uri="{BB962C8B-B14F-4D97-AF65-F5344CB8AC3E}">
+        <p14:creationId xmlns:p14="http://schemas.microsoft.com/office/powerpoint/2010/main" val="2848497588"/>
+      </p:ext>
+    </p:extLst>
+  </p:cSld>
+  <p:clrMapOvr>
+    <a:masterClrMapping/>
+  </p:clrMapOvr>
+</p:sld>
+</file>
+
+<file path=ppt/slides/slide3.xml><?xml version="1.0" encoding="utf-8"?>
+<p:sld xmlns:a="http://schemas.openxmlformats.org/drawingml/2006/main" xmlns:r="http://schemas.openxmlformats.org/officeDocument/2006/relationships" xmlns:p="http://schemas.openxmlformats.org/presentationml/2006/main">
+  <p:cSld>
+    <p:spTree>
+      <p:nvGrpSpPr>
+        <p:cNvPr id="1" name=""/>
+        <p:cNvGrpSpPr/>
+        <p:nvPr/>
+      </p:nvGrpSpPr>
+      <p:grpSpPr>
+        <a:xfrm>
+          <a:off x="0" y="0"/>
+          <a:ext cx="0" cy="0"/>
+          <a:chOff x="0" y="0"/>
+          <a:chExt cx="0" cy="0"/>
+        </a:xfrm>
+      </p:grpSpPr>
+      <p:sp>
+        <p:nvSpPr>
+          <p:cNvPr id="2" name="Title 1"/>
+          <p:cNvSpPr>
+            <a:spLocks noGrp="1"/>
+          </p:cNvSpPr>
+          <p:nvPr>
+            <p:ph type="title"/>
+          </p:nvPr>
+        </p:nvSpPr>
+        <p:spPr>
+          <a:xfrm>
+            <a:off x="3669435" y="211671"/>
+            <a:ext cx="4492432" cy="953003"/>
+          </a:xfrm>
+        </p:spPr>
+        <p:txBody>
+          <a:bodyPr>
+            <a:normAutofit/>
+          </a:bodyPr>
+          <a:lstStyle/>
+          <a:p>
+            <a:r>
+              <a:rPr lang="en-US" dirty="0"/>
+              <a:t>Admin - File</a:t>
+            </a:r>
+          </a:p>
+        </p:txBody>
+      </p:sp>
+      <p:pic>
+        <p:nvPicPr>
+          <p:cNvPr id="4" name="Content Placeholder 3"/>
+          <p:cNvPicPr>
+            <a:picLocks noGrp="1" noChangeAspect="1"/>
+          </p:cNvPicPr>
+          <p:nvPr>
+            <p:ph idx="1"/>
+          </p:nvPr>
+        </p:nvPicPr>
+        <p:blipFill>
+          <a:blip r:embed="rId2"/>
+          <a:stretch>
+            <a:fillRect/>
+          </a:stretch>
+        </p:blipFill>
+        <p:spPr>
+          <a:xfrm>
+            <a:off x="3669435" y="1011400"/>
+            <a:ext cx="7215401" cy="5730126"/>
+          </a:xfrm>
+        </p:spPr>
+      </p:pic>
+    </p:spTree>
+    <p:extLst>
+      <p:ext uri="{BB962C8B-B14F-4D97-AF65-F5344CB8AC3E}">
+        <p14:creationId xmlns:p14="http://schemas.microsoft.com/office/powerpoint/2010/main" val="3798796465"/>
+      </p:ext>
+    </p:extLst>
+  </p:cSld>
+  <p:clrMapOvr>
+    <a:masterClrMapping/>
+  </p:clrMapOvr>
+</p:sld>
+</file>
+
+<file path=ppt/slides/slide4.xml><?xml version="1.0" encoding="utf-8"?>
+<p:sld xmlns:a="http://schemas.openxmlformats.org/drawingml/2006/main" xmlns:r="http://schemas.openxmlformats.org/officeDocument/2006/relationships" xmlns:p="http://schemas.openxmlformats.org/presentationml/2006/main">
+  <p:cSld>
+    <p:spTree>
+      <p:nvGrpSpPr>
+        <p:cNvPr id="1" name=""/>
+        <p:cNvGrpSpPr/>
+        <p:nvPr/>
+      </p:nvGrpSpPr>
+      <p:grpSpPr>
+        <a:xfrm>
+          <a:off x="0" y="0"/>
+          <a:ext cx="0" cy="0"/>
+          <a:chOff x="0" y="0"/>
+          <a:chExt cx="0" cy="0"/>
+        </a:xfrm>
+      </p:grpSpPr>
+      <p:sp>
+        <p:nvSpPr>
+          <p:cNvPr id="2" name="Title 1"/>
+          <p:cNvSpPr>
+            <a:spLocks noGrp="1"/>
+          </p:cNvSpPr>
+          <p:nvPr>
+            <p:ph type="title"/>
+          </p:nvPr>
+        </p:nvSpPr>
+        <p:spPr>
+          <a:xfrm>
+            <a:off x="3669435" y="211671"/>
+            <a:ext cx="6549832" cy="953003"/>
+          </a:xfrm>
+        </p:spPr>
+        <p:txBody>
+          <a:bodyPr>
+            <a:normAutofit/>
+          </a:bodyPr>
+          <a:lstStyle/>
+          <a:p>
+            <a:r>
+              <a:rPr lang="en-US" dirty="0"/>
+              <a:t>Admin - Dashboard</a:t>
+            </a:r>
+          </a:p>
+        </p:txBody>
+      </p:sp>
+      <p:pic>
+        <p:nvPicPr>
+          <p:cNvPr id="4" name="Content Placeholder 3"/>
+          <p:cNvPicPr>
+            <a:picLocks noGrp="1" noChangeAspect="1"/>
+          </p:cNvPicPr>
+          <p:nvPr>
+            <p:ph idx="1"/>
+          </p:nvPr>
+        </p:nvPicPr>
+        <p:blipFill>
+          <a:blip r:embed="rId2"/>
+          <a:stretch>
+            <a:fillRect/>
+          </a:stretch>
+        </p:blipFill>
+        <p:spPr>
+          <a:xfrm>
+            <a:off x="3669435" y="1037509"/>
+            <a:ext cx="7221117" cy="5734665"/>
+          </a:xfrm>
+        </p:spPr>
+      </p:pic>
+    </p:spTree>
+    <p:extLst>
+      <p:ext uri="{BB962C8B-B14F-4D97-AF65-F5344CB8AC3E}">
+        <p14:creationId xmlns:p14="http://schemas.microsoft.com/office/powerpoint/2010/main" val="301979160"/>
+      </p:ext>
+    </p:extLst>
+  </p:cSld>
+  <p:clrMapOvr>
+    <a:masterClrMapping/>
+  </p:clrMapOvr>
+</p:sld>
+</file>
+
+<file path=ppt/slides/slide5.xml><?xml version="1.0" encoding="utf-8"?>
+<p:sld xmlns:a="http://schemas.openxmlformats.org/drawingml/2006/main" xmlns:r="http://schemas.openxmlformats.org/officeDocument/2006/relationships" xmlns:p="http://schemas.openxmlformats.org/presentationml/2006/main">
+  <p:cSld>
+    <p:spTree>
+      <p:nvGrpSpPr>
+        <p:cNvPr id="1" name=""/>
+        <p:cNvGrpSpPr/>
+        <p:nvPr/>
+      </p:nvGrpSpPr>
+      <p:grpSpPr>
+        <a:xfrm>
+          <a:off x="0" y="0"/>
+          <a:ext cx="0" cy="0"/>
+          <a:chOff x="0" y="0"/>
+          <a:chExt cx="0" cy="0"/>
+        </a:xfrm>
+      </p:grpSpPr>
+      <p:sp>
+        <p:nvSpPr>
+          <p:cNvPr id="2" name="Title 1"/>
+          <p:cNvSpPr>
+            <a:spLocks noGrp="1"/>
+          </p:cNvSpPr>
+          <p:nvPr>
+            <p:ph type="title"/>
+          </p:nvPr>
+        </p:nvSpPr>
+        <p:spPr>
+          <a:xfrm>
+            <a:off x="3669435" y="211671"/>
+            <a:ext cx="6549832" cy="953003"/>
+          </a:xfrm>
+        </p:spPr>
+        <p:txBody>
+          <a:bodyPr>
+            <a:normAutofit/>
+          </a:bodyPr>
+          <a:lstStyle/>
+          <a:p>
+            <a:r>
+              <a:rPr lang="en-US" dirty="0"/>
+              <a:t>Admin - Help</a:t>
+            </a:r>
+          </a:p>
+        </p:txBody>
+      </p:sp>
+      <p:pic>
+        <p:nvPicPr>
+          <p:cNvPr id="5" name="Content Placeholder 4"/>
+          <p:cNvPicPr>
+            <a:picLocks noGrp="1" noChangeAspect="1"/>
+          </p:cNvPicPr>
+          <p:nvPr>
+            <p:ph idx="1"/>
+          </p:nvPr>
+        </p:nvPicPr>
+        <p:blipFill>
+          <a:blip r:embed="rId2"/>
+          <a:stretch>
+            <a:fillRect/>
+          </a:stretch>
+        </p:blipFill>
+        <p:spPr>
+          <a:xfrm>
+            <a:off x="3669434" y="1093815"/>
+            <a:ext cx="7164296" cy="5689540"/>
+          </a:xfrm>
+        </p:spPr>
+      </p:pic>
+    </p:spTree>
+    <p:extLst>
+      <p:ext uri="{BB962C8B-B14F-4D97-AF65-F5344CB8AC3E}">
+        <p14:creationId xmlns:p14="http://schemas.microsoft.com/office/powerpoint/2010/main" val="3907889059"/>
+      </p:ext>
+    </p:extLst>
+  </p:cSld>
+  <p:clrMapOvr>
+    <a:masterClrMapping/>
+  </p:clrMapOvr>
+</p:sld>
+</file>
+
+<file path=ppt/slides/slide6.xml><?xml version="1.0" encoding="utf-8"?>
+<p:sld xmlns:a="http://schemas.openxmlformats.org/drawingml/2006/main" xmlns:r="http://schemas.openxmlformats.org/officeDocument/2006/relationships" xmlns:p="http://schemas.openxmlformats.org/presentationml/2006/main">
+  <p:cSld>
+    <p:spTree>
+      <p:nvGrpSpPr>
+        <p:cNvPr id="1" name=""/>
+        <p:cNvGrpSpPr/>
+        <p:nvPr/>
+      </p:nvGrpSpPr>
+      <p:grpSpPr>
+        <a:xfrm>
+          <a:off x="0" y="0"/>
+          <a:ext cx="0" cy="0"/>
+          <a:chOff x="0" y="0"/>
+          <a:chExt cx="0" cy="0"/>
+        </a:xfrm>
+      </p:grpSpPr>
+      <p:sp>
+        <p:nvSpPr>
+          <p:cNvPr id="2" name="Title 1"/>
+          <p:cNvSpPr>
+            <a:spLocks noGrp="1"/>
+          </p:cNvSpPr>
+          <p:nvPr>
+            <p:ph type="title"/>
+          </p:nvPr>
+        </p:nvSpPr>
+        <p:spPr>
+          <a:xfrm>
+            <a:off x="3669435" y="211671"/>
+            <a:ext cx="6549832" cy="953003"/>
+          </a:xfrm>
+        </p:spPr>
+        <p:txBody>
+          <a:bodyPr>
+            <a:normAutofit/>
+          </a:bodyPr>
+          <a:lstStyle/>
+          <a:p>
+            <a:r>
+              <a:rPr lang="en-US" dirty="0"/>
+              <a:t>Dashboard - Category</a:t>
+            </a:r>
+          </a:p>
+        </p:txBody>
+      </p:sp>
+      <p:pic>
+        <p:nvPicPr>
+          <p:cNvPr id="5" name="Content Placeholder 4"/>
+          <p:cNvPicPr>
+            <a:picLocks noGrp="1" noChangeAspect="1"/>
+          </p:cNvPicPr>
+          <p:nvPr>
+            <p:ph idx="1"/>
+          </p:nvPr>
+        </p:nvPicPr>
+        <p:blipFill>
+          <a:blip r:embed="rId2"/>
+          <a:stretch>
+            <a:fillRect/>
+          </a:stretch>
+        </p:blipFill>
+        <p:spPr>
+          <a:xfrm>
+            <a:off x="2178104" y="1380931"/>
+            <a:ext cx="9754621" cy="5053736"/>
+          </a:xfrm>
+        </p:spPr>
+      </p:pic>
+    </p:spTree>
+    <p:extLst>
+      <p:ext uri="{BB962C8B-B14F-4D97-AF65-F5344CB8AC3E}">
+        <p14:creationId xmlns:p14="http://schemas.microsoft.com/office/powerpoint/2010/main" val="693535125"/>
+      </p:ext>
+    </p:extLst>
+  </p:cSld>
+  <p:clrMapOvr>
+    <a:masterClrMapping/>
+  </p:clrMapOvr>
+</p:sld>
+</file>
+
+<file path=ppt/slides/slide7.xml><?xml version="1.0" encoding="utf-8"?>
+<p:sld xmlns:a="http://schemas.openxmlformats.org/drawingml/2006/main" xmlns:r="http://schemas.openxmlformats.org/officeDocument/2006/relationships" xmlns:p="http://schemas.openxmlformats.org/presentationml/2006/main">
+  <p:cSld>
+    <p:spTree>
+      <p:nvGrpSpPr>
+        <p:cNvPr id="1" name=""/>
+        <p:cNvGrpSpPr/>
+        <p:nvPr/>
+      </p:nvGrpSpPr>
+      <p:grpSpPr>
+        <a:xfrm>
+          <a:off x="0" y="0"/>
+          <a:ext cx="0" cy="0"/>
+          <a:chOff x="0" y="0"/>
+          <a:chExt cx="0" cy="0"/>
+        </a:xfrm>
+      </p:grpSpPr>
+      <p:sp>
+        <p:nvSpPr>
+          <p:cNvPr id="2" name="Title 1"/>
+          <p:cNvSpPr>
+            <a:spLocks noGrp="1"/>
+          </p:cNvSpPr>
+          <p:nvPr>
+            <p:ph type="title"/>
+          </p:nvPr>
+        </p:nvSpPr>
+        <p:spPr>
+          <a:xfrm>
+            <a:off x="189116" y="1284691"/>
+            <a:ext cx="2787349" cy="2624836"/>
+          </a:xfrm>
+        </p:spPr>
+        <p:txBody>
+          <a:bodyPr>
+            <a:normAutofit/>
+          </a:bodyPr>
+          <a:lstStyle/>
+          <a:p>
+            <a:r>
+              <a:rPr lang="en-US" dirty="0"/>
+              <a:t>Dashboard - Products</a:t>
+            </a:r>
+          </a:p>
+        </p:txBody>
+      </p:sp>
+      <p:pic>
+        <p:nvPicPr>
+          <p:cNvPr id="5" name="Content Placeholder 4"/>
+          <p:cNvPicPr>
+            <a:picLocks noGrp="1" noChangeAspect="1"/>
+          </p:cNvPicPr>
+          <p:nvPr>
+            <p:ph idx="1"/>
+          </p:nvPr>
+        </p:nvPicPr>
+        <p:blipFill>
+          <a:blip r:embed="rId2"/>
+          <a:stretch>
+            <a:fillRect/>
+          </a:stretch>
+        </p:blipFill>
+        <p:spPr>
+          <a:xfrm>
+            <a:off x="3191068" y="1"/>
+            <a:ext cx="8826215" cy="6858000"/>
+          </a:xfrm>
+        </p:spPr>
+      </p:pic>
+    </p:spTree>
+    <p:extLst>
+      <p:ext uri="{BB962C8B-B14F-4D97-AF65-F5344CB8AC3E}">
+        <p14:creationId xmlns:p14="http://schemas.microsoft.com/office/powerpoint/2010/main" val="3695523249"/>
       </p:ext>
     </p:extLst>
   </p:cSld>

</xml_diff>

<commit_message>
--Ali-- Cleaning + Presentation --Ali--
</commit_message>
<xml_diff>
--- a/Documents/Presentation.pptx
+++ b/Documents/Presentation.pptx
@@ -10,8 +10,15 @@
     <p:sldId id="258" r:id="rId4"/>
     <p:sldId id="259" r:id="rId5"/>
     <p:sldId id="260" r:id="rId6"/>
-    <p:sldId id="261" r:id="rId7"/>
-    <p:sldId id="262" r:id="rId8"/>
+    <p:sldId id="264" r:id="rId7"/>
+    <p:sldId id="261" r:id="rId8"/>
+    <p:sldId id="262" r:id="rId9"/>
+    <p:sldId id="263" r:id="rId10"/>
+    <p:sldId id="265" r:id="rId11"/>
+    <p:sldId id="266" r:id="rId12"/>
+    <p:sldId id="267" r:id="rId13"/>
+    <p:sldId id="268" r:id="rId14"/>
+    <p:sldId id="269" r:id="rId15"/>
   </p:sldIdLst>
   <p:sldSz cx="12192000" cy="6858000"/>
   <p:notesSz cx="6858000" cy="9144000"/>
@@ -7731,6 +7738,556 @@
 </p:sld>
 </file>
 
+<file path=ppt/slides/slide10.xml><?xml version="1.0" encoding="utf-8"?>
+<p:sld xmlns:a="http://schemas.openxmlformats.org/drawingml/2006/main" xmlns:r="http://schemas.openxmlformats.org/officeDocument/2006/relationships" xmlns:p="http://schemas.openxmlformats.org/presentationml/2006/main">
+  <p:cSld>
+    <p:spTree>
+      <p:nvGrpSpPr>
+        <p:cNvPr id="1" name=""/>
+        <p:cNvGrpSpPr/>
+        <p:nvPr/>
+      </p:nvGrpSpPr>
+      <p:grpSpPr>
+        <a:xfrm>
+          <a:off x="0" y="0"/>
+          <a:ext cx="0" cy="0"/>
+          <a:chOff x="0" y="0"/>
+          <a:chExt cx="0" cy="0"/>
+        </a:xfrm>
+      </p:grpSpPr>
+      <p:sp>
+        <p:nvSpPr>
+          <p:cNvPr id="2" name="Title 1"/>
+          <p:cNvSpPr>
+            <a:spLocks noGrp="1"/>
+          </p:cNvSpPr>
+          <p:nvPr>
+            <p:ph type="title"/>
+          </p:nvPr>
+        </p:nvSpPr>
+        <p:spPr>
+          <a:xfrm>
+            <a:off x="205038" y="1351118"/>
+            <a:ext cx="3207227" cy="1568251"/>
+          </a:xfrm>
+        </p:spPr>
+        <p:txBody>
+          <a:bodyPr>
+            <a:normAutofit/>
+          </a:bodyPr>
+          <a:lstStyle/>
+          <a:p>
+            <a:r>
+              <a:rPr lang="en-US" dirty="0"/>
+              <a:t>Dashboard - Employee</a:t>
+            </a:r>
+          </a:p>
+        </p:txBody>
+      </p:sp>
+      <p:pic>
+        <p:nvPicPr>
+          <p:cNvPr id="4" name="Content Placeholder 3"/>
+          <p:cNvPicPr>
+            <a:picLocks noGrp="1" noChangeAspect="1"/>
+          </p:cNvPicPr>
+          <p:nvPr>
+            <p:ph idx="1"/>
+          </p:nvPr>
+        </p:nvPicPr>
+        <p:blipFill>
+          <a:blip r:embed="rId2"/>
+          <a:stretch>
+            <a:fillRect/>
+          </a:stretch>
+        </p:blipFill>
+        <p:spPr>
+          <a:xfrm>
+            <a:off x="3806890" y="41897"/>
+            <a:ext cx="6830350" cy="6786678"/>
+          </a:xfrm>
+        </p:spPr>
+      </p:pic>
+    </p:spTree>
+    <p:extLst>
+      <p:ext uri="{BB962C8B-B14F-4D97-AF65-F5344CB8AC3E}">
+        <p14:creationId xmlns:p14="http://schemas.microsoft.com/office/powerpoint/2010/main" val="1808809744"/>
+      </p:ext>
+    </p:extLst>
+  </p:cSld>
+  <p:clrMapOvr>
+    <a:masterClrMapping/>
+  </p:clrMapOvr>
+</p:sld>
+</file>
+
+<file path=ppt/slides/slide11.xml><?xml version="1.0" encoding="utf-8"?>
+<p:sld xmlns:a="http://schemas.openxmlformats.org/drawingml/2006/main" xmlns:r="http://schemas.openxmlformats.org/officeDocument/2006/relationships" xmlns:p="http://schemas.openxmlformats.org/presentationml/2006/main">
+  <p:cSld>
+    <p:spTree>
+      <p:nvGrpSpPr>
+        <p:cNvPr id="1" name=""/>
+        <p:cNvGrpSpPr/>
+        <p:nvPr/>
+      </p:nvGrpSpPr>
+      <p:grpSpPr>
+        <a:xfrm>
+          <a:off x="0" y="0"/>
+          <a:ext cx="0" cy="0"/>
+          <a:chOff x="0" y="0"/>
+          <a:chExt cx="0" cy="0"/>
+        </a:xfrm>
+      </p:grpSpPr>
+      <p:sp>
+        <p:nvSpPr>
+          <p:cNvPr id="2" name="Title 1"/>
+          <p:cNvSpPr>
+            <a:spLocks noGrp="1"/>
+          </p:cNvSpPr>
+          <p:nvPr>
+            <p:ph type="title"/>
+          </p:nvPr>
+        </p:nvSpPr>
+        <p:spPr>
+          <a:xfrm>
+            <a:off x="3669435" y="211671"/>
+            <a:ext cx="6549832" cy="953003"/>
+          </a:xfrm>
+        </p:spPr>
+        <p:txBody>
+          <a:bodyPr>
+            <a:normAutofit/>
+          </a:bodyPr>
+          <a:lstStyle/>
+          <a:p>
+            <a:r>
+              <a:rPr lang="en-US" dirty="0"/>
+              <a:t>Dashboard - Report</a:t>
+            </a:r>
+          </a:p>
+        </p:txBody>
+      </p:sp>
+      <p:pic>
+        <p:nvPicPr>
+          <p:cNvPr id="4" name="Content Placeholder 3"/>
+          <p:cNvPicPr>
+            <a:picLocks noGrp="1" noChangeAspect="1"/>
+          </p:cNvPicPr>
+          <p:nvPr>
+            <p:ph idx="1"/>
+          </p:nvPr>
+        </p:nvPicPr>
+        <p:blipFill>
+          <a:blip r:embed="rId2"/>
+          <a:stretch>
+            <a:fillRect/>
+          </a:stretch>
+        </p:blipFill>
+        <p:spPr>
+          <a:xfrm>
+            <a:off x="2307164" y="1349633"/>
+            <a:ext cx="9848222" cy="4929870"/>
+          </a:xfrm>
+        </p:spPr>
+      </p:pic>
+    </p:spTree>
+    <p:extLst>
+      <p:ext uri="{BB962C8B-B14F-4D97-AF65-F5344CB8AC3E}">
+        <p14:creationId xmlns:p14="http://schemas.microsoft.com/office/powerpoint/2010/main" val="156837060"/>
+      </p:ext>
+    </p:extLst>
+  </p:cSld>
+  <p:clrMapOvr>
+    <a:masterClrMapping/>
+  </p:clrMapOvr>
+</p:sld>
+</file>
+
+<file path=ppt/slides/slide12.xml><?xml version="1.0" encoding="utf-8"?>
+<p:sld xmlns:a="http://schemas.openxmlformats.org/drawingml/2006/main" xmlns:r="http://schemas.openxmlformats.org/officeDocument/2006/relationships" xmlns:p="http://schemas.openxmlformats.org/presentationml/2006/main">
+  <p:cSld>
+    <p:spTree>
+      <p:nvGrpSpPr>
+        <p:cNvPr id="1" name=""/>
+        <p:cNvGrpSpPr/>
+        <p:nvPr/>
+      </p:nvGrpSpPr>
+      <p:grpSpPr>
+        <a:xfrm>
+          <a:off x="0" y="0"/>
+          <a:ext cx="0" cy="0"/>
+          <a:chOff x="0" y="0"/>
+          <a:chExt cx="0" cy="0"/>
+        </a:xfrm>
+      </p:grpSpPr>
+      <p:pic>
+        <p:nvPicPr>
+          <p:cNvPr id="5" name="Content Placeholder 4"/>
+          <p:cNvPicPr>
+            <a:picLocks noGrp="1" noChangeAspect="1"/>
+          </p:cNvPicPr>
+          <p:nvPr>
+            <p:ph idx="1"/>
+          </p:nvPr>
+        </p:nvPicPr>
+        <p:blipFill>
+          <a:blip r:embed="rId2"/>
+          <a:stretch>
+            <a:fillRect/>
+          </a:stretch>
+        </p:blipFill>
+        <p:spPr>
+          <a:xfrm>
+            <a:off x="1744910" y="31879"/>
+            <a:ext cx="10251347" cy="5435496"/>
+          </a:xfrm>
+        </p:spPr>
+      </p:pic>
+      <p:pic>
+        <p:nvPicPr>
+          <p:cNvPr id="6" name="Picture 5"/>
+          <p:cNvPicPr>
+            <a:picLocks noChangeAspect="1"/>
+          </p:cNvPicPr>
+          <p:nvPr/>
+        </p:nvPicPr>
+        <p:blipFill>
+          <a:blip r:embed="rId3"/>
+          <a:stretch>
+            <a:fillRect/>
+          </a:stretch>
+        </p:blipFill>
+        <p:spPr>
+          <a:xfrm>
+            <a:off x="345234" y="5671502"/>
+            <a:ext cx="11651024" cy="1094663"/>
+          </a:xfrm>
+          <a:prstGeom prst="rect">
+            <a:avLst/>
+          </a:prstGeom>
+        </p:spPr>
+      </p:pic>
+      <p:sp>
+        <p:nvSpPr>
+          <p:cNvPr id="2" name="Title 1"/>
+          <p:cNvSpPr>
+            <a:spLocks noGrp="1"/>
+          </p:cNvSpPr>
+          <p:nvPr>
+            <p:ph type="title"/>
+          </p:nvPr>
+        </p:nvSpPr>
+        <p:spPr>
+          <a:xfrm>
+            <a:off x="6848862" y="1344186"/>
+            <a:ext cx="4098771" cy="652395"/>
+          </a:xfrm>
+        </p:spPr>
+        <p:txBody>
+          <a:bodyPr>
+            <a:normAutofit/>
+          </a:bodyPr>
+          <a:lstStyle/>
+          <a:p>
+            <a:r>
+              <a:rPr lang="en-US" sz="3200" dirty="0">
+                <a:solidFill>
+                  <a:schemeClr val="bg1"/>
+                </a:solidFill>
+                <a:highlight>
+                  <a:srgbClr val="800000"/>
+                </a:highlight>
+              </a:rPr>
+              <a:t>Treeview challenge</a:t>
+            </a:r>
+          </a:p>
+        </p:txBody>
+      </p:sp>
+    </p:spTree>
+    <p:extLst>
+      <p:ext uri="{BB962C8B-B14F-4D97-AF65-F5344CB8AC3E}">
+        <p14:creationId xmlns:p14="http://schemas.microsoft.com/office/powerpoint/2010/main" val="3901771764"/>
+      </p:ext>
+    </p:extLst>
+  </p:cSld>
+  <p:clrMapOvr>
+    <a:masterClrMapping/>
+  </p:clrMapOvr>
+</p:sld>
+</file>
+
+<file path=ppt/slides/slide13.xml><?xml version="1.0" encoding="utf-8"?>
+<p:sld xmlns:a="http://schemas.openxmlformats.org/drawingml/2006/main" xmlns:r="http://schemas.openxmlformats.org/officeDocument/2006/relationships" xmlns:p="http://schemas.openxmlformats.org/presentationml/2006/main">
+  <p:cSld>
+    <p:spTree>
+      <p:nvGrpSpPr>
+        <p:cNvPr id="1" name=""/>
+        <p:cNvGrpSpPr/>
+        <p:nvPr/>
+      </p:nvGrpSpPr>
+      <p:grpSpPr>
+        <a:xfrm>
+          <a:off x="0" y="0"/>
+          <a:ext cx="0" cy="0"/>
+          <a:chOff x="0" y="0"/>
+          <a:chExt cx="0" cy="0"/>
+        </a:xfrm>
+      </p:grpSpPr>
+      <p:sp>
+        <p:nvSpPr>
+          <p:cNvPr id="2" name="Title 1"/>
+          <p:cNvSpPr>
+            <a:spLocks noGrp="1"/>
+          </p:cNvSpPr>
+          <p:nvPr>
+            <p:ph type="title"/>
+          </p:nvPr>
+        </p:nvSpPr>
+        <p:spPr>
+          <a:xfrm>
+            <a:off x="2343611" y="636451"/>
+            <a:ext cx="8925886" cy="729842"/>
+          </a:xfrm>
+        </p:spPr>
+        <p:txBody>
+          <a:bodyPr>
+            <a:normAutofit/>
+          </a:bodyPr>
+          <a:lstStyle/>
+          <a:p>
+            <a:r>
+              <a:rPr lang="en-US" sz="3200" dirty="0">
+                <a:solidFill>
+                  <a:schemeClr val="bg1"/>
+                </a:solidFill>
+                <a:highlight>
+                  <a:srgbClr val="800000"/>
+                </a:highlight>
+              </a:rPr>
+              <a:t>Open a Word or Excel document challenge</a:t>
+            </a:r>
+          </a:p>
+        </p:txBody>
+      </p:sp>
+      <p:sp>
+        <p:nvSpPr>
+          <p:cNvPr id="3" name="Content Placeholder 2"/>
+          <p:cNvSpPr>
+            <a:spLocks noGrp="1"/>
+          </p:cNvSpPr>
+          <p:nvPr>
+            <p:ph idx="1"/>
+          </p:nvPr>
+        </p:nvSpPr>
+        <p:spPr>
+          <a:xfrm>
+            <a:off x="2080470" y="1686187"/>
+            <a:ext cx="9424142" cy="2449585"/>
+          </a:xfrm>
+        </p:spPr>
+        <p:txBody>
+          <a:bodyPr>
+            <a:normAutofit lnSpcReduction="10000"/>
+          </a:bodyPr>
+          <a:lstStyle/>
+          <a:p>
+            <a:r>
+              <a:rPr lang="en-US" dirty="0"/>
+              <a:t>We don't have the necessary .</a:t>
+            </a:r>
+            <a:r>
+              <a:rPr lang="en-US" dirty="0" err="1"/>
+              <a:t>dll</a:t>
+            </a:r>
+            <a:r>
+              <a:rPr lang="en-US" dirty="0"/>
+              <a:t> file to use </a:t>
+            </a:r>
+            <a:r>
+              <a:rPr lang="en-US" dirty="0" err="1"/>
+              <a:t>Microsoft.Office</a:t>
+            </a:r>
+            <a:r>
+              <a:rPr lang="en-US" dirty="0"/>
+              <a:t> components, so first of all we need to add the </a:t>
+            </a:r>
+            <a:r>
+              <a:rPr lang="en-US" dirty="0" err="1"/>
+              <a:t>dll</a:t>
+            </a:r>
+            <a:r>
+              <a:rPr lang="en-US" dirty="0"/>
+              <a:t> file:</a:t>
+            </a:r>
+          </a:p>
+          <a:p>
+            <a:r>
+              <a:rPr lang="en-US" dirty="0"/>
+              <a:t>On the Project menu, click Add Reference.</a:t>
+            </a:r>
+          </a:p>
+          <a:p>
+            <a:r>
+              <a:rPr lang="en-US" dirty="0"/>
+              <a:t>On the COM tab, locate Microsoft Word or Excel Object Library, and then Select it on the COM tab.</a:t>
+            </a:r>
+          </a:p>
+          <a:p>
+            <a:r>
+              <a:rPr lang="en-US" dirty="0"/>
+              <a:t>Click OK in the Add References dialog box to accept your selections.</a:t>
+            </a:r>
+          </a:p>
+          <a:p>
+            <a:r>
+              <a:rPr lang="en-US" dirty="0"/>
+              <a:t>Add the following chunk of code to open the Word document.</a:t>
+            </a:r>
+          </a:p>
+          <a:p>
+            <a:endParaRPr lang="en-US" dirty="0"/>
+          </a:p>
+        </p:txBody>
+      </p:sp>
+      <p:pic>
+        <p:nvPicPr>
+          <p:cNvPr id="4" name="Picture 3"/>
+          <p:cNvPicPr>
+            <a:picLocks noChangeAspect="1"/>
+          </p:cNvPicPr>
+          <p:nvPr/>
+        </p:nvPicPr>
+        <p:blipFill>
+          <a:blip r:embed="rId2"/>
+          <a:stretch>
+            <a:fillRect/>
+          </a:stretch>
+        </p:blipFill>
+        <p:spPr>
+          <a:xfrm>
+            <a:off x="2080470" y="4584630"/>
+            <a:ext cx="8127220" cy="2058765"/>
+          </a:xfrm>
+          <a:prstGeom prst="rect">
+            <a:avLst/>
+          </a:prstGeom>
+        </p:spPr>
+      </p:pic>
+    </p:spTree>
+    <p:extLst>
+      <p:ext uri="{BB962C8B-B14F-4D97-AF65-F5344CB8AC3E}">
+        <p14:creationId xmlns:p14="http://schemas.microsoft.com/office/powerpoint/2010/main" val="2341744161"/>
+      </p:ext>
+    </p:extLst>
+  </p:cSld>
+  <p:clrMapOvr>
+    <a:masterClrMapping/>
+  </p:clrMapOvr>
+</p:sld>
+</file>
+
+<file path=ppt/slides/slide14.xml><?xml version="1.0" encoding="utf-8"?>
+<p:sld xmlns:a="http://schemas.openxmlformats.org/drawingml/2006/main" xmlns:r="http://schemas.openxmlformats.org/officeDocument/2006/relationships" xmlns:p="http://schemas.openxmlformats.org/presentationml/2006/main">
+  <p:cSld>
+    <p:spTree>
+      <p:nvGrpSpPr>
+        <p:cNvPr id="1" name=""/>
+        <p:cNvGrpSpPr/>
+        <p:nvPr/>
+      </p:nvGrpSpPr>
+      <p:grpSpPr>
+        <a:xfrm>
+          <a:off x="0" y="0"/>
+          <a:ext cx="0" cy="0"/>
+          <a:chOff x="0" y="0"/>
+          <a:chExt cx="0" cy="0"/>
+        </a:xfrm>
+      </p:grpSpPr>
+      <p:sp>
+        <p:nvSpPr>
+          <p:cNvPr id="2" name="Title 1"/>
+          <p:cNvSpPr>
+            <a:spLocks noGrp="1"/>
+          </p:cNvSpPr>
+          <p:nvPr>
+            <p:ph type="title"/>
+          </p:nvPr>
+        </p:nvSpPr>
+        <p:spPr/>
+        <p:txBody>
+          <a:bodyPr/>
+          <a:lstStyle/>
+          <a:p>
+            <a:r>
+              <a:rPr lang="en-US" dirty="0"/>
+              <a:t>For the future</a:t>
+            </a:r>
+          </a:p>
+        </p:txBody>
+      </p:sp>
+      <p:sp>
+        <p:nvSpPr>
+          <p:cNvPr id="3" name="Content Placeholder 2"/>
+          <p:cNvSpPr>
+            <a:spLocks noGrp="1"/>
+          </p:cNvSpPr>
+          <p:nvPr>
+            <p:ph idx="1"/>
+          </p:nvPr>
+        </p:nvSpPr>
+        <p:spPr/>
+        <p:txBody>
+          <a:bodyPr/>
+          <a:lstStyle/>
+          <a:p>
+            <a:r>
+              <a:rPr lang="en-US" dirty="0"/>
+              <a:t>Completing report</a:t>
+            </a:r>
+          </a:p>
+          <a:p>
+            <a:r>
+              <a:rPr lang="en-US" dirty="0"/>
+              <a:t>Adding a window for about page</a:t>
+            </a:r>
+          </a:p>
+          <a:p>
+            <a:r>
+              <a:rPr lang="en-US" dirty="0"/>
+              <a:t>Making more powerful search for Order page</a:t>
+            </a:r>
+          </a:p>
+          <a:p>
+            <a:r>
+              <a:rPr lang="en-US" dirty="0"/>
+              <a:t>Adding Barcode</a:t>
+            </a:r>
+          </a:p>
+          <a:p>
+            <a:r>
+              <a:rPr lang="en-US" dirty="0"/>
+              <a:t>Making more </a:t>
+            </a:r>
+            <a:r>
+              <a:rPr lang="en-US"/>
+              <a:t>powerful field checking</a:t>
+            </a:r>
+            <a:endParaRPr lang="en-US" dirty="0"/>
+          </a:p>
+        </p:txBody>
+      </p:sp>
+    </p:spTree>
+    <p:extLst>
+      <p:ext uri="{BB962C8B-B14F-4D97-AF65-F5344CB8AC3E}">
+        <p14:creationId xmlns:p14="http://schemas.microsoft.com/office/powerpoint/2010/main" val="900369380"/>
+      </p:ext>
+    </p:extLst>
+  </p:cSld>
+  <p:clrMapOvr>
+    <a:masterClrMapping/>
+  </p:clrMapOvr>
+</p:sld>
+</file>
+
 <file path=ppt/slides/slide2.xml><?xml version="1.0" encoding="utf-8"?>
 <p:sld xmlns:a="http://schemas.openxmlformats.org/drawingml/2006/main" xmlns:r="http://schemas.openxmlformats.org/officeDocument/2006/relationships" xmlns:p="http://schemas.openxmlformats.org/presentationml/2006/main">
   <p:cSld>
@@ -8076,38 +8633,9 @@
           <a:chExt cx="0" cy="0"/>
         </a:xfrm>
       </p:grpSpPr>
-      <p:sp>
-        <p:nvSpPr>
-          <p:cNvPr id="2" name="Title 1"/>
-          <p:cNvSpPr>
-            <a:spLocks noGrp="1"/>
-          </p:cNvSpPr>
-          <p:nvPr>
-            <p:ph type="title"/>
-          </p:nvPr>
-        </p:nvSpPr>
-        <p:spPr>
-          <a:xfrm>
-            <a:off x="3669435" y="211671"/>
-            <a:ext cx="6549832" cy="953003"/>
-          </a:xfrm>
-        </p:spPr>
-        <p:txBody>
-          <a:bodyPr>
-            <a:normAutofit/>
-          </a:bodyPr>
-          <a:lstStyle/>
-          <a:p>
-            <a:r>
-              <a:rPr lang="en-US" dirty="0"/>
-              <a:t>Dashboard - Category</a:t>
-            </a:r>
-          </a:p>
-        </p:txBody>
-      </p:sp>
       <p:pic>
         <p:nvPicPr>
-          <p:cNvPr id="5" name="Content Placeholder 4"/>
+          <p:cNvPr id="4" name="Content Placeholder 3"/>
           <p:cNvPicPr>
             <a:picLocks noGrp="1" noChangeAspect="1"/>
           </p:cNvPicPr>
@@ -8123,15 +8651,51 @@
         </p:blipFill>
         <p:spPr>
           <a:xfrm>
-            <a:off x="2178104" y="1380931"/>
-            <a:ext cx="9754621" cy="5053736"/>
+            <a:off x="1619075" y="-5248"/>
+            <a:ext cx="10544964" cy="6852452"/>
           </a:xfrm>
         </p:spPr>
       </p:pic>
+      <p:sp>
+        <p:nvSpPr>
+          <p:cNvPr id="2" name="Title 1"/>
+          <p:cNvSpPr>
+            <a:spLocks noGrp="1"/>
+          </p:cNvSpPr>
+          <p:nvPr>
+            <p:ph type="title"/>
+          </p:nvPr>
+        </p:nvSpPr>
+        <p:spPr>
+          <a:xfrm>
+            <a:off x="6362301" y="1629411"/>
+            <a:ext cx="5432620" cy="652395"/>
+          </a:xfrm>
+        </p:spPr>
+        <p:txBody>
+          <a:bodyPr>
+            <a:normAutofit/>
+          </a:bodyPr>
+          <a:lstStyle/>
+          <a:p>
+            <a:r>
+              <a:rPr lang="en-US" sz="3200" dirty="0">
+                <a:solidFill>
+                  <a:schemeClr val="bg1"/>
+                </a:solidFill>
+                <a:highlight>
+                  <a:srgbClr val="800000"/>
+                </a:highlight>
+              </a:rPr>
+              <a:t>Ribbon challenge</a:t>
+            </a:r>
+          </a:p>
+        </p:txBody>
+      </p:sp>
     </p:spTree>
     <p:extLst>
       <p:ext uri="{BB962C8B-B14F-4D97-AF65-F5344CB8AC3E}">
-        <p14:creationId xmlns:p14="http://schemas.microsoft.com/office/powerpoint/2010/main" val="693535125"/>
+        <p14:creationId xmlns:p14="http://schemas.microsoft.com/office/powerpoint/2010/main" val="787477562"/>
       </p:ext>
     </p:extLst>
   </p:cSld>
@@ -8170,6 +8734,88 @@
         </p:nvSpPr>
         <p:spPr>
           <a:xfrm>
+            <a:off x="3669435" y="211671"/>
+            <a:ext cx="6549832" cy="953003"/>
+          </a:xfrm>
+        </p:spPr>
+        <p:txBody>
+          <a:bodyPr>
+            <a:normAutofit/>
+          </a:bodyPr>
+          <a:lstStyle/>
+          <a:p>
+            <a:r>
+              <a:rPr lang="en-US" dirty="0"/>
+              <a:t>Dashboard - Category</a:t>
+            </a:r>
+          </a:p>
+        </p:txBody>
+      </p:sp>
+      <p:pic>
+        <p:nvPicPr>
+          <p:cNvPr id="5" name="Content Placeholder 4"/>
+          <p:cNvPicPr>
+            <a:picLocks noGrp="1" noChangeAspect="1"/>
+          </p:cNvPicPr>
+          <p:nvPr>
+            <p:ph idx="1"/>
+          </p:nvPr>
+        </p:nvPicPr>
+        <p:blipFill>
+          <a:blip r:embed="rId2"/>
+          <a:stretch>
+            <a:fillRect/>
+          </a:stretch>
+        </p:blipFill>
+        <p:spPr>
+          <a:xfrm>
+            <a:off x="2178104" y="1380931"/>
+            <a:ext cx="9754621" cy="5053736"/>
+          </a:xfrm>
+        </p:spPr>
+      </p:pic>
+    </p:spTree>
+    <p:extLst>
+      <p:ext uri="{BB962C8B-B14F-4D97-AF65-F5344CB8AC3E}">
+        <p14:creationId xmlns:p14="http://schemas.microsoft.com/office/powerpoint/2010/main" val="693535125"/>
+      </p:ext>
+    </p:extLst>
+  </p:cSld>
+  <p:clrMapOvr>
+    <a:masterClrMapping/>
+  </p:clrMapOvr>
+</p:sld>
+</file>
+
+<file path=ppt/slides/slide8.xml><?xml version="1.0" encoding="utf-8"?>
+<p:sld xmlns:a="http://schemas.openxmlformats.org/drawingml/2006/main" xmlns:r="http://schemas.openxmlformats.org/officeDocument/2006/relationships" xmlns:p="http://schemas.openxmlformats.org/presentationml/2006/main">
+  <p:cSld>
+    <p:spTree>
+      <p:nvGrpSpPr>
+        <p:cNvPr id="1" name=""/>
+        <p:cNvGrpSpPr/>
+        <p:nvPr/>
+      </p:nvGrpSpPr>
+      <p:grpSpPr>
+        <a:xfrm>
+          <a:off x="0" y="0"/>
+          <a:ext cx="0" cy="0"/>
+          <a:chOff x="0" y="0"/>
+          <a:chExt cx="0" cy="0"/>
+        </a:xfrm>
+      </p:grpSpPr>
+      <p:sp>
+        <p:nvSpPr>
+          <p:cNvPr id="2" name="Title 1"/>
+          <p:cNvSpPr>
+            <a:spLocks noGrp="1"/>
+          </p:cNvSpPr>
+          <p:nvPr>
+            <p:ph type="title"/>
+          </p:nvPr>
+        </p:nvSpPr>
+        <p:spPr>
+          <a:xfrm>
             <a:off x="189116" y="1284691"/>
             <a:ext cx="2787349" cy="2624836"/>
           </a:xfrm>
@@ -8214,6 +8860,194 @@
     <p:extLst>
       <p:ext uri="{BB962C8B-B14F-4D97-AF65-F5344CB8AC3E}">
         <p14:creationId xmlns:p14="http://schemas.microsoft.com/office/powerpoint/2010/main" val="3695523249"/>
+      </p:ext>
+    </p:extLst>
+  </p:cSld>
+  <p:clrMapOvr>
+    <a:masterClrMapping/>
+  </p:clrMapOvr>
+</p:sld>
+</file>
+
+<file path=ppt/slides/slide9.xml><?xml version="1.0" encoding="utf-8"?>
+<p:sld xmlns:a="http://schemas.openxmlformats.org/drawingml/2006/main" xmlns:r="http://schemas.openxmlformats.org/officeDocument/2006/relationships" xmlns:p="http://schemas.openxmlformats.org/presentationml/2006/main">
+  <p:cSld>
+    <p:spTree>
+      <p:nvGrpSpPr>
+        <p:cNvPr id="1" name=""/>
+        <p:cNvGrpSpPr/>
+        <p:nvPr/>
+      </p:nvGrpSpPr>
+      <p:grpSpPr>
+        <a:xfrm>
+          <a:off x="0" y="0"/>
+          <a:ext cx="0" cy="0"/>
+          <a:chOff x="0" y="0"/>
+          <a:chExt cx="0" cy="0"/>
+        </a:xfrm>
+      </p:grpSpPr>
+      <p:pic>
+        <p:nvPicPr>
+          <p:cNvPr id="4" name="Content Placeholder 3"/>
+          <p:cNvPicPr>
+            <a:picLocks noGrp="1" noChangeAspect="1"/>
+          </p:cNvPicPr>
+          <p:nvPr>
+            <p:ph idx="1"/>
+          </p:nvPr>
+        </p:nvPicPr>
+        <p:blipFill>
+          <a:blip r:embed="rId2"/>
+          <a:stretch>
+            <a:fillRect/>
+          </a:stretch>
+        </p:blipFill>
+        <p:spPr>
+          <a:xfrm>
+            <a:off x="1751327" y="-1"/>
+            <a:ext cx="10409007" cy="5169159"/>
+          </a:xfrm>
+        </p:spPr>
+      </p:pic>
+      <p:sp>
+        <p:nvSpPr>
+          <p:cNvPr id="8" name="Title 1"/>
+          <p:cNvSpPr txBox="1">
+            <a:spLocks/>
+          </p:cNvSpPr>
+          <p:nvPr/>
+        </p:nvSpPr>
+        <p:spPr>
+          <a:xfrm>
+            <a:off x="4750674" y="4380658"/>
+            <a:ext cx="6819285" cy="657874"/>
+          </a:xfrm>
+          <a:prstGeom prst="rect">
+            <a:avLst/>
+          </a:prstGeom>
+        </p:spPr>
+        <p:txBody>
+          <a:bodyPr vert="horz" lIns="91440" tIns="45720" rIns="91440" bIns="45720" rtlCol="0" anchor="t">
+            <a:normAutofit fontScale="92500"/>
+          </a:bodyPr>
+          <a:lstStyle>
+            <a:lvl1pPr algn="l" defTabSz="457200" rtl="0" eaLnBrk="1" latinLnBrk="0" hangingPunct="1">
+              <a:spcBef>
+                <a:spcPct val="0"/>
+              </a:spcBef>
+              <a:buNone/>
+              <a:defRPr sz="3600" kern="1200">
+                <a:solidFill>
+                  <a:schemeClr val="tx1">
+                    <a:lumMod val="85000"/>
+                    <a:lumOff val="15000"/>
+                  </a:schemeClr>
+                </a:solidFill>
+                <a:latin typeface="+mj-lt"/>
+                <a:ea typeface="+mj-ea"/>
+                <a:cs typeface="+mj-cs"/>
+              </a:defRPr>
+            </a:lvl1pPr>
+            <a:lvl2pPr eaLnBrk="1" hangingPunct="1">
+              <a:defRPr>
+                <a:solidFill>
+                  <a:schemeClr val="tx2"/>
+                </a:solidFill>
+              </a:defRPr>
+            </a:lvl2pPr>
+            <a:lvl3pPr eaLnBrk="1" hangingPunct="1">
+              <a:defRPr>
+                <a:solidFill>
+                  <a:schemeClr val="tx2"/>
+                </a:solidFill>
+              </a:defRPr>
+            </a:lvl3pPr>
+            <a:lvl4pPr eaLnBrk="1" hangingPunct="1">
+              <a:defRPr>
+                <a:solidFill>
+                  <a:schemeClr val="tx2"/>
+                </a:solidFill>
+              </a:defRPr>
+            </a:lvl4pPr>
+            <a:lvl5pPr eaLnBrk="1" hangingPunct="1">
+              <a:defRPr>
+                <a:solidFill>
+                  <a:schemeClr val="tx2"/>
+                </a:solidFill>
+              </a:defRPr>
+            </a:lvl5pPr>
+            <a:lvl6pPr eaLnBrk="1" hangingPunct="1">
+              <a:defRPr>
+                <a:solidFill>
+                  <a:schemeClr val="tx2"/>
+                </a:solidFill>
+              </a:defRPr>
+            </a:lvl6pPr>
+            <a:lvl7pPr eaLnBrk="1" hangingPunct="1">
+              <a:defRPr>
+                <a:solidFill>
+                  <a:schemeClr val="tx2"/>
+                </a:solidFill>
+              </a:defRPr>
+            </a:lvl7pPr>
+            <a:lvl8pPr eaLnBrk="1" hangingPunct="1">
+              <a:defRPr>
+                <a:solidFill>
+                  <a:schemeClr val="tx2"/>
+                </a:solidFill>
+              </a:defRPr>
+            </a:lvl8pPr>
+            <a:lvl9pPr eaLnBrk="1" hangingPunct="1">
+              <a:defRPr>
+                <a:solidFill>
+                  <a:schemeClr val="tx2"/>
+                </a:solidFill>
+              </a:defRPr>
+            </a:lvl9pPr>
+          </a:lstStyle>
+          <a:p>
+            <a:r>
+              <a:rPr lang="en-US" dirty="0">
+                <a:solidFill>
+                  <a:schemeClr val="bg1"/>
+                </a:solidFill>
+                <a:highlight>
+                  <a:srgbClr val="800000"/>
+                </a:highlight>
+              </a:rPr>
+              <a:t>Images &amp; Database challenge</a:t>
+            </a:r>
+          </a:p>
+        </p:txBody>
+      </p:sp>
+      <p:pic>
+        <p:nvPicPr>
+          <p:cNvPr id="10" name="Picture 9"/>
+          <p:cNvPicPr>
+            <a:picLocks noChangeAspect="1"/>
+          </p:cNvPicPr>
+          <p:nvPr/>
+        </p:nvPicPr>
+        <p:blipFill>
+          <a:blip r:embed="rId3"/>
+          <a:stretch>
+            <a:fillRect/>
+          </a:stretch>
+        </p:blipFill>
+        <p:spPr>
+          <a:xfrm>
+            <a:off x="1751328" y="5368740"/>
+            <a:ext cx="10303930" cy="1330640"/>
+          </a:xfrm>
+          <a:prstGeom prst="rect">
+            <a:avLst/>
+          </a:prstGeom>
+        </p:spPr>
+      </p:pic>
+    </p:spTree>
+    <p:extLst>
+      <p:ext uri="{BB962C8B-B14F-4D97-AF65-F5344CB8AC3E}">
+        <p14:creationId xmlns:p14="http://schemas.microsoft.com/office/powerpoint/2010/main" val="3220071496"/>
       </p:ext>
     </p:extLst>
   </p:cSld>

</xml_diff>

<commit_message>
--Ali-- Final Presentation --Ali--
</commit_message>
<xml_diff>
--- a/Documents/Presentation.pptx
+++ b/Documents/Presentation.pptx
@@ -10,12 +10,12 @@
     <p:sldId id="258" r:id="rId4"/>
     <p:sldId id="259" r:id="rId5"/>
     <p:sldId id="260" r:id="rId6"/>
-    <p:sldId id="264" r:id="rId7"/>
-    <p:sldId id="261" r:id="rId8"/>
-    <p:sldId id="262" r:id="rId9"/>
-    <p:sldId id="263" r:id="rId10"/>
-    <p:sldId id="265" r:id="rId11"/>
-    <p:sldId id="266" r:id="rId12"/>
+    <p:sldId id="261" r:id="rId7"/>
+    <p:sldId id="262" r:id="rId8"/>
+    <p:sldId id="265" r:id="rId9"/>
+    <p:sldId id="266" r:id="rId10"/>
+    <p:sldId id="270" r:id="rId11"/>
+    <p:sldId id="271" r:id="rId12"/>
     <p:sldId id="267" r:id="rId13"/>
     <p:sldId id="268" r:id="rId14"/>
     <p:sldId id="269" r:id="rId15"/>
@@ -7755,884 +7755,6 @@
           <a:chExt cx="0" cy="0"/>
         </a:xfrm>
       </p:grpSpPr>
-      <p:sp>
-        <p:nvSpPr>
-          <p:cNvPr id="2" name="Title 1"/>
-          <p:cNvSpPr>
-            <a:spLocks noGrp="1"/>
-          </p:cNvSpPr>
-          <p:nvPr>
-            <p:ph type="title"/>
-          </p:nvPr>
-        </p:nvSpPr>
-        <p:spPr>
-          <a:xfrm>
-            <a:off x="205038" y="1351118"/>
-            <a:ext cx="3207227" cy="1568251"/>
-          </a:xfrm>
-        </p:spPr>
-        <p:txBody>
-          <a:bodyPr>
-            <a:normAutofit/>
-          </a:bodyPr>
-          <a:lstStyle/>
-          <a:p>
-            <a:r>
-              <a:rPr lang="en-US" dirty="0"/>
-              <a:t>Dashboard - Employee</a:t>
-            </a:r>
-          </a:p>
-        </p:txBody>
-      </p:sp>
-      <p:pic>
-        <p:nvPicPr>
-          <p:cNvPr id="4" name="Content Placeholder 3"/>
-          <p:cNvPicPr>
-            <a:picLocks noGrp="1" noChangeAspect="1"/>
-          </p:cNvPicPr>
-          <p:nvPr>
-            <p:ph idx="1"/>
-          </p:nvPr>
-        </p:nvPicPr>
-        <p:blipFill>
-          <a:blip r:embed="rId2"/>
-          <a:stretch>
-            <a:fillRect/>
-          </a:stretch>
-        </p:blipFill>
-        <p:spPr>
-          <a:xfrm>
-            <a:off x="3806890" y="41897"/>
-            <a:ext cx="6830350" cy="6786678"/>
-          </a:xfrm>
-        </p:spPr>
-      </p:pic>
-    </p:spTree>
-    <p:extLst>
-      <p:ext uri="{BB962C8B-B14F-4D97-AF65-F5344CB8AC3E}">
-        <p14:creationId xmlns:p14="http://schemas.microsoft.com/office/powerpoint/2010/main" val="1808809744"/>
-      </p:ext>
-    </p:extLst>
-  </p:cSld>
-  <p:clrMapOvr>
-    <a:masterClrMapping/>
-  </p:clrMapOvr>
-</p:sld>
-</file>
-
-<file path=ppt/slides/slide11.xml><?xml version="1.0" encoding="utf-8"?>
-<p:sld xmlns:a="http://schemas.openxmlformats.org/drawingml/2006/main" xmlns:r="http://schemas.openxmlformats.org/officeDocument/2006/relationships" xmlns:p="http://schemas.openxmlformats.org/presentationml/2006/main">
-  <p:cSld>
-    <p:spTree>
-      <p:nvGrpSpPr>
-        <p:cNvPr id="1" name=""/>
-        <p:cNvGrpSpPr/>
-        <p:nvPr/>
-      </p:nvGrpSpPr>
-      <p:grpSpPr>
-        <a:xfrm>
-          <a:off x="0" y="0"/>
-          <a:ext cx="0" cy="0"/>
-          <a:chOff x="0" y="0"/>
-          <a:chExt cx="0" cy="0"/>
-        </a:xfrm>
-      </p:grpSpPr>
-      <p:sp>
-        <p:nvSpPr>
-          <p:cNvPr id="2" name="Title 1"/>
-          <p:cNvSpPr>
-            <a:spLocks noGrp="1"/>
-          </p:cNvSpPr>
-          <p:nvPr>
-            <p:ph type="title"/>
-          </p:nvPr>
-        </p:nvSpPr>
-        <p:spPr>
-          <a:xfrm>
-            <a:off x="3669435" y="211671"/>
-            <a:ext cx="6549832" cy="953003"/>
-          </a:xfrm>
-        </p:spPr>
-        <p:txBody>
-          <a:bodyPr>
-            <a:normAutofit/>
-          </a:bodyPr>
-          <a:lstStyle/>
-          <a:p>
-            <a:r>
-              <a:rPr lang="en-US" dirty="0"/>
-              <a:t>Dashboard - Report</a:t>
-            </a:r>
-          </a:p>
-        </p:txBody>
-      </p:sp>
-      <p:pic>
-        <p:nvPicPr>
-          <p:cNvPr id="4" name="Content Placeholder 3"/>
-          <p:cNvPicPr>
-            <a:picLocks noGrp="1" noChangeAspect="1"/>
-          </p:cNvPicPr>
-          <p:nvPr>
-            <p:ph idx="1"/>
-          </p:nvPr>
-        </p:nvPicPr>
-        <p:blipFill>
-          <a:blip r:embed="rId2"/>
-          <a:stretch>
-            <a:fillRect/>
-          </a:stretch>
-        </p:blipFill>
-        <p:spPr>
-          <a:xfrm>
-            <a:off x="2307164" y="1349633"/>
-            <a:ext cx="9848222" cy="4929870"/>
-          </a:xfrm>
-        </p:spPr>
-      </p:pic>
-    </p:spTree>
-    <p:extLst>
-      <p:ext uri="{BB962C8B-B14F-4D97-AF65-F5344CB8AC3E}">
-        <p14:creationId xmlns:p14="http://schemas.microsoft.com/office/powerpoint/2010/main" val="156837060"/>
-      </p:ext>
-    </p:extLst>
-  </p:cSld>
-  <p:clrMapOvr>
-    <a:masterClrMapping/>
-  </p:clrMapOvr>
-</p:sld>
-</file>
-
-<file path=ppt/slides/slide12.xml><?xml version="1.0" encoding="utf-8"?>
-<p:sld xmlns:a="http://schemas.openxmlformats.org/drawingml/2006/main" xmlns:r="http://schemas.openxmlformats.org/officeDocument/2006/relationships" xmlns:p="http://schemas.openxmlformats.org/presentationml/2006/main">
-  <p:cSld>
-    <p:spTree>
-      <p:nvGrpSpPr>
-        <p:cNvPr id="1" name=""/>
-        <p:cNvGrpSpPr/>
-        <p:nvPr/>
-      </p:nvGrpSpPr>
-      <p:grpSpPr>
-        <a:xfrm>
-          <a:off x="0" y="0"/>
-          <a:ext cx="0" cy="0"/>
-          <a:chOff x="0" y="0"/>
-          <a:chExt cx="0" cy="0"/>
-        </a:xfrm>
-      </p:grpSpPr>
-      <p:pic>
-        <p:nvPicPr>
-          <p:cNvPr id="5" name="Content Placeholder 4"/>
-          <p:cNvPicPr>
-            <a:picLocks noGrp="1" noChangeAspect="1"/>
-          </p:cNvPicPr>
-          <p:nvPr>
-            <p:ph idx="1"/>
-          </p:nvPr>
-        </p:nvPicPr>
-        <p:blipFill>
-          <a:blip r:embed="rId2"/>
-          <a:stretch>
-            <a:fillRect/>
-          </a:stretch>
-        </p:blipFill>
-        <p:spPr>
-          <a:xfrm>
-            <a:off x="1744910" y="31879"/>
-            <a:ext cx="10251347" cy="5435496"/>
-          </a:xfrm>
-        </p:spPr>
-      </p:pic>
-      <p:pic>
-        <p:nvPicPr>
-          <p:cNvPr id="6" name="Picture 5"/>
-          <p:cNvPicPr>
-            <a:picLocks noChangeAspect="1"/>
-          </p:cNvPicPr>
-          <p:nvPr/>
-        </p:nvPicPr>
-        <p:blipFill>
-          <a:blip r:embed="rId3"/>
-          <a:stretch>
-            <a:fillRect/>
-          </a:stretch>
-        </p:blipFill>
-        <p:spPr>
-          <a:xfrm>
-            <a:off x="345234" y="5671502"/>
-            <a:ext cx="11651024" cy="1094663"/>
-          </a:xfrm>
-          <a:prstGeom prst="rect">
-            <a:avLst/>
-          </a:prstGeom>
-        </p:spPr>
-      </p:pic>
-      <p:sp>
-        <p:nvSpPr>
-          <p:cNvPr id="2" name="Title 1"/>
-          <p:cNvSpPr>
-            <a:spLocks noGrp="1"/>
-          </p:cNvSpPr>
-          <p:nvPr>
-            <p:ph type="title"/>
-          </p:nvPr>
-        </p:nvSpPr>
-        <p:spPr>
-          <a:xfrm>
-            <a:off x="6848862" y="1344186"/>
-            <a:ext cx="4098771" cy="652395"/>
-          </a:xfrm>
-        </p:spPr>
-        <p:txBody>
-          <a:bodyPr>
-            <a:normAutofit/>
-          </a:bodyPr>
-          <a:lstStyle/>
-          <a:p>
-            <a:r>
-              <a:rPr lang="en-US" sz="3200" dirty="0">
-                <a:solidFill>
-                  <a:schemeClr val="bg1"/>
-                </a:solidFill>
-                <a:highlight>
-                  <a:srgbClr val="800000"/>
-                </a:highlight>
-              </a:rPr>
-              <a:t>Treeview challenge</a:t>
-            </a:r>
-          </a:p>
-        </p:txBody>
-      </p:sp>
-    </p:spTree>
-    <p:extLst>
-      <p:ext uri="{BB962C8B-B14F-4D97-AF65-F5344CB8AC3E}">
-        <p14:creationId xmlns:p14="http://schemas.microsoft.com/office/powerpoint/2010/main" val="3901771764"/>
-      </p:ext>
-    </p:extLst>
-  </p:cSld>
-  <p:clrMapOvr>
-    <a:masterClrMapping/>
-  </p:clrMapOvr>
-</p:sld>
-</file>
-
-<file path=ppt/slides/slide13.xml><?xml version="1.0" encoding="utf-8"?>
-<p:sld xmlns:a="http://schemas.openxmlformats.org/drawingml/2006/main" xmlns:r="http://schemas.openxmlformats.org/officeDocument/2006/relationships" xmlns:p="http://schemas.openxmlformats.org/presentationml/2006/main">
-  <p:cSld>
-    <p:spTree>
-      <p:nvGrpSpPr>
-        <p:cNvPr id="1" name=""/>
-        <p:cNvGrpSpPr/>
-        <p:nvPr/>
-      </p:nvGrpSpPr>
-      <p:grpSpPr>
-        <a:xfrm>
-          <a:off x="0" y="0"/>
-          <a:ext cx="0" cy="0"/>
-          <a:chOff x="0" y="0"/>
-          <a:chExt cx="0" cy="0"/>
-        </a:xfrm>
-      </p:grpSpPr>
-      <p:sp>
-        <p:nvSpPr>
-          <p:cNvPr id="2" name="Title 1"/>
-          <p:cNvSpPr>
-            <a:spLocks noGrp="1"/>
-          </p:cNvSpPr>
-          <p:nvPr>
-            <p:ph type="title"/>
-          </p:nvPr>
-        </p:nvSpPr>
-        <p:spPr>
-          <a:xfrm>
-            <a:off x="2343611" y="636451"/>
-            <a:ext cx="8925886" cy="729842"/>
-          </a:xfrm>
-        </p:spPr>
-        <p:txBody>
-          <a:bodyPr>
-            <a:normAutofit/>
-          </a:bodyPr>
-          <a:lstStyle/>
-          <a:p>
-            <a:r>
-              <a:rPr lang="en-US" sz="3200" dirty="0">
-                <a:solidFill>
-                  <a:schemeClr val="bg1"/>
-                </a:solidFill>
-                <a:highlight>
-                  <a:srgbClr val="800000"/>
-                </a:highlight>
-              </a:rPr>
-              <a:t>Open a Word or Excel document challenge</a:t>
-            </a:r>
-          </a:p>
-        </p:txBody>
-      </p:sp>
-      <p:sp>
-        <p:nvSpPr>
-          <p:cNvPr id="3" name="Content Placeholder 2"/>
-          <p:cNvSpPr>
-            <a:spLocks noGrp="1"/>
-          </p:cNvSpPr>
-          <p:nvPr>
-            <p:ph idx="1"/>
-          </p:nvPr>
-        </p:nvSpPr>
-        <p:spPr>
-          <a:xfrm>
-            <a:off x="2080470" y="1686187"/>
-            <a:ext cx="9424142" cy="2449585"/>
-          </a:xfrm>
-        </p:spPr>
-        <p:txBody>
-          <a:bodyPr>
-            <a:normAutofit lnSpcReduction="10000"/>
-          </a:bodyPr>
-          <a:lstStyle/>
-          <a:p>
-            <a:r>
-              <a:rPr lang="en-US" dirty="0"/>
-              <a:t>We don't have the necessary .</a:t>
-            </a:r>
-            <a:r>
-              <a:rPr lang="en-US" dirty="0" err="1"/>
-              <a:t>dll</a:t>
-            </a:r>
-            <a:r>
-              <a:rPr lang="en-US" dirty="0"/>
-              <a:t> file to use </a:t>
-            </a:r>
-            <a:r>
-              <a:rPr lang="en-US" dirty="0" err="1"/>
-              <a:t>Microsoft.Office</a:t>
-            </a:r>
-            <a:r>
-              <a:rPr lang="en-US" dirty="0"/>
-              <a:t> components, so first of all we need to add the </a:t>
-            </a:r>
-            <a:r>
-              <a:rPr lang="en-US" dirty="0" err="1"/>
-              <a:t>dll</a:t>
-            </a:r>
-            <a:r>
-              <a:rPr lang="en-US" dirty="0"/>
-              <a:t> file:</a:t>
-            </a:r>
-          </a:p>
-          <a:p>
-            <a:r>
-              <a:rPr lang="en-US" dirty="0"/>
-              <a:t>On the Project menu, click Add Reference.</a:t>
-            </a:r>
-          </a:p>
-          <a:p>
-            <a:r>
-              <a:rPr lang="en-US" dirty="0"/>
-              <a:t>On the COM tab, locate Microsoft Word or Excel Object Library, and then Select it on the COM tab.</a:t>
-            </a:r>
-          </a:p>
-          <a:p>
-            <a:r>
-              <a:rPr lang="en-US" dirty="0"/>
-              <a:t>Click OK in the Add References dialog box to accept your selections.</a:t>
-            </a:r>
-          </a:p>
-          <a:p>
-            <a:r>
-              <a:rPr lang="en-US" dirty="0"/>
-              <a:t>Add the following chunk of code to open the Word document.</a:t>
-            </a:r>
-          </a:p>
-          <a:p>
-            <a:endParaRPr lang="en-US" dirty="0"/>
-          </a:p>
-        </p:txBody>
-      </p:sp>
-      <p:pic>
-        <p:nvPicPr>
-          <p:cNvPr id="4" name="Picture 3"/>
-          <p:cNvPicPr>
-            <a:picLocks noChangeAspect="1"/>
-          </p:cNvPicPr>
-          <p:nvPr/>
-        </p:nvPicPr>
-        <p:blipFill>
-          <a:blip r:embed="rId2"/>
-          <a:stretch>
-            <a:fillRect/>
-          </a:stretch>
-        </p:blipFill>
-        <p:spPr>
-          <a:xfrm>
-            <a:off x="2080470" y="4584630"/>
-            <a:ext cx="8127220" cy="2058765"/>
-          </a:xfrm>
-          <a:prstGeom prst="rect">
-            <a:avLst/>
-          </a:prstGeom>
-        </p:spPr>
-      </p:pic>
-    </p:spTree>
-    <p:extLst>
-      <p:ext uri="{BB962C8B-B14F-4D97-AF65-F5344CB8AC3E}">
-        <p14:creationId xmlns:p14="http://schemas.microsoft.com/office/powerpoint/2010/main" val="2341744161"/>
-      </p:ext>
-    </p:extLst>
-  </p:cSld>
-  <p:clrMapOvr>
-    <a:masterClrMapping/>
-  </p:clrMapOvr>
-</p:sld>
-</file>
-
-<file path=ppt/slides/slide14.xml><?xml version="1.0" encoding="utf-8"?>
-<p:sld xmlns:a="http://schemas.openxmlformats.org/drawingml/2006/main" xmlns:r="http://schemas.openxmlformats.org/officeDocument/2006/relationships" xmlns:p="http://schemas.openxmlformats.org/presentationml/2006/main">
-  <p:cSld>
-    <p:spTree>
-      <p:nvGrpSpPr>
-        <p:cNvPr id="1" name=""/>
-        <p:cNvGrpSpPr/>
-        <p:nvPr/>
-      </p:nvGrpSpPr>
-      <p:grpSpPr>
-        <a:xfrm>
-          <a:off x="0" y="0"/>
-          <a:ext cx="0" cy="0"/>
-          <a:chOff x="0" y="0"/>
-          <a:chExt cx="0" cy="0"/>
-        </a:xfrm>
-      </p:grpSpPr>
-      <p:sp>
-        <p:nvSpPr>
-          <p:cNvPr id="2" name="Title 1"/>
-          <p:cNvSpPr>
-            <a:spLocks noGrp="1"/>
-          </p:cNvSpPr>
-          <p:nvPr>
-            <p:ph type="title"/>
-          </p:nvPr>
-        </p:nvSpPr>
-        <p:spPr/>
-        <p:txBody>
-          <a:bodyPr/>
-          <a:lstStyle/>
-          <a:p>
-            <a:r>
-              <a:rPr lang="en-US" dirty="0"/>
-              <a:t>For the future</a:t>
-            </a:r>
-          </a:p>
-        </p:txBody>
-      </p:sp>
-      <p:sp>
-        <p:nvSpPr>
-          <p:cNvPr id="3" name="Content Placeholder 2"/>
-          <p:cNvSpPr>
-            <a:spLocks noGrp="1"/>
-          </p:cNvSpPr>
-          <p:nvPr>
-            <p:ph idx="1"/>
-          </p:nvPr>
-        </p:nvSpPr>
-        <p:spPr/>
-        <p:txBody>
-          <a:bodyPr/>
-          <a:lstStyle/>
-          <a:p>
-            <a:r>
-              <a:rPr lang="en-US" dirty="0"/>
-              <a:t>Completing report</a:t>
-            </a:r>
-          </a:p>
-          <a:p>
-            <a:r>
-              <a:rPr lang="en-US" dirty="0"/>
-              <a:t>Adding a window for about page</a:t>
-            </a:r>
-          </a:p>
-          <a:p>
-            <a:r>
-              <a:rPr lang="en-US" dirty="0"/>
-              <a:t>Making more powerful search for Order page</a:t>
-            </a:r>
-          </a:p>
-          <a:p>
-            <a:r>
-              <a:rPr lang="en-US" dirty="0"/>
-              <a:t>Adding Barcode</a:t>
-            </a:r>
-          </a:p>
-          <a:p>
-            <a:r>
-              <a:rPr lang="en-US" dirty="0"/>
-              <a:t>Making more </a:t>
-            </a:r>
-            <a:r>
-              <a:rPr lang="en-US"/>
-              <a:t>powerful field checking</a:t>
-            </a:r>
-            <a:endParaRPr lang="en-US" dirty="0"/>
-          </a:p>
-        </p:txBody>
-      </p:sp>
-    </p:spTree>
-    <p:extLst>
-      <p:ext uri="{BB962C8B-B14F-4D97-AF65-F5344CB8AC3E}">
-        <p14:creationId xmlns:p14="http://schemas.microsoft.com/office/powerpoint/2010/main" val="900369380"/>
-      </p:ext>
-    </p:extLst>
-  </p:cSld>
-  <p:clrMapOvr>
-    <a:masterClrMapping/>
-  </p:clrMapOvr>
-</p:sld>
-</file>
-
-<file path=ppt/slides/slide2.xml><?xml version="1.0" encoding="utf-8"?>
-<p:sld xmlns:a="http://schemas.openxmlformats.org/drawingml/2006/main" xmlns:r="http://schemas.openxmlformats.org/officeDocument/2006/relationships" xmlns:p="http://schemas.openxmlformats.org/presentationml/2006/main">
-  <p:cSld>
-    <p:spTree>
-      <p:nvGrpSpPr>
-        <p:cNvPr id="1" name=""/>
-        <p:cNvGrpSpPr/>
-        <p:nvPr/>
-      </p:nvGrpSpPr>
-      <p:grpSpPr>
-        <a:xfrm>
-          <a:off x="0" y="0"/>
-          <a:ext cx="0" cy="0"/>
-          <a:chOff x="0" y="0"/>
-          <a:chExt cx="0" cy="0"/>
-        </a:xfrm>
-      </p:grpSpPr>
-      <p:sp>
-        <p:nvSpPr>
-          <p:cNvPr id="2" name="Title 1"/>
-          <p:cNvSpPr>
-            <a:spLocks noGrp="1"/>
-          </p:cNvSpPr>
-          <p:nvPr>
-            <p:ph type="title"/>
-          </p:nvPr>
-        </p:nvSpPr>
-        <p:spPr>
-          <a:xfrm>
-            <a:off x="3669435" y="211671"/>
-            <a:ext cx="4492432" cy="953003"/>
-          </a:xfrm>
-        </p:spPr>
-        <p:txBody>
-          <a:bodyPr>
-            <a:normAutofit/>
-          </a:bodyPr>
-          <a:lstStyle/>
-          <a:p>
-            <a:r>
-              <a:rPr lang="en-US" dirty="0"/>
-              <a:t>Login page</a:t>
-            </a:r>
-          </a:p>
-        </p:txBody>
-      </p:sp>
-      <p:pic>
-        <p:nvPicPr>
-          <p:cNvPr id="6" name="Content Placeholder 5"/>
-          <p:cNvPicPr>
-            <a:picLocks noGrp="1" noChangeAspect="1"/>
-          </p:cNvPicPr>
-          <p:nvPr>
-            <p:ph idx="1"/>
-          </p:nvPr>
-        </p:nvPicPr>
-        <p:blipFill>
-          <a:blip r:embed="rId2"/>
-          <a:stretch>
-            <a:fillRect/>
-          </a:stretch>
-        </p:blipFill>
-        <p:spPr>
-          <a:xfrm>
-            <a:off x="3643533" y="1903445"/>
-            <a:ext cx="6262291" cy="4149248"/>
-          </a:xfrm>
-        </p:spPr>
-      </p:pic>
-    </p:spTree>
-    <p:extLst>
-      <p:ext uri="{BB962C8B-B14F-4D97-AF65-F5344CB8AC3E}">
-        <p14:creationId xmlns:p14="http://schemas.microsoft.com/office/powerpoint/2010/main" val="2848497588"/>
-      </p:ext>
-    </p:extLst>
-  </p:cSld>
-  <p:clrMapOvr>
-    <a:masterClrMapping/>
-  </p:clrMapOvr>
-</p:sld>
-</file>
-
-<file path=ppt/slides/slide3.xml><?xml version="1.0" encoding="utf-8"?>
-<p:sld xmlns:a="http://schemas.openxmlformats.org/drawingml/2006/main" xmlns:r="http://schemas.openxmlformats.org/officeDocument/2006/relationships" xmlns:p="http://schemas.openxmlformats.org/presentationml/2006/main">
-  <p:cSld>
-    <p:spTree>
-      <p:nvGrpSpPr>
-        <p:cNvPr id="1" name=""/>
-        <p:cNvGrpSpPr/>
-        <p:nvPr/>
-      </p:nvGrpSpPr>
-      <p:grpSpPr>
-        <a:xfrm>
-          <a:off x="0" y="0"/>
-          <a:ext cx="0" cy="0"/>
-          <a:chOff x="0" y="0"/>
-          <a:chExt cx="0" cy="0"/>
-        </a:xfrm>
-      </p:grpSpPr>
-      <p:sp>
-        <p:nvSpPr>
-          <p:cNvPr id="2" name="Title 1"/>
-          <p:cNvSpPr>
-            <a:spLocks noGrp="1"/>
-          </p:cNvSpPr>
-          <p:nvPr>
-            <p:ph type="title"/>
-          </p:nvPr>
-        </p:nvSpPr>
-        <p:spPr>
-          <a:xfrm>
-            <a:off x="3669435" y="211671"/>
-            <a:ext cx="4492432" cy="953003"/>
-          </a:xfrm>
-        </p:spPr>
-        <p:txBody>
-          <a:bodyPr>
-            <a:normAutofit/>
-          </a:bodyPr>
-          <a:lstStyle/>
-          <a:p>
-            <a:r>
-              <a:rPr lang="en-US" dirty="0"/>
-              <a:t>Admin - File</a:t>
-            </a:r>
-          </a:p>
-        </p:txBody>
-      </p:sp>
-      <p:pic>
-        <p:nvPicPr>
-          <p:cNvPr id="4" name="Content Placeholder 3"/>
-          <p:cNvPicPr>
-            <a:picLocks noGrp="1" noChangeAspect="1"/>
-          </p:cNvPicPr>
-          <p:nvPr>
-            <p:ph idx="1"/>
-          </p:nvPr>
-        </p:nvPicPr>
-        <p:blipFill>
-          <a:blip r:embed="rId2"/>
-          <a:stretch>
-            <a:fillRect/>
-          </a:stretch>
-        </p:blipFill>
-        <p:spPr>
-          <a:xfrm>
-            <a:off x="3669435" y="1011400"/>
-            <a:ext cx="7215401" cy="5730126"/>
-          </a:xfrm>
-        </p:spPr>
-      </p:pic>
-    </p:spTree>
-    <p:extLst>
-      <p:ext uri="{BB962C8B-B14F-4D97-AF65-F5344CB8AC3E}">
-        <p14:creationId xmlns:p14="http://schemas.microsoft.com/office/powerpoint/2010/main" val="3798796465"/>
-      </p:ext>
-    </p:extLst>
-  </p:cSld>
-  <p:clrMapOvr>
-    <a:masterClrMapping/>
-  </p:clrMapOvr>
-</p:sld>
-</file>
-
-<file path=ppt/slides/slide4.xml><?xml version="1.0" encoding="utf-8"?>
-<p:sld xmlns:a="http://schemas.openxmlformats.org/drawingml/2006/main" xmlns:r="http://schemas.openxmlformats.org/officeDocument/2006/relationships" xmlns:p="http://schemas.openxmlformats.org/presentationml/2006/main">
-  <p:cSld>
-    <p:spTree>
-      <p:nvGrpSpPr>
-        <p:cNvPr id="1" name=""/>
-        <p:cNvGrpSpPr/>
-        <p:nvPr/>
-      </p:nvGrpSpPr>
-      <p:grpSpPr>
-        <a:xfrm>
-          <a:off x="0" y="0"/>
-          <a:ext cx="0" cy="0"/>
-          <a:chOff x="0" y="0"/>
-          <a:chExt cx="0" cy="0"/>
-        </a:xfrm>
-      </p:grpSpPr>
-      <p:sp>
-        <p:nvSpPr>
-          <p:cNvPr id="2" name="Title 1"/>
-          <p:cNvSpPr>
-            <a:spLocks noGrp="1"/>
-          </p:cNvSpPr>
-          <p:nvPr>
-            <p:ph type="title"/>
-          </p:nvPr>
-        </p:nvSpPr>
-        <p:spPr>
-          <a:xfrm>
-            <a:off x="3669435" y="211671"/>
-            <a:ext cx="6549832" cy="953003"/>
-          </a:xfrm>
-        </p:spPr>
-        <p:txBody>
-          <a:bodyPr>
-            <a:normAutofit/>
-          </a:bodyPr>
-          <a:lstStyle/>
-          <a:p>
-            <a:r>
-              <a:rPr lang="en-US" dirty="0"/>
-              <a:t>Admin - Dashboard</a:t>
-            </a:r>
-          </a:p>
-        </p:txBody>
-      </p:sp>
-      <p:pic>
-        <p:nvPicPr>
-          <p:cNvPr id="4" name="Content Placeholder 3"/>
-          <p:cNvPicPr>
-            <a:picLocks noGrp="1" noChangeAspect="1"/>
-          </p:cNvPicPr>
-          <p:nvPr>
-            <p:ph idx="1"/>
-          </p:nvPr>
-        </p:nvPicPr>
-        <p:blipFill>
-          <a:blip r:embed="rId2"/>
-          <a:stretch>
-            <a:fillRect/>
-          </a:stretch>
-        </p:blipFill>
-        <p:spPr>
-          <a:xfrm>
-            <a:off x="3669435" y="1037509"/>
-            <a:ext cx="7221117" cy="5734665"/>
-          </a:xfrm>
-        </p:spPr>
-      </p:pic>
-    </p:spTree>
-    <p:extLst>
-      <p:ext uri="{BB962C8B-B14F-4D97-AF65-F5344CB8AC3E}">
-        <p14:creationId xmlns:p14="http://schemas.microsoft.com/office/powerpoint/2010/main" val="301979160"/>
-      </p:ext>
-    </p:extLst>
-  </p:cSld>
-  <p:clrMapOvr>
-    <a:masterClrMapping/>
-  </p:clrMapOvr>
-</p:sld>
-</file>
-
-<file path=ppt/slides/slide5.xml><?xml version="1.0" encoding="utf-8"?>
-<p:sld xmlns:a="http://schemas.openxmlformats.org/drawingml/2006/main" xmlns:r="http://schemas.openxmlformats.org/officeDocument/2006/relationships" xmlns:p="http://schemas.openxmlformats.org/presentationml/2006/main">
-  <p:cSld>
-    <p:spTree>
-      <p:nvGrpSpPr>
-        <p:cNvPr id="1" name=""/>
-        <p:cNvGrpSpPr/>
-        <p:nvPr/>
-      </p:nvGrpSpPr>
-      <p:grpSpPr>
-        <a:xfrm>
-          <a:off x="0" y="0"/>
-          <a:ext cx="0" cy="0"/>
-          <a:chOff x="0" y="0"/>
-          <a:chExt cx="0" cy="0"/>
-        </a:xfrm>
-      </p:grpSpPr>
-      <p:sp>
-        <p:nvSpPr>
-          <p:cNvPr id="2" name="Title 1"/>
-          <p:cNvSpPr>
-            <a:spLocks noGrp="1"/>
-          </p:cNvSpPr>
-          <p:nvPr>
-            <p:ph type="title"/>
-          </p:nvPr>
-        </p:nvSpPr>
-        <p:spPr>
-          <a:xfrm>
-            <a:off x="3669435" y="211671"/>
-            <a:ext cx="6549832" cy="953003"/>
-          </a:xfrm>
-        </p:spPr>
-        <p:txBody>
-          <a:bodyPr>
-            <a:normAutofit/>
-          </a:bodyPr>
-          <a:lstStyle/>
-          <a:p>
-            <a:r>
-              <a:rPr lang="en-US" dirty="0"/>
-              <a:t>Admin - Help</a:t>
-            </a:r>
-          </a:p>
-        </p:txBody>
-      </p:sp>
-      <p:pic>
-        <p:nvPicPr>
-          <p:cNvPr id="5" name="Content Placeholder 4"/>
-          <p:cNvPicPr>
-            <a:picLocks noGrp="1" noChangeAspect="1"/>
-          </p:cNvPicPr>
-          <p:nvPr>
-            <p:ph idx="1"/>
-          </p:nvPr>
-        </p:nvPicPr>
-        <p:blipFill>
-          <a:blip r:embed="rId2"/>
-          <a:stretch>
-            <a:fillRect/>
-          </a:stretch>
-        </p:blipFill>
-        <p:spPr>
-          <a:xfrm>
-            <a:off x="3669434" y="1093815"/>
-            <a:ext cx="7164296" cy="5689540"/>
-          </a:xfrm>
-        </p:spPr>
-      </p:pic>
-    </p:spTree>
-    <p:extLst>
-      <p:ext uri="{BB962C8B-B14F-4D97-AF65-F5344CB8AC3E}">
-        <p14:creationId xmlns:p14="http://schemas.microsoft.com/office/powerpoint/2010/main" val="3907889059"/>
-      </p:ext>
-    </p:extLst>
-  </p:cSld>
-  <p:clrMapOvr>
-    <a:masterClrMapping/>
-  </p:clrMapOvr>
-</p:sld>
-</file>
-
-<file path=ppt/slides/slide6.xml><?xml version="1.0" encoding="utf-8"?>
-<p:sld xmlns:a="http://schemas.openxmlformats.org/drawingml/2006/main" xmlns:r="http://schemas.openxmlformats.org/officeDocument/2006/relationships" xmlns:p="http://schemas.openxmlformats.org/presentationml/2006/main">
-  <p:cSld>
-    <p:spTree>
-      <p:nvGrpSpPr>
-        <p:cNvPr id="1" name=""/>
-        <p:cNvGrpSpPr/>
-        <p:nvPr/>
-      </p:nvGrpSpPr>
-      <p:grpSpPr>
-        <a:xfrm>
-          <a:off x="0" y="0"/>
-          <a:ext cx="0" cy="0"/>
-          <a:chOff x="0" y="0"/>
-          <a:chExt cx="0" cy="0"/>
-        </a:xfrm>
-      </p:grpSpPr>
       <p:pic>
         <p:nvPicPr>
           <p:cNvPr id="4" name="Content Placeholder 3"/>
@@ -8695,7 +7817,7 @@
     </p:spTree>
     <p:extLst>
       <p:ext uri="{BB962C8B-B14F-4D97-AF65-F5344CB8AC3E}">
-        <p14:creationId xmlns:p14="http://schemas.microsoft.com/office/powerpoint/2010/main" val="787477562"/>
+        <p14:creationId xmlns:p14="http://schemas.microsoft.com/office/powerpoint/2010/main" val="3571432278"/>
       </p:ext>
     </p:extLst>
   </p:cSld>
@@ -8705,171 +7827,7 @@
 </p:sld>
 </file>
 
-<file path=ppt/slides/slide7.xml><?xml version="1.0" encoding="utf-8"?>
-<p:sld xmlns:a="http://schemas.openxmlformats.org/drawingml/2006/main" xmlns:r="http://schemas.openxmlformats.org/officeDocument/2006/relationships" xmlns:p="http://schemas.openxmlformats.org/presentationml/2006/main">
-  <p:cSld>
-    <p:spTree>
-      <p:nvGrpSpPr>
-        <p:cNvPr id="1" name=""/>
-        <p:cNvGrpSpPr/>
-        <p:nvPr/>
-      </p:nvGrpSpPr>
-      <p:grpSpPr>
-        <a:xfrm>
-          <a:off x="0" y="0"/>
-          <a:ext cx="0" cy="0"/>
-          <a:chOff x="0" y="0"/>
-          <a:chExt cx="0" cy="0"/>
-        </a:xfrm>
-      </p:grpSpPr>
-      <p:sp>
-        <p:nvSpPr>
-          <p:cNvPr id="2" name="Title 1"/>
-          <p:cNvSpPr>
-            <a:spLocks noGrp="1"/>
-          </p:cNvSpPr>
-          <p:nvPr>
-            <p:ph type="title"/>
-          </p:nvPr>
-        </p:nvSpPr>
-        <p:spPr>
-          <a:xfrm>
-            <a:off x="3669435" y="211671"/>
-            <a:ext cx="6549832" cy="953003"/>
-          </a:xfrm>
-        </p:spPr>
-        <p:txBody>
-          <a:bodyPr>
-            <a:normAutofit/>
-          </a:bodyPr>
-          <a:lstStyle/>
-          <a:p>
-            <a:r>
-              <a:rPr lang="en-US" dirty="0"/>
-              <a:t>Dashboard - Category</a:t>
-            </a:r>
-          </a:p>
-        </p:txBody>
-      </p:sp>
-      <p:pic>
-        <p:nvPicPr>
-          <p:cNvPr id="5" name="Content Placeholder 4"/>
-          <p:cNvPicPr>
-            <a:picLocks noGrp="1" noChangeAspect="1"/>
-          </p:cNvPicPr>
-          <p:nvPr>
-            <p:ph idx="1"/>
-          </p:nvPr>
-        </p:nvPicPr>
-        <p:blipFill>
-          <a:blip r:embed="rId2"/>
-          <a:stretch>
-            <a:fillRect/>
-          </a:stretch>
-        </p:blipFill>
-        <p:spPr>
-          <a:xfrm>
-            <a:off x="2178104" y="1380931"/>
-            <a:ext cx="9754621" cy="5053736"/>
-          </a:xfrm>
-        </p:spPr>
-      </p:pic>
-    </p:spTree>
-    <p:extLst>
-      <p:ext uri="{BB962C8B-B14F-4D97-AF65-F5344CB8AC3E}">
-        <p14:creationId xmlns:p14="http://schemas.microsoft.com/office/powerpoint/2010/main" val="693535125"/>
-      </p:ext>
-    </p:extLst>
-  </p:cSld>
-  <p:clrMapOvr>
-    <a:masterClrMapping/>
-  </p:clrMapOvr>
-</p:sld>
-</file>
-
-<file path=ppt/slides/slide8.xml><?xml version="1.0" encoding="utf-8"?>
-<p:sld xmlns:a="http://schemas.openxmlformats.org/drawingml/2006/main" xmlns:r="http://schemas.openxmlformats.org/officeDocument/2006/relationships" xmlns:p="http://schemas.openxmlformats.org/presentationml/2006/main">
-  <p:cSld>
-    <p:spTree>
-      <p:nvGrpSpPr>
-        <p:cNvPr id="1" name=""/>
-        <p:cNvGrpSpPr/>
-        <p:nvPr/>
-      </p:nvGrpSpPr>
-      <p:grpSpPr>
-        <a:xfrm>
-          <a:off x="0" y="0"/>
-          <a:ext cx="0" cy="0"/>
-          <a:chOff x="0" y="0"/>
-          <a:chExt cx="0" cy="0"/>
-        </a:xfrm>
-      </p:grpSpPr>
-      <p:sp>
-        <p:nvSpPr>
-          <p:cNvPr id="2" name="Title 1"/>
-          <p:cNvSpPr>
-            <a:spLocks noGrp="1"/>
-          </p:cNvSpPr>
-          <p:nvPr>
-            <p:ph type="title"/>
-          </p:nvPr>
-        </p:nvSpPr>
-        <p:spPr>
-          <a:xfrm>
-            <a:off x="189116" y="1284691"/>
-            <a:ext cx="2787349" cy="2624836"/>
-          </a:xfrm>
-        </p:spPr>
-        <p:txBody>
-          <a:bodyPr>
-            <a:normAutofit/>
-          </a:bodyPr>
-          <a:lstStyle/>
-          <a:p>
-            <a:r>
-              <a:rPr lang="en-US" dirty="0"/>
-              <a:t>Dashboard - Products</a:t>
-            </a:r>
-          </a:p>
-        </p:txBody>
-      </p:sp>
-      <p:pic>
-        <p:nvPicPr>
-          <p:cNvPr id="5" name="Content Placeholder 4"/>
-          <p:cNvPicPr>
-            <a:picLocks noGrp="1" noChangeAspect="1"/>
-          </p:cNvPicPr>
-          <p:nvPr>
-            <p:ph idx="1"/>
-          </p:nvPr>
-        </p:nvPicPr>
-        <p:blipFill>
-          <a:blip r:embed="rId2"/>
-          <a:stretch>
-            <a:fillRect/>
-          </a:stretch>
-        </p:blipFill>
-        <p:spPr>
-          <a:xfrm>
-            <a:off x="3191068" y="1"/>
-            <a:ext cx="8826215" cy="6858000"/>
-          </a:xfrm>
-        </p:spPr>
-      </p:pic>
-    </p:spTree>
-    <p:extLst>
-      <p:ext uri="{BB962C8B-B14F-4D97-AF65-F5344CB8AC3E}">
-        <p14:creationId xmlns:p14="http://schemas.microsoft.com/office/powerpoint/2010/main" val="3695523249"/>
-      </p:ext>
-    </p:extLst>
-  </p:cSld>
-  <p:clrMapOvr>
-    <a:masterClrMapping/>
-  </p:clrMapOvr>
-</p:sld>
-</file>
-
-<file path=ppt/slides/slide9.xml><?xml version="1.0" encoding="utf-8"?>
+<file path=ppt/slides/slide11.xml><?xml version="1.0" encoding="utf-8"?>
 <p:sld xmlns:a="http://schemas.openxmlformats.org/drawingml/2006/main" xmlns:r="http://schemas.openxmlformats.org/officeDocument/2006/relationships" xmlns:p="http://schemas.openxmlformats.org/presentationml/2006/main">
   <p:cSld>
     <p:spTree>
@@ -9047,7 +8005,1049 @@
     </p:spTree>
     <p:extLst>
       <p:ext uri="{BB962C8B-B14F-4D97-AF65-F5344CB8AC3E}">
-        <p14:creationId xmlns:p14="http://schemas.microsoft.com/office/powerpoint/2010/main" val="3220071496"/>
+        <p14:creationId xmlns:p14="http://schemas.microsoft.com/office/powerpoint/2010/main" val="3968349883"/>
+      </p:ext>
+    </p:extLst>
+  </p:cSld>
+  <p:clrMapOvr>
+    <a:masterClrMapping/>
+  </p:clrMapOvr>
+</p:sld>
+</file>
+
+<file path=ppt/slides/slide12.xml><?xml version="1.0" encoding="utf-8"?>
+<p:sld xmlns:a="http://schemas.openxmlformats.org/drawingml/2006/main" xmlns:r="http://schemas.openxmlformats.org/officeDocument/2006/relationships" xmlns:p="http://schemas.openxmlformats.org/presentationml/2006/main">
+  <p:cSld>
+    <p:spTree>
+      <p:nvGrpSpPr>
+        <p:cNvPr id="1" name=""/>
+        <p:cNvGrpSpPr/>
+        <p:nvPr/>
+      </p:nvGrpSpPr>
+      <p:grpSpPr>
+        <a:xfrm>
+          <a:off x="0" y="0"/>
+          <a:ext cx="0" cy="0"/>
+          <a:chOff x="0" y="0"/>
+          <a:chExt cx="0" cy="0"/>
+        </a:xfrm>
+      </p:grpSpPr>
+      <p:pic>
+        <p:nvPicPr>
+          <p:cNvPr id="5" name="Content Placeholder 4"/>
+          <p:cNvPicPr>
+            <a:picLocks noGrp="1" noChangeAspect="1"/>
+          </p:cNvPicPr>
+          <p:nvPr>
+            <p:ph idx="1"/>
+          </p:nvPr>
+        </p:nvPicPr>
+        <p:blipFill>
+          <a:blip r:embed="rId2"/>
+          <a:stretch>
+            <a:fillRect/>
+          </a:stretch>
+        </p:blipFill>
+        <p:spPr>
+          <a:xfrm>
+            <a:off x="1744910" y="31879"/>
+            <a:ext cx="10251347" cy="5435496"/>
+          </a:xfrm>
+        </p:spPr>
+      </p:pic>
+      <p:pic>
+        <p:nvPicPr>
+          <p:cNvPr id="6" name="Picture 5"/>
+          <p:cNvPicPr>
+            <a:picLocks noChangeAspect="1"/>
+          </p:cNvPicPr>
+          <p:nvPr/>
+        </p:nvPicPr>
+        <p:blipFill>
+          <a:blip r:embed="rId3"/>
+          <a:stretch>
+            <a:fillRect/>
+          </a:stretch>
+        </p:blipFill>
+        <p:spPr>
+          <a:xfrm>
+            <a:off x="345234" y="5671502"/>
+            <a:ext cx="11651024" cy="1094663"/>
+          </a:xfrm>
+          <a:prstGeom prst="rect">
+            <a:avLst/>
+          </a:prstGeom>
+        </p:spPr>
+      </p:pic>
+      <p:sp>
+        <p:nvSpPr>
+          <p:cNvPr id="2" name="Title 1"/>
+          <p:cNvSpPr>
+            <a:spLocks noGrp="1"/>
+          </p:cNvSpPr>
+          <p:nvPr>
+            <p:ph type="title"/>
+          </p:nvPr>
+        </p:nvSpPr>
+        <p:spPr>
+          <a:xfrm>
+            <a:off x="6848862" y="1344186"/>
+            <a:ext cx="4098771" cy="652395"/>
+          </a:xfrm>
+        </p:spPr>
+        <p:txBody>
+          <a:bodyPr>
+            <a:normAutofit/>
+          </a:bodyPr>
+          <a:lstStyle/>
+          <a:p>
+            <a:r>
+              <a:rPr lang="en-US" sz="3200" dirty="0">
+                <a:solidFill>
+                  <a:schemeClr val="bg1"/>
+                </a:solidFill>
+                <a:highlight>
+                  <a:srgbClr val="800000"/>
+                </a:highlight>
+              </a:rPr>
+              <a:t>Treeview challenge</a:t>
+            </a:r>
+          </a:p>
+        </p:txBody>
+      </p:sp>
+    </p:spTree>
+    <p:extLst>
+      <p:ext uri="{BB962C8B-B14F-4D97-AF65-F5344CB8AC3E}">
+        <p14:creationId xmlns:p14="http://schemas.microsoft.com/office/powerpoint/2010/main" val="3901771764"/>
+      </p:ext>
+    </p:extLst>
+  </p:cSld>
+  <p:clrMapOvr>
+    <a:masterClrMapping/>
+  </p:clrMapOvr>
+</p:sld>
+</file>
+
+<file path=ppt/slides/slide13.xml><?xml version="1.0" encoding="utf-8"?>
+<p:sld xmlns:a="http://schemas.openxmlformats.org/drawingml/2006/main" xmlns:r="http://schemas.openxmlformats.org/officeDocument/2006/relationships" xmlns:p="http://schemas.openxmlformats.org/presentationml/2006/main">
+  <p:cSld>
+    <p:spTree>
+      <p:nvGrpSpPr>
+        <p:cNvPr id="1" name=""/>
+        <p:cNvGrpSpPr/>
+        <p:nvPr/>
+      </p:nvGrpSpPr>
+      <p:grpSpPr>
+        <a:xfrm>
+          <a:off x="0" y="0"/>
+          <a:ext cx="0" cy="0"/>
+          <a:chOff x="0" y="0"/>
+          <a:chExt cx="0" cy="0"/>
+        </a:xfrm>
+      </p:grpSpPr>
+      <p:sp>
+        <p:nvSpPr>
+          <p:cNvPr id="2" name="Title 1"/>
+          <p:cNvSpPr>
+            <a:spLocks noGrp="1"/>
+          </p:cNvSpPr>
+          <p:nvPr>
+            <p:ph type="title"/>
+          </p:nvPr>
+        </p:nvSpPr>
+        <p:spPr>
+          <a:xfrm>
+            <a:off x="2343611" y="636451"/>
+            <a:ext cx="8925886" cy="729842"/>
+          </a:xfrm>
+        </p:spPr>
+        <p:txBody>
+          <a:bodyPr>
+            <a:normAutofit/>
+          </a:bodyPr>
+          <a:lstStyle/>
+          <a:p>
+            <a:r>
+              <a:rPr lang="en-US" sz="3200" dirty="0">
+                <a:solidFill>
+                  <a:schemeClr val="bg1"/>
+                </a:solidFill>
+                <a:highlight>
+                  <a:srgbClr val="800000"/>
+                </a:highlight>
+              </a:rPr>
+              <a:t>Open a Word or Excel document challenge</a:t>
+            </a:r>
+          </a:p>
+        </p:txBody>
+      </p:sp>
+      <p:sp>
+        <p:nvSpPr>
+          <p:cNvPr id="3" name="Content Placeholder 2"/>
+          <p:cNvSpPr>
+            <a:spLocks noGrp="1"/>
+          </p:cNvSpPr>
+          <p:nvPr>
+            <p:ph idx="1"/>
+          </p:nvPr>
+        </p:nvSpPr>
+        <p:spPr>
+          <a:xfrm>
+            <a:off x="2080470" y="1686187"/>
+            <a:ext cx="9424142" cy="2449585"/>
+          </a:xfrm>
+        </p:spPr>
+        <p:txBody>
+          <a:bodyPr>
+            <a:normAutofit lnSpcReduction="10000"/>
+          </a:bodyPr>
+          <a:lstStyle/>
+          <a:p>
+            <a:r>
+              <a:rPr lang="en-US" dirty="0"/>
+              <a:t>We don't have the necessary .</a:t>
+            </a:r>
+            <a:r>
+              <a:rPr lang="en-US" dirty="0" err="1"/>
+              <a:t>dll</a:t>
+            </a:r>
+            <a:r>
+              <a:rPr lang="en-US" dirty="0"/>
+              <a:t> file to use </a:t>
+            </a:r>
+            <a:r>
+              <a:rPr lang="en-US" dirty="0" err="1"/>
+              <a:t>Microsoft.Office</a:t>
+            </a:r>
+            <a:r>
+              <a:rPr lang="en-US" dirty="0"/>
+              <a:t> components, so first of all we need to add the </a:t>
+            </a:r>
+            <a:r>
+              <a:rPr lang="en-US" dirty="0" err="1"/>
+              <a:t>dll</a:t>
+            </a:r>
+            <a:r>
+              <a:rPr lang="en-US" dirty="0"/>
+              <a:t> file:</a:t>
+            </a:r>
+          </a:p>
+          <a:p>
+            <a:r>
+              <a:rPr lang="en-US" dirty="0"/>
+              <a:t>On the Project menu, click Add Reference.</a:t>
+            </a:r>
+          </a:p>
+          <a:p>
+            <a:r>
+              <a:rPr lang="en-US" dirty="0"/>
+              <a:t>On the COM tab, locate Microsoft Word or Excel Object Library, and then Select it on the COM tab.</a:t>
+            </a:r>
+          </a:p>
+          <a:p>
+            <a:r>
+              <a:rPr lang="en-US" dirty="0"/>
+              <a:t>Click OK in the Add References dialog box to accept your selections.</a:t>
+            </a:r>
+          </a:p>
+          <a:p>
+            <a:r>
+              <a:rPr lang="en-US" dirty="0"/>
+              <a:t>Add the following chunk of code to open the Word document.</a:t>
+            </a:r>
+          </a:p>
+          <a:p>
+            <a:endParaRPr lang="en-US" dirty="0"/>
+          </a:p>
+        </p:txBody>
+      </p:sp>
+      <p:pic>
+        <p:nvPicPr>
+          <p:cNvPr id="4" name="Picture 3"/>
+          <p:cNvPicPr>
+            <a:picLocks noChangeAspect="1"/>
+          </p:cNvPicPr>
+          <p:nvPr/>
+        </p:nvPicPr>
+        <p:blipFill>
+          <a:blip r:embed="rId2"/>
+          <a:stretch>
+            <a:fillRect/>
+          </a:stretch>
+        </p:blipFill>
+        <p:spPr>
+          <a:xfrm>
+            <a:off x="2080470" y="4584630"/>
+            <a:ext cx="8127220" cy="2058765"/>
+          </a:xfrm>
+          <a:prstGeom prst="rect">
+            <a:avLst/>
+          </a:prstGeom>
+        </p:spPr>
+      </p:pic>
+    </p:spTree>
+    <p:extLst>
+      <p:ext uri="{BB962C8B-B14F-4D97-AF65-F5344CB8AC3E}">
+        <p14:creationId xmlns:p14="http://schemas.microsoft.com/office/powerpoint/2010/main" val="2341744161"/>
+      </p:ext>
+    </p:extLst>
+  </p:cSld>
+  <p:clrMapOvr>
+    <a:masterClrMapping/>
+  </p:clrMapOvr>
+</p:sld>
+</file>
+
+<file path=ppt/slides/slide14.xml><?xml version="1.0" encoding="utf-8"?>
+<p:sld xmlns:a="http://schemas.openxmlformats.org/drawingml/2006/main" xmlns:r="http://schemas.openxmlformats.org/officeDocument/2006/relationships" xmlns:p="http://schemas.openxmlformats.org/presentationml/2006/main">
+  <p:cSld>
+    <p:spTree>
+      <p:nvGrpSpPr>
+        <p:cNvPr id="1" name=""/>
+        <p:cNvGrpSpPr/>
+        <p:nvPr/>
+      </p:nvGrpSpPr>
+      <p:grpSpPr>
+        <a:xfrm>
+          <a:off x="0" y="0"/>
+          <a:ext cx="0" cy="0"/>
+          <a:chOff x="0" y="0"/>
+          <a:chExt cx="0" cy="0"/>
+        </a:xfrm>
+      </p:grpSpPr>
+      <p:sp>
+        <p:nvSpPr>
+          <p:cNvPr id="2" name="Title 1"/>
+          <p:cNvSpPr>
+            <a:spLocks noGrp="1"/>
+          </p:cNvSpPr>
+          <p:nvPr>
+            <p:ph type="title"/>
+          </p:nvPr>
+        </p:nvSpPr>
+        <p:spPr/>
+        <p:txBody>
+          <a:bodyPr/>
+          <a:lstStyle/>
+          <a:p>
+            <a:r>
+              <a:rPr lang="en-US" dirty="0"/>
+              <a:t>For the future</a:t>
+            </a:r>
+          </a:p>
+        </p:txBody>
+      </p:sp>
+      <p:sp>
+        <p:nvSpPr>
+          <p:cNvPr id="3" name="Content Placeholder 2"/>
+          <p:cNvSpPr>
+            <a:spLocks noGrp="1"/>
+          </p:cNvSpPr>
+          <p:nvPr>
+            <p:ph idx="1"/>
+          </p:nvPr>
+        </p:nvSpPr>
+        <p:spPr/>
+        <p:txBody>
+          <a:bodyPr/>
+          <a:lstStyle/>
+          <a:p>
+            <a:r>
+              <a:rPr lang="en-US" dirty="0"/>
+              <a:t>Completing report</a:t>
+            </a:r>
+          </a:p>
+          <a:p>
+            <a:r>
+              <a:rPr lang="en-US" dirty="0"/>
+              <a:t>Adding a window for about page</a:t>
+            </a:r>
+          </a:p>
+          <a:p>
+            <a:r>
+              <a:rPr lang="en-US" dirty="0"/>
+              <a:t>Making more powerful search for Order page</a:t>
+            </a:r>
+          </a:p>
+          <a:p>
+            <a:r>
+              <a:rPr lang="en-US" dirty="0"/>
+              <a:t>Adding Barcode</a:t>
+            </a:r>
+          </a:p>
+          <a:p>
+            <a:r>
+              <a:rPr lang="en-US" dirty="0"/>
+              <a:t>Making more </a:t>
+            </a:r>
+            <a:r>
+              <a:rPr lang="en-US"/>
+              <a:t>powerful field checking</a:t>
+            </a:r>
+            <a:endParaRPr lang="en-US" dirty="0"/>
+          </a:p>
+        </p:txBody>
+      </p:sp>
+    </p:spTree>
+    <p:extLst>
+      <p:ext uri="{BB962C8B-B14F-4D97-AF65-F5344CB8AC3E}">
+        <p14:creationId xmlns:p14="http://schemas.microsoft.com/office/powerpoint/2010/main" val="900369380"/>
+      </p:ext>
+    </p:extLst>
+  </p:cSld>
+  <p:clrMapOvr>
+    <a:masterClrMapping/>
+  </p:clrMapOvr>
+</p:sld>
+</file>
+
+<file path=ppt/slides/slide2.xml><?xml version="1.0" encoding="utf-8"?>
+<p:sld xmlns:a="http://schemas.openxmlformats.org/drawingml/2006/main" xmlns:r="http://schemas.openxmlformats.org/officeDocument/2006/relationships" xmlns:p="http://schemas.openxmlformats.org/presentationml/2006/main">
+  <p:cSld>
+    <p:spTree>
+      <p:nvGrpSpPr>
+        <p:cNvPr id="1" name=""/>
+        <p:cNvGrpSpPr/>
+        <p:nvPr/>
+      </p:nvGrpSpPr>
+      <p:grpSpPr>
+        <a:xfrm>
+          <a:off x="0" y="0"/>
+          <a:ext cx="0" cy="0"/>
+          <a:chOff x="0" y="0"/>
+          <a:chExt cx="0" cy="0"/>
+        </a:xfrm>
+      </p:grpSpPr>
+      <p:sp>
+        <p:nvSpPr>
+          <p:cNvPr id="2" name="Title 1"/>
+          <p:cNvSpPr>
+            <a:spLocks noGrp="1"/>
+          </p:cNvSpPr>
+          <p:nvPr>
+            <p:ph type="title"/>
+          </p:nvPr>
+        </p:nvSpPr>
+        <p:spPr>
+          <a:xfrm>
+            <a:off x="3669435" y="211671"/>
+            <a:ext cx="4492432" cy="953003"/>
+          </a:xfrm>
+        </p:spPr>
+        <p:txBody>
+          <a:bodyPr>
+            <a:normAutofit/>
+          </a:bodyPr>
+          <a:lstStyle/>
+          <a:p>
+            <a:r>
+              <a:rPr lang="en-US" dirty="0"/>
+              <a:t>Login page</a:t>
+            </a:r>
+          </a:p>
+        </p:txBody>
+      </p:sp>
+      <p:pic>
+        <p:nvPicPr>
+          <p:cNvPr id="6" name="Content Placeholder 5"/>
+          <p:cNvPicPr>
+            <a:picLocks noGrp="1" noChangeAspect="1"/>
+          </p:cNvPicPr>
+          <p:nvPr>
+            <p:ph idx="1"/>
+          </p:nvPr>
+        </p:nvPicPr>
+        <p:blipFill>
+          <a:blip r:embed="rId2"/>
+          <a:stretch>
+            <a:fillRect/>
+          </a:stretch>
+        </p:blipFill>
+        <p:spPr>
+          <a:xfrm>
+            <a:off x="3643533" y="1903445"/>
+            <a:ext cx="6262291" cy="4149248"/>
+          </a:xfrm>
+        </p:spPr>
+      </p:pic>
+    </p:spTree>
+    <p:extLst>
+      <p:ext uri="{BB962C8B-B14F-4D97-AF65-F5344CB8AC3E}">
+        <p14:creationId xmlns:p14="http://schemas.microsoft.com/office/powerpoint/2010/main" val="2848497588"/>
+      </p:ext>
+    </p:extLst>
+  </p:cSld>
+  <p:clrMapOvr>
+    <a:masterClrMapping/>
+  </p:clrMapOvr>
+</p:sld>
+</file>
+
+<file path=ppt/slides/slide3.xml><?xml version="1.0" encoding="utf-8"?>
+<p:sld xmlns:a="http://schemas.openxmlformats.org/drawingml/2006/main" xmlns:r="http://schemas.openxmlformats.org/officeDocument/2006/relationships" xmlns:p="http://schemas.openxmlformats.org/presentationml/2006/main">
+  <p:cSld>
+    <p:spTree>
+      <p:nvGrpSpPr>
+        <p:cNvPr id="1" name=""/>
+        <p:cNvGrpSpPr/>
+        <p:nvPr/>
+      </p:nvGrpSpPr>
+      <p:grpSpPr>
+        <a:xfrm>
+          <a:off x="0" y="0"/>
+          <a:ext cx="0" cy="0"/>
+          <a:chOff x="0" y="0"/>
+          <a:chExt cx="0" cy="0"/>
+        </a:xfrm>
+      </p:grpSpPr>
+      <p:sp>
+        <p:nvSpPr>
+          <p:cNvPr id="2" name="Title 1"/>
+          <p:cNvSpPr>
+            <a:spLocks noGrp="1"/>
+          </p:cNvSpPr>
+          <p:nvPr>
+            <p:ph type="title"/>
+          </p:nvPr>
+        </p:nvSpPr>
+        <p:spPr>
+          <a:xfrm>
+            <a:off x="3669435" y="211671"/>
+            <a:ext cx="4492432" cy="953003"/>
+          </a:xfrm>
+        </p:spPr>
+        <p:txBody>
+          <a:bodyPr>
+            <a:normAutofit/>
+          </a:bodyPr>
+          <a:lstStyle/>
+          <a:p>
+            <a:r>
+              <a:rPr lang="en-US" dirty="0"/>
+              <a:t>Admin - File</a:t>
+            </a:r>
+          </a:p>
+        </p:txBody>
+      </p:sp>
+      <p:pic>
+        <p:nvPicPr>
+          <p:cNvPr id="4" name="Content Placeholder 3"/>
+          <p:cNvPicPr>
+            <a:picLocks noGrp="1" noChangeAspect="1"/>
+          </p:cNvPicPr>
+          <p:nvPr>
+            <p:ph idx="1"/>
+          </p:nvPr>
+        </p:nvPicPr>
+        <p:blipFill>
+          <a:blip r:embed="rId2"/>
+          <a:stretch>
+            <a:fillRect/>
+          </a:stretch>
+        </p:blipFill>
+        <p:spPr>
+          <a:xfrm>
+            <a:off x="3669435" y="1011400"/>
+            <a:ext cx="7215401" cy="5730126"/>
+          </a:xfrm>
+        </p:spPr>
+      </p:pic>
+    </p:spTree>
+    <p:extLst>
+      <p:ext uri="{BB962C8B-B14F-4D97-AF65-F5344CB8AC3E}">
+        <p14:creationId xmlns:p14="http://schemas.microsoft.com/office/powerpoint/2010/main" val="3798796465"/>
+      </p:ext>
+    </p:extLst>
+  </p:cSld>
+  <p:clrMapOvr>
+    <a:masterClrMapping/>
+  </p:clrMapOvr>
+</p:sld>
+</file>
+
+<file path=ppt/slides/slide4.xml><?xml version="1.0" encoding="utf-8"?>
+<p:sld xmlns:a="http://schemas.openxmlformats.org/drawingml/2006/main" xmlns:r="http://schemas.openxmlformats.org/officeDocument/2006/relationships" xmlns:p="http://schemas.openxmlformats.org/presentationml/2006/main">
+  <p:cSld>
+    <p:spTree>
+      <p:nvGrpSpPr>
+        <p:cNvPr id="1" name=""/>
+        <p:cNvGrpSpPr/>
+        <p:nvPr/>
+      </p:nvGrpSpPr>
+      <p:grpSpPr>
+        <a:xfrm>
+          <a:off x="0" y="0"/>
+          <a:ext cx="0" cy="0"/>
+          <a:chOff x="0" y="0"/>
+          <a:chExt cx="0" cy="0"/>
+        </a:xfrm>
+      </p:grpSpPr>
+      <p:sp>
+        <p:nvSpPr>
+          <p:cNvPr id="2" name="Title 1"/>
+          <p:cNvSpPr>
+            <a:spLocks noGrp="1"/>
+          </p:cNvSpPr>
+          <p:nvPr>
+            <p:ph type="title"/>
+          </p:nvPr>
+        </p:nvSpPr>
+        <p:spPr>
+          <a:xfrm>
+            <a:off x="3669435" y="211671"/>
+            <a:ext cx="6549832" cy="953003"/>
+          </a:xfrm>
+        </p:spPr>
+        <p:txBody>
+          <a:bodyPr>
+            <a:normAutofit/>
+          </a:bodyPr>
+          <a:lstStyle/>
+          <a:p>
+            <a:r>
+              <a:rPr lang="en-US" dirty="0"/>
+              <a:t>Admin - Dashboard</a:t>
+            </a:r>
+          </a:p>
+        </p:txBody>
+      </p:sp>
+      <p:pic>
+        <p:nvPicPr>
+          <p:cNvPr id="4" name="Content Placeholder 3"/>
+          <p:cNvPicPr>
+            <a:picLocks noGrp="1" noChangeAspect="1"/>
+          </p:cNvPicPr>
+          <p:nvPr>
+            <p:ph idx="1"/>
+          </p:nvPr>
+        </p:nvPicPr>
+        <p:blipFill>
+          <a:blip r:embed="rId2"/>
+          <a:stretch>
+            <a:fillRect/>
+          </a:stretch>
+        </p:blipFill>
+        <p:spPr>
+          <a:xfrm>
+            <a:off x="3669435" y="1037509"/>
+            <a:ext cx="7221117" cy="5734665"/>
+          </a:xfrm>
+        </p:spPr>
+      </p:pic>
+    </p:spTree>
+    <p:extLst>
+      <p:ext uri="{BB962C8B-B14F-4D97-AF65-F5344CB8AC3E}">
+        <p14:creationId xmlns:p14="http://schemas.microsoft.com/office/powerpoint/2010/main" val="301979160"/>
+      </p:ext>
+    </p:extLst>
+  </p:cSld>
+  <p:clrMapOvr>
+    <a:masterClrMapping/>
+  </p:clrMapOvr>
+</p:sld>
+</file>
+
+<file path=ppt/slides/slide5.xml><?xml version="1.0" encoding="utf-8"?>
+<p:sld xmlns:a="http://schemas.openxmlformats.org/drawingml/2006/main" xmlns:r="http://schemas.openxmlformats.org/officeDocument/2006/relationships" xmlns:p="http://schemas.openxmlformats.org/presentationml/2006/main">
+  <p:cSld>
+    <p:spTree>
+      <p:nvGrpSpPr>
+        <p:cNvPr id="1" name=""/>
+        <p:cNvGrpSpPr/>
+        <p:nvPr/>
+      </p:nvGrpSpPr>
+      <p:grpSpPr>
+        <a:xfrm>
+          <a:off x="0" y="0"/>
+          <a:ext cx="0" cy="0"/>
+          <a:chOff x="0" y="0"/>
+          <a:chExt cx="0" cy="0"/>
+        </a:xfrm>
+      </p:grpSpPr>
+      <p:sp>
+        <p:nvSpPr>
+          <p:cNvPr id="2" name="Title 1"/>
+          <p:cNvSpPr>
+            <a:spLocks noGrp="1"/>
+          </p:cNvSpPr>
+          <p:nvPr>
+            <p:ph type="title"/>
+          </p:nvPr>
+        </p:nvSpPr>
+        <p:spPr>
+          <a:xfrm>
+            <a:off x="3669435" y="211671"/>
+            <a:ext cx="6549832" cy="953003"/>
+          </a:xfrm>
+        </p:spPr>
+        <p:txBody>
+          <a:bodyPr>
+            <a:normAutofit/>
+          </a:bodyPr>
+          <a:lstStyle/>
+          <a:p>
+            <a:r>
+              <a:rPr lang="en-US" dirty="0"/>
+              <a:t>Admin - Help</a:t>
+            </a:r>
+          </a:p>
+        </p:txBody>
+      </p:sp>
+      <p:pic>
+        <p:nvPicPr>
+          <p:cNvPr id="5" name="Content Placeholder 4"/>
+          <p:cNvPicPr>
+            <a:picLocks noGrp="1" noChangeAspect="1"/>
+          </p:cNvPicPr>
+          <p:nvPr>
+            <p:ph idx="1"/>
+          </p:nvPr>
+        </p:nvPicPr>
+        <p:blipFill>
+          <a:blip r:embed="rId2"/>
+          <a:stretch>
+            <a:fillRect/>
+          </a:stretch>
+        </p:blipFill>
+        <p:spPr>
+          <a:xfrm>
+            <a:off x="3669434" y="1093815"/>
+            <a:ext cx="7164296" cy="5689540"/>
+          </a:xfrm>
+        </p:spPr>
+      </p:pic>
+    </p:spTree>
+    <p:extLst>
+      <p:ext uri="{BB962C8B-B14F-4D97-AF65-F5344CB8AC3E}">
+        <p14:creationId xmlns:p14="http://schemas.microsoft.com/office/powerpoint/2010/main" val="3907889059"/>
+      </p:ext>
+    </p:extLst>
+  </p:cSld>
+  <p:clrMapOvr>
+    <a:masterClrMapping/>
+  </p:clrMapOvr>
+</p:sld>
+</file>
+
+<file path=ppt/slides/slide6.xml><?xml version="1.0" encoding="utf-8"?>
+<p:sld xmlns:a="http://schemas.openxmlformats.org/drawingml/2006/main" xmlns:r="http://schemas.openxmlformats.org/officeDocument/2006/relationships" xmlns:p="http://schemas.openxmlformats.org/presentationml/2006/main">
+  <p:cSld>
+    <p:spTree>
+      <p:nvGrpSpPr>
+        <p:cNvPr id="1" name=""/>
+        <p:cNvGrpSpPr/>
+        <p:nvPr/>
+      </p:nvGrpSpPr>
+      <p:grpSpPr>
+        <a:xfrm>
+          <a:off x="0" y="0"/>
+          <a:ext cx="0" cy="0"/>
+          <a:chOff x="0" y="0"/>
+          <a:chExt cx="0" cy="0"/>
+        </a:xfrm>
+      </p:grpSpPr>
+      <p:sp>
+        <p:nvSpPr>
+          <p:cNvPr id="2" name="Title 1"/>
+          <p:cNvSpPr>
+            <a:spLocks noGrp="1"/>
+          </p:cNvSpPr>
+          <p:nvPr>
+            <p:ph type="title"/>
+          </p:nvPr>
+        </p:nvSpPr>
+        <p:spPr>
+          <a:xfrm>
+            <a:off x="3669435" y="211671"/>
+            <a:ext cx="6549832" cy="953003"/>
+          </a:xfrm>
+        </p:spPr>
+        <p:txBody>
+          <a:bodyPr>
+            <a:normAutofit/>
+          </a:bodyPr>
+          <a:lstStyle/>
+          <a:p>
+            <a:r>
+              <a:rPr lang="en-US" dirty="0"/>
+              <a:t>Dashboard - Category</a:t>
+            </a:r>
+          </a:p>
+        </p:txBody>
+      </p:sp>
+      <p:pic>
+        <p:nvPicPr>
+          <p:cNvPr id="5" name="Content Placeholder 4"/>
+          <p:cNvPicPr>
+            <a:picLocks noGrp="1" noChangeAspect="1"/>
+          </p:cNvPicPr>
+          <p:nvPr>
+            <p:ph idx="1"/>
+          </p:nvPr>
+        </p:nvPicPr>
+        <p:blipFill>
+          <a:blip r:embed="rId2"/>
+          <a:stretch>
+            <a:fillRect/>
+          </a:stretch>
+        </p:blipFill>
+        <p:spPr>
+          <a:xfrm>
+            <a:off x="2178104" y="1380931"/>
+            <a:ext cx="9754621" cy="5053736"/>
+          </a:xfrm>
+        </p:spPr>
+      </p:pic>
+    </p:spTree>
+    <p:extLst>
+      <p:ext uri="{BB962C8B-B14F-4D97-AF65-F5344CB8AC3E}">
+        <p14:creationId xmlns:p14="http://schemas.microsoft.com/office/powerpoint/2010/main" val="693535125"/>
+      </p:ext>
+    </p:extLst>
+  </p:cSld>
+  <p:clrMapOvr>
+    <a:masterClrMapping/>
+  </p:clrMapOvr>
+</p:sld>
+</file>
+
+<file path=ppt/slides/slide7.xml><?xml version="1.0" encoding="utf-8"?>
+<p:sld xmlns:a="http://schemas.openxmlformats.org/drawingml/2006/main" xmlns:r="http://schemas.openxmlformats.org/officeDocument/2006/relationships" xmlns:p="http://schemas.openxmlformats.org/presentationml/2006/main">
+  <p:cSld>
+    <p:spTree>
+      <p:nvGrpSpPr>
+        <p:cNvPr id="1" name=""/>
+        <p:cNvGrpSpPr/>
+        <p:nvPr/>
+      </p:nvGrpSpPr>
+      <p:grpSpPr>
+        <a:xfrm>
+          <a:off x="0" y="0"/>
+          <a:ext cx="0" cy="0"/>
+          <a:chOff x="0" y="0"/>
+          <a:chExt cx="0" cy="0"/>
+        </a:xfrm>
+      </p:grpSpPr>
+      <p:sp>
+        <p:nvSpPr>
+          <p:cNvPr id="2" name="Title 1"/>
+          <p:cNvSpPr>
+            <a:spLocks noGrp="1"/>
+          </p:cNvSpPr>
+          <p:nvPr>
+            <p:ph type="title"/>
+          </p:nvPr>
+        </p:nvSpPr>
+        <p:spPr>
+          <a:xfrm>
+            <a:off x="189116" y="1284691"/>
+            <a:ext cx="2787349" cy="2624836"/>
+          </a:xfrm>
+        </p:spPr>
+        <p:txBody>
+          <a:bodyPr>
+            <a:normAutofit/>
+          </a:bodyPr>
+          <a:lstStyle/>
+          <a:p>
+            <a:r>
+              <a:rPr lang="en-US" dirty="0"/>
+              <a:t>Dashboard - Products</a:t>
+            </a:r>
+          </a:p>
+        </p:txBody>
+      </p:sp>
+      <p:pic>
+        <p:nvPicPr>
+          <p:cNvPr id="5" name="Content Placeholder 4"/>
+          <p:cNvPicPr>
+            <a:picLocks noGrp="1" noChangeAspect="1"/>
+          </p:cNvPicPr>
+          <p:nvPr>
+            <p:ph idx="1"/>
+          </p:nvPr>
+        </p:nvPicPr>
+        <p:blipFill>
+          <a:blip r:embed="rId2"/>
+          <a:stretch>
+            <a:fillRect/>
+          </a:stretch>
+        </p:blipFill>
+        <p:spPr>
+          <a:xfrm>
+            <a:off x="3191068" y="1"/>
+            <a:ext cx="8826215" cy="6858000"/>
+          </a:xfrm>
+        </p:spPr>
+      </p:pic>
+    </p:spTree>
+    <p:extLst>
+      <p:ext uri="{BB962C8B-B14F-4D97-AF65-F5344CB8AC3E}">
+        <p14:creationId xmlns:p14="http://schemas.microsoft.com/office/powerpoint/2010/main" val="3695523249"/>
+      </p:ext>
+    </p:extLst>
+  </p:cSld>
+  <p:clrMapOvr>
+    <a:masterClrMapping/>
+  </p:clrMapOvr>
+</p:sld>
+</file>
+
+<file path=ppt/slides/slide8.xml><?xml version="1.0" encoding="utf-8"?>
+<p:sld xmlns:a="http://schemas.openxmlformats.org/drawingml/2006/main" xmlns:r="http://schemas.openxmlformats.org/officeDocument/2006/relationships" xmlns:p="http://schemas.openxmlformats.org/presentationml/2006/main">
+  <p:cSld>
+    <p:spTree>
+      <p:nvGrpSpPr>
+        <p:cNvPr id="1" name=""/>
+        <p:cNvGrpSpPr/>
+        <p:nvPr/>
+      </p:nvGrpSpPr>
+      <p:grpSpPr>
+        <a:xfrm>
+          <a:off x="0" y="0"/>
+          <a:ext cx="0" cy="0"/>
+          <a:chOff x="0" y="0"/>
+          <a:chExt cx="0" cy="0"/>
+        </a:xfrm>
+      </p:grpSpPr>
+      <p:sp>
+        <p:nvSpPr>
+          <p:cNvPr id="2" name="Title 1"/>
+          <p:cNvSpPr>
+            <a:spLocks noGrp="1"/>
+          </p:cNvSpPr>
+          <p:nvPr>
+            <p:ph type="title"/>
+          </p:nvPr>
+        </p:nvSpPr>
+        <p:spPr>
+          <a:xfrm>
+            <a:off x="205038" y="1351118"/>
+            <a:ext cx="3207227" cy="1568251"/>
+          </a:xfrm>
+        </p:spPr>
+        <p:txBody>
+          <a:bodyPr>
+            <a:normAutofit/>
+          </a:bodyPr>
+          <a:lstStyle/>
+          <a:p>
+            <a:r>
+              <a:rPr lang="en-US" dirty="0"/>
+              <a:t>Dashboard - Employee</a:t>
+            </a:r>
+          </a:p>
+        </p:txBody>
+      </p:sp>
+      <p:pic>
+        <p:nvPicPr>
+          <p:cNvPr id="4" name="Content Placeholder 3"/>
+          <p:cNvPicPr>
+            <a:picLocks noGrp="1" noChangeAspect="1"/>
+          </p:cNvPicPr>
+          <p:nvPr>
+            <p:ph idx="1"/>
+          </p:nvPr>
+        </p:nvPicPr>
+        <p:blipFill>
+          <a:blip r:embed="rId2"/>
+          <a:stretch>
+            <a:fillRect/>
+          </a:stretch>
+        </p:blipFill>
+        <p:spPr>
+          <a:xfrm>
+            <a:off x="3806890" y="41897"/>
+            <a:ext cx="6830350" cy="6786678"/>
+          </a:xfrm>
+        </p:spPr>
+      </p:pic>
+    </p:spTree>
+    <p:extLst>
+      <p:ext uri="{BB962C8B-B14F-4D97-AF65-F5344CB8AC3E}">
+        <p14:creationId xmlns:p14="http://schemas.microsoft.com/office/powerpoint/2010/main" val="1808809744"/>
+      </p:ext>
+    </p:extLst>
+  </p:cSld>
+  <p:clrMapOvr>
+    <a:masterClrMapping/>
+  </p:clrMapOvr>
+</p:sld>
+</file>
+
+<file path=ppt/slides/slide9.xml><?xml version="1.0" encoding="utf-8"?>
+<p:sld xmlns:a="http://schemas.openxmlformats.org/drawingml/2006/main" xmlns:r="http://schemas.openxmlformats.org/officeDocument/2006/relationships" xmlns:p="http://schemas.openxmlformats.org/presentationml/2006/main">
+  <p:cSld>
+    <p:spTree>
+      <p:nvGrpSpPr>
+        <p:cNvPr id="1" name=""/>
+        <p:cNvGrpSpPr/>
+        <p:nvPr/>
+      </p:nvGrpSpPr>
+      <p:grpSpPr>
+        <a:xfrm>
+          <a:off x="0" y="0"/>
+          <a:ext cx="0" cy="0"/>
+          <a:chOff x="0" y="0"/>
+          <a:chExt cx="0" cy="0"/>
+        </a:xfrm>
+      </p:grpSpPr>
+      <p:sp>
+        <p:nvSpPr>
+          <p:cNvPr id="2" name="Title 1"/>
+          <p:cNvSpPr>
+            <a:spLocks noGrp="1"/>
+          </p:cNvSpPr>
+          <p:nvPr>
+            <p:ph type="title"/>
+          </p:nvPr>
+        </p:nvSpPr>
+        <p:spPr>
+          <a:xfrm>
+            <a:off x="3669435" y="211671"/>
+            <a:ext cx="6549832" cy="953003"/>
+          </a:xfrm>
+        </p:spPr>
+        <p:txBody>
+          <a:bodyPr>
+            <a:normAutofit/>
+          </a:bodyPr>
+          <a:lstStyle/>
+          <a:p>
+            <a:r>
+              <a:rPr lang="en-US" dirty="0"/>
+              <a:t>Dashboard - Report</a:t>
+            </a:r>
+          </a:p>
+        </p:txBody>
+      </p:sp>
+      <p:pic>
+        <p:nvPicPr>
+          <p:cNvPr id="4" name="Content Placeholder 3"/>
+          <p:cNvPicPr>
+            <a:picLocks noGrp="1" noChangeAspect="1"/>
+          </p:cNvPicPr>
+          <p:nvPr>
+            <p:ph idx="1"/>
+          </p:nvPr>
+        </p:nvPicPr>
+        <p:blipFill>
+          <a:blip r:embed="rId2"/>
+          <a:stretch>
+            <a:fillRect/>
+          </a:stretch>
+        </p:blipFill>
+        <p:spPr>
+          <a:xfrm>
+            <a:off x="2307164" y="1349633"/>
+            <a:ext cx="9848222" cy="4929870"/>
+          </a:xfrm>
+        </p:spPr>
+      </p:pic>
+    </p:spTree>
+    <p:extLst>
+      <p:ext uri="{BB962C8B-B14F-4D97-AF65-F5344CB8AC3E}">
+        <p14:creationId xmlns:p14="http://schemas.microsoft.com/office/powerpoint/2010/main" val="156837060"/>
       </p:ext>
     </p:extLst>
   </p:cSld>

</xml_diff>

<commit_message>
--Ali-- Team - Final Presentation --Ali--
</commit_message>
<xml_diff>
--- a/Documents/Presentation.pptx
+++ b/Documents/Presentation.pptx
@@ -6,19 +6,31 @@
   </p:sldMasterIdLst>
   <p:sldIdLst>
     <p:sldId id="256" r:id="rId2"/>
-    <p:sldId id="257" r:id="rId3"/>
-    <p:sldId id="258" r:id="rId4"/>
-    <p:sldId id="259" r:id="rId5"/>
-    <p:sldId id="260" r:id="rId6"/>
-    <p:sldId id="261" r:id="rId7"/>
-    <p:sldId id="262" r:id="rId8"/>
-    <p:sldId id="265" r:id="rId9"/>
-    <p:sldId id="266" r:id="rId10"/>
-    <p:sldId id="270" r:id="rId11"/>
-    <p:sldId id="271" r:id="rId12"/>
-    <p:sldId id="267" r:id="rId13"/>
-    <p:sldId id="268" r:id="rId14"/>
-    <p:sldId id="269" r:id="rId15"/>
+    <p:sldId id="272" r:id="rId3"/>
+    <p:sldId id="273" r:id="rId4"/>
+    <p:sldId id="274" r:id="rId5"/>
+    <p:sldId id="275" r:id="rId6"/>
+    <p:sldId id="276" r:id="rId7"/>
+    <p:sldId id="277" r:id="rId8"/>
+    <p:sldId id="278" r:id="rId9"/>
+    <p:sldId id="279" r:id="rId10"/>
+    <p:sldId id="280" r:id="rId11"/>
+    <p:sldId id="281" r:id="rId12"/>
+    <p:sldId id="282" r:id="rId13"/>
+    <p:sldId id="283" r:id="rId14"/>
+    <p:sldId id="257" r:id="rId15"/>
+    <p:sldId id="258" r:id="rId16"/>
+    <p:sldId id="259" r:id="rId17"/>
+    <p:sldId id="260" r:id="rId18"/>
+    <p:sldId id="261" r:id="rId19"/>
+    <p:sldId id="262" r:id="rId20"/>
+    <p:sldId id="265" r:id="rId21"/>
+    <p:sldId id="266" r:id="rId22"/>
+    <p:sldId id="270" r:id="rId23"/>
+    <p:sldId id="271" r:id="rId24"/>
+    <p:sldId id="267" r:id="rId25"/>
+    <p:sldId id="268" r:id="rId26"/>
+    <p:sldId id="269" r:id="rId27"/>
   </p:sldIdLst>
   <p:sldSz cx="12192000" cy="6858000"/>
   <p:notesSz cx="6858000" cy="9144000"/>
@@ -314,7 +326,7 @@
             <a:fld id="{B61BEF0D-F0BB-DE4B-95CE-6DB70DBA9567}" type="datetimeFigureOut">
               <a:rPr lang="en-US" dirty="0"/>
               <a:pPr/>
-              <a:t>9/15/2016</a:t>
+              <a:t>9/16/2016</a:t>
             </a:fld>
             <a:endParaRPr lang="en-US" dirty="0"/>
           </a:p>
@@ -649,7 +661,7 @@
             <a:fld id="{B61BEF0D-F0BB-DE4B-95CE-6DB70DBA9567}" type="datetimeFigureOut">
               <a:rPr lang="en-US" dirty="0"/>
               <a:pPr/>
-              <a:t>9/15/2016</a:t>
+              <a:t>9/16/2016</a:t>
             </a:fld>
             <a:endParaRPr lang="en-US" dirty="0"/>
           </a:p>
@@ -1047,7 +1059,7 @@
             <a:fld id="{B61BEF0D-F0BB-DE4B-95CE-6DB70DBA9567}" type="datetimeFigureOut">
               <a:rPr lang="en-US" dirty="0"/>
               <a:pPr/>
-              <a:t>9/15/2016</a:t>
+              <a:t>9/16/2016</a:t>
             </a:fld>
             <a:endParaRPr lang="en-US" dirty="0"/>
           </a:p>
@@ -1380,7 +1392,7 @@
             <a:fld id="{B61BEF0D-F0BB-DE4B-95CE-6DB70DBA9567}" type="datetimeFigureOut">
               <a:rPr lang="en-US" dirty="0"/>
               <a:pPr/>
-              <a:t>9/15/2016</a:t>
+              <a:t>9/16/2016</a:t>
             </a:fld>
             <a:endParaRPr lang="en-US" dirty="0"/>
           </a:p>
@@ -1697,7 +1709,7 @@
             <a:fld id="{B61BEF0D-F0BB-DE4B-95CE-6DB70DBA9567}" type="datetimeFigureOut">
               <a:rPr lang="en-US" dirty="0"/>
               <a:pPr/>
-              <a:t>9/15/2016</a:t>
+              <a:t>9/16/2016</a:t>
             </a:fld>
             <a:endParaRPr lang="en-US" dirty="0"/>
           </a:p>
@@ -2090,7 +2102,7 @@
             <a:fld id="{B61BEF0D-F0BB-DE4B-95CE-6DB70DBA9567}" type="datetimeFigureOut">
               <a:rPr lang="en-US" dirty="0"/>
               <a:pPr/>
-              <a:t>9/15/2016</a:t>
+              <a:t>9/16/2016</a:t>
             </a:fld>
             <a:endParaRPr lang="en-US" dirty="0"/>
           </a:p>
@@ -2344,7 +2356,7 @@
             <a:fld id="{B61BEF0D-F0BB-DE4B-95CE-6DB70DBA9567}" type="datetimeFigureOut">
               <a:rPr lang="en-US" dirty="0"/>
               <a:pPr/>
-              <a:t>9/15/2016</a:t>
+              <a:t>9/16/2016</a:t>
             </a:fld>
             <a:endParaRPr lang="en-US" dirty="0"/>
           </a:p>
@@ -2603,7 +2615,7 @@
             <a:fld id="{B61BEF0D-F0BB-DE4B-95CE-6DB70DBA9567}" type="datetimeFigureOut">
               <a:rPr lang="en-US" dirty="0"/>
               <a:pPr/>
-              <a:t>9/15/2016</a:t>
+              <a:t>9/16/2016</a:t>
             </a:fld>
             <a:endParaRPr lang="en-US" dirty="0"/>
           </a:p>
@@ -2862,7 +2874,7 @@
             <a:fld id="{B61BEF0D-F0BB-DE4B-95CE-6DB70DBA9567}" type="datetimeFigureOut">
               <a:rPr lang="en-US" dirty="0"/>
               <a:pPr/>
-              <a:t>9/15/2016</a:t>
+              <a:t>9/16/2016</a:t>
             </a:fld>
             <a:endParaRPr lang="en-US" dirty="0"/>
           </a:p>
@@ -3188,7 +3200,7 @@
             <a:fld id="{B61BEF0D-F0BB-DE4B-95CE-6DB70DBA9567}" type="datetimeFigureOut">
               <a:rPr lang="en-US" dirty="0"/>
               <a:pPr/>
-              <a:t>9/15/2016</a:t>
+              <a:t>9/16/2016</a:t>
             </a:fld>
             <a:endParaRPr lang="en-US" dirty="0"/>
           </a:p>
@@ -3508,7 +3520,7 @@
             <a:fld id="{B61BEF0D-F0BB-DE4B-95CE-6DB70DBA9567}" type="datetimeFigureOut">
               <a:rPr lang="en-US" dirty="0"/>
               <a:pPr/>
-              <a:t>9/15/2016</a:t>
+              <a:t>9/16/2016</a:t>
             </a:fld>
             <a:endParaRPr lang="en-US" dirty="0"/>
           </a:p>
@@ -3962,7 +3974,7 @@
             <a:fld id="{B61BEF0D-F0BB-DE4B-95CE-6DB70DBA9567}" type="datetimeFigureOut">
               <a:rPr lang="en-US" dirty="0"/>
               <a:pPr/>
-              <a:t>9/15/2016</a:t>
+              <a:t>9/16/2016</a:t>
             </a:fld>
             <a:endParaRPr lang="en-US" dirty="0"/>
           </a:p>
@@ -4164,7 +4176,7 @@
             <a:fld id="{B61BEF0D-F0BB-DE4B-95CE-6DB70DBA9567}" type="datetimeFigureOut">
               <a:rPr lang="en-US" dirty="0"/>
               <a:pPr/>
-              <a:t>9/15/2016</a:t>
+              <a:t>9/16/2016</a:t>
             </a:fld>
             <a:endParaRPr lang="en-US" dirty="0"/>
           </a:p>
@@ -4338,7 +4350,7 @@
             <a:fld id="{B61BEF0D-F0BB-DE4B-95CE-6DB70DBA9567}" type="datetimeFigureOut">
               <a:rPr lang="en-US" dirty="0"/>
               <a:pPr/>
-              <a:t>9/15/2016</a:t>
+              <a:t>9/16/2016</a:t>
             </a:fld>
             <a:endParaRPr lang="en-US" dirty="0"/>
           </a:p>
@@ -4668,7 +4680,7 @@
             <a:fld id="{B61BEF0D-F0BB-DE4B-95CE-6DB70DBA9567}" type="datetimeFigureOut">
               <a:rPr lang="en-US" dirty="0"/>
               <a:pPr/>
-              <a:t>9/15/2016</a:t>
+              <a:t>9/16/2016</a:t>
             </a:fld>
             <a:endParaRPr lang="en-US" dirty="0"/>
           </a:p>
@@ -5010,7 +5022,7 @@
             <a:fld id="{B61BEF0D-F0BB-DE4B-95CE-6DB70DBA9567}" type="datetimeFigureOut">
               <a:rPr lang="en-US" dirty="0"/>
               <a:pPr/>
-              <a:t>9/15/2016</a:t>
+              <a:t>9/16/2016</a:t>
             </a:fld>
             <a:endParaRPr lang="en-US" dirty="0"/>
           </a:p>
@@ -7124,7 +7136,7 @@
             <a:fld id="{B61BEF0D-F0BB-DE4B-95CE-6DB70DBA9567}" type="datetimeFigureOut">
               <a:rPr lang="en-US" dirty="0"/>
               <a:pPr/>
-              <a:t>9/15/2016</a:t>
+              <a:t>9/16/2016</a:t>
             </a:fld>
             <a:endParaRPr lang="en-US" dirty="0"/>
           </a:p>
@@ -7650,8 +7662,41 @@
         </p:nvSpPr>
         <p:spPr>
           <a:xfrm>
-            <a:off x="2589214" y="853579"/>
-            <a:ext cx="7527910" cy="3290583"/>
+            <a:off x="2589213" y="853579"/>
+            <a:ext cx="8424775" cy="3290583"/>
+          </a:xfrm>
+        </p:spPr>
+        <p:txBody>
+          <a:bodyPr>
+            <a:noAutofit/>
+          </a:bodyPr>
+          <a:lstStyle/>
+          <a:p>
+            <a:r>
+              <a:rPr lang="en-US" sz="7200" dirty="0"/>
+              <a:t>Small Store System</a:t>
+            </a:r>
+            <a:br>
+              <a:rPr lang="en-US" sz="7200" dirty="0"/>
+            </a:br>
+            <a:endParaRPr lang="en-US" sz="7200" dirty="0"/>
+          </a:p>
+        </p:txBody>
+      </p:sp>
+      <p:sp>
+        <p:nvSpPr>
+          <p:cNvPr id="3" name="Subtitle 2"/>
+          <p:cNvSpPr>
+            <a:spLocks noGrp="1"/>
+          </p:cNvSpPr>
+          <p:nvPr>
+            <p:ph type="subTitle" idx="1"/>
+          </p:nvPr>
+        </p:nvSpPr>
+        <p:spPr>
+          <a:xfrm>
+            <a:off x="2589213" y="4020065"/>
+            <a:ext cx="7821525" cy="2447847"/>
           </a:xfrm>
         </p:spPr>
         <p:txBody>
@@ -7661,67 +7706,39 @@
           <a:lstStyle/>
           <a:p>
             <a:r>
-              <a:rPr lang="en-US" sz="6000" dirty="0"/>
-              <a:t>Small Store System</a:t>
-            </a:r>
-            <a:br>
-              <a:rPr lang="en-US" sz="6000" dirty="0"/>
-            </a:br>
-            <a:r>
-              <a:rPr lang="en-US" sz="6000" dirty="0"/>
-              <a:t>Presentation</a:t>
-            </a:r>
-          </a:p>
-        </p:txBody>
-      </p:sp>
-      <p:sp>
-        <p:nvSpPr>
-          <p:cNvPr id="3" name="Subtitle 2"/>
-          <p:cNvSpPr>
-            <a:spLocks noGrp="1"/>
-          </p:cNvSpPr>
-          <p:nvPr>
-            <p:ph type="subTitle" idx="1"/>
-          </p:nvPr>
-        </p:nvSpPr>
-        <p:spPr>
-          <a:xfrm>
-            <a:off x="2589213" y="4777379"/>
-            <a:ext cx="7821525" cy="1690533"/>
-          </a:xfrm>
-        </p:spPr>
-        <p:txBody>
-          <a:bodyPr>
-            <a:normAutofit/>
-          </a:bodyPr>
-          <a:lstStyle/>
-          <a:p>
-            <a:r>
-              <a:rPr lang="en-US" dirty="0"/>
-              <a:t>An application for who needs to manage his business systematically in a simple, applied and smart way</a:t>
-            </a:r>
-          </a:p>
-          <a:p>
-            <a:endParaRPr lang="en-US" dirty="0"/>
-          </a:p>
-          <a:p>
-            <a:r>
-              <a:rPr lang="en-US" dirty="0"/>
+              <a:rPr lang="en-US" sz="2400" dirty="0"/>
+              <a:t>An application for who needs to manage his business </a:t>
+            </a:r>
+            <a:r>
+              <a:rPr lang="en-US" sz="2400" dirty="0" smtClean="0"/>
+              <a:t>in </a:t>
+            </a:r>
+            <a:r>
+              <a:rPr lang="en-US" sz="2400" dirty="0"/>
+              <a:t>a simple, applied and smart way</a:t>
+            </a:r>
+          </a:p>
+          <a:p>
+            <a:endParaRPr lang="en-US" sz="2400" dirty="0"/>
+          </a:p>
+          <a:p>
+            <a:r>
+              <a:rPr lang="en-US" sz="2400" dirty="0"/>
               <a:t>By:	Ali Torabi	,	</a:t>
             </a:r>
             <a:r>
-              <a:rPr lang="en-US" dirty="0" err="1"/>
+              <a:rPr lang="en-US" sz="2400" dirty="0" err="1"/>
               <a:t>Behnaz</a:t>
             </a:r>
             <a:r>
-              <a:rPr lang="en-US" dirty="0"/>
+              <a:rPr lang="en-US" sz="2400" dirty="0"/>
               <a:t> </a:t>
             </a:r>
             <a:r>
-              <a:rPr lang="en-US" dirty="0" err="1"/>
-              <a:t>Afshar</a:t>
-            </a:r>
-            <a:endParaRPr lang="en-US" dirty="0"/>
+              <a:rPr lang="en-US" sz="2400" dirty="0" err="1" smtClean="0"/>
+              <a:t>A.Afshar</a:t>
+            </a:r>
+            <a:endParaRPr lang="en-US" sz="2400" dirty="0"/>
           </a:p>
         </p:txBody>
       </p:sp>
@@ -7755,9 +7772,140 @@
           <a:chExt cx="0" cy="0"/>
         </a:xfrm>
       </p:grpSpPr>
+      <p:sp>
+        <p:nvSpPr>
+          <p:cNvPr id="2" name="Title 1"/>
+          <p:cNvSpPr>
+            <a:spLocks noGrp="1"/>
+          </p:cNvSpPr>
+          <p:nvPr>
+            <p:ph type="title"/>
+          </p:nvPr>
+        </p:nvSpPr>
+        <p:spPr>
+          <a:xfrm>
+            <a:off x="1445549" y="147031"/>
+            <a:ext cx="8911687" cy="1280890"/>
+          </a:xfrm>
+        </p:spPr>
+        <p:txBody>
+          <a:bodyPr/>
+          <a:lstStyle/>
+          <a:p>
+            <a:r>
+              <a:rPr lang="en-CA" dirty="0"/>
+              <a:t>Payment Form</a:t>
+            </a:r>
+          </a:p>
+        </p:txBody>
+      </p:sp>
+      <p:sp>
+        <p:nvSpPr>
+          <p:cNvPr id="9" name="Title 1"/>
+          <p:cNvSpPr txBox="1">
+            <a:spLocks/>
+          </p:cNvSpPr>
+          <p:nvPr/>
+        </p:nvSpPr>
+        <p:spPr>
+          <a:xfrm>
+            <a:off x="1192696" y="4738908"/>
+            <a:ext cx="10844451" cy="1781162"/>
+          </a:xfrm>
+          <a:prstGeom prst="rect">
+            <a:avLst/>
+          </a:prstGeom>
+        </p:spPr>
+        <p:txBody>
+          <a:bodyPr vert="horz" lIns="91440" tIns="45720" rIns="91440" bIns="45720" rtlCol="0" anchor="t">
+            <a:normAutofit/>
+          </a:bodyPr>
+          <a:lstStyle>
+            <a:lvl1pPr algn="l" defTabSz="457200" rtl="0" eaLnBrk="1" latinLnBrk="0" hangingPunct="1">
+              <a:spcBef>
+                <a:spcPct val="0"/>
+              </a:spcBef>
+              <a:buNone/>
+              <a:defRPr sz="3600" kern="1200">
+                <a:solidFill>
+                  <a:schemeClr val="tx1">
+                    <a:lumMod val="85000"/>
+                    <a:lumOff val="15000"/>
+                  </a:schemeClr>
+                </a:solidFill>
+                <a:latin typeface="+mj-lt"/>
+                <a:ea typeface="+mj-ea"/>
+                <a:cs typeface="+mj-cs"/>
+              </a:defRPr>
+            </a:lvl1pPr>
+            <a:lvl2pPr eaLnBrk="1" hangingPunct="1">
+              <a:defRPr>
+                <a:solidFill>
+                  <a:schemeClr val="tx2"/>
+                </a:solidFill>
+              </a:defRPr>
+            </a:lvl2pPr>
+            <a:lvl3pPr eaLnBrk="1" hangingPunct="1">
+              <a:defRPr>
+                <a:solidFill>
+                  <a:schemeClr val="tx2"/>
+                </a:solidFill>
+              </a:defRPr>
+            </a:lvl3pPr>
+            <a:lvl4pPr eaLnBrk="1" hangingPunct="1">
+              <a:defRPr>
+                <a:solidFill>
+                  <a:schemeClr val="tx2"/>
+                </a:solidFill>
+              </a:defRPr>
+            </a:lvl4pPr>
+            <a:lvl5pPr eaLnBrk="1" hangingPunct="1">
+              <a:defRPr>
+                <a:solidFill>
+                  <a:schemeClr val="tx2"/>
+                </a:solidFill>
+              </a:defRPr>
+            </a:lvl5pPr>
+            <a:lvl6pPr eaLnBrk="1" hangingPunct="1">
+              <a:defRPr>
+                <a:solidFill>
+                  <a:schemeClr val="tx2"/>
+                </a:solidFill>
+              </a:defRPr>
+            </a:lvl6pPr>
+            <a:lvl7pPr eaLnBrk="1" hangingPunct="1">
+              <a:defRPr>
+                <a:solidFill>
+                  <a:schemeClr val="tx2"/>
+                </a:solidFill>
+              </a:defRPr>
+            </a:lvl7pPr>
+            <a:lvl8pPr eaLnBrk="1" hangingPunct="1">
+              <a:defRPr>
+                <a:solidFill>
+                  <a:schemeClr val="tx2"/>
+                </a:solidFill>
+              </a:defRPr>
+            </a:lvl8pPr>
+            <a:lvl9pPr eaLnBrk="1" hangingPunct="1">
+              <a:defRPr>
+                <a:solidFill>
+                  <a:schemeClr val="tx2"/>
+                </a:solidFill>
+              </a:defRPr>
+            </a:lvl9pPr>
+          </a:lstStyle>
+          <a:p>
+            <a:r>
+              <a:rPr lang="en-CA" sz="2800" dirty="0"/>
+              <a:t>Until now the shopping is not happened after press submit button and view pdf bill if is not any error or exception all data registered in database(shopping happened)</a:t>
+            </a:r>
+          </a:p>
+        </p:txBody>
+      </p:sp>
       <p:pic>
         <p:nvPicPr>
-          <p:cNvPr id="4" name="Content Placeholder 3"/>
+          <p:cNvPr id="11" name="Content Placeholder 10"/>
           <p:cNvPicPr>
             <a:picLocks noGrp="1" noChangeAspect="1"/>
           </p:cNvPicPr>
@@ -7773,11 +7921,394 @@
         </p:blipFill>
         <p:spPr>
           <a:xfrm>
-            <a:off x="1619075" y="-5248"/>
-            <a:ext cx="10544964" cy="6852452"/>
+            <a:off x="2333097" y="787476"/>
+            <a:ext cx="4941358" cy="3778250"/>
           </a:xfrm>
         </p:spPr>
       </p:pic>
+    </p:spTree>
+    <p:extLst>
+      <p:ext uri="{BB962C8B-B14F-4D97-AF65-F5344CB8AC3E}">
+        <p14:creationId xmlns:p14="http://schemas.microsoft.com/office/powerpoint/2010/main" val="93076621"/>
+      </p:ext>
+    </p:extLst>
+  </p:cSld>
+  <p:clrMapOvr>
+    <a:masterClrMapping/>
+  </p:clrMapOvr>
+  <p:timing>
+    <p:tnLst>
+      <p:par>
+        <p:cTn id="1" dur="indefinite" restart="never" nodeType="tmRoot"/>
+      </p:par>
+    </p:tnLst>
+  </p:timing>
+</p:sld>
+</file>
+
+<file path=ppt/slides/slide11.xml><?xml version="1.0" encoding="utf-8"?>
+<p:sld xmlns:a="http://schemas.openxmlformats.org/drawingml/2006/main" xmlns:r="http://schemas.openxmlformats.org/officeDocument/2006/relationships" xmlns:p="http://schemas.openxmlformats.org/presentationml/2006/main">
+  <p:cSld>
+    <p:spTree>
+      <p:nvGrpSpPr>
+        <p:cNvPr id="1" name=""/>
+        <p:cNvGrpSpPr/>
+        <p:nvPr/>
+      </p:nvGrpSpPr>
+      <p:grpSpPr>
+        <a:xfrm>
+          <a:off x="0" y="0"/>
+          <a:ext cx="0" cy="0"/>
+          <a:chOff x="0" y="0"/>
+          <a:chExt cx="0" cy="0"/>
+        </a:xfrm>
+      </p:grpSpPr>
+      <p:sp>
+        <p:nvSpPr>
+          <p:cNvPr id="3" name="Text Placeholder 2"/>
+          <p:cNvSpPr>
+            <a:spLocks noGrp="1"/>
+          </p:cNvSpPr>
+          <p:nvPr>
+            <p:ph type="body" idx="1"/>
+          </p:nvPr>
+        </p:nvSpPr>
+        <p:spPr>
+          <a:xfrm>
+            <a:off x="1508135" y="765263"/>
+            <a:ext cx="3992732" cy="576262"/>
+          </a:xfrm>
+        </p:spPr>
+        <p:txBody>
+          <a:bodyPr/>
+          <a:lstStyle/>
+          <a:p>
+            <a:r>
+              <a:rPr lang="en-CA" b="1" dirty="0">
+                <a:solidFill>
+                  <a:srgbClr val="002060"/>
+                </a:solidFill>
+              </a:rPr>
+              <a:t>Payment form</a:t>
+            </a:r>
+          </a:p>
+        </p:txBody>
+      </p:sp>
+      <p:pic>
+        <p:nvPicPr>
+          <p:cNvPr id="7" name="Content Placeholder 6"/>
+          <p:cNvPicPr>
+            <a:picLocks noGrp="1" noChangeAspect="1"/>
+          </p:cNvPicPr>
+          <p:nvPr>
+            <p:ph sz="half" idx="2"/>
+          </p:nvPr>
+        </p:nvPicPr>
+        <p:blipFill>
+          <a:blip r:embed="rId2"/>
+          <a:stretch>
+            <a:fillRect/>
+          </a:stretch>
+        </p:blipFill>
+        <p:spPr>
+          <a:xfrm>
+            <a:off x="659443" y="1359874"/>
+            <a:ext cx="5729830" cy="4192787"/>
+          </a:xfrm>
+        </p:spPr>
+      </p:pic>
+      <p:sp>
+        <p:nvSpPr>
+          <p:cNvPr id="5" name="Text Placeholder 4"/>
+          <p:cNvSpPr>
+            <a:spLocks noGrp="1"/>
+          </p:cNvSpPr>
+          <p:nvPr>
+            <p:ph type="body" sz="quarter" idx="3"/>
+          </p:nvPr>
+        </p:nvSpPr>
+        <p:spPr>
+          <a:xfrm>
+            <a:off x="7428555" y="752011"/>
+            <a:ext cx="3999001" cy="576262"/>
+          </a:xfrm>
+        </p:spPr>
+        <p:txBody>
+          <a:bodyPr/>
+          <a:lstStyle/>
+          <a:p>
+            <a:r>
+              <a:rPr lang="en-CA" b="1" dirty="0">
+                <a:solidFill>
+                  <a:srgbClr val="002060"/>
+                </a:solidFill>
+              </a:rPr>
+              <a:t>Receipt (pdf file)</a:t>
+            </a:r>
+          </a:p>
+        </p:txBody>
+      </p:sp>
+      <p:pic>
+        <p:nvPicPr>
+          <p:cNvPr id="8" name="Content Placeholder 7"/>
+          <p:cNvPicPr>
+            <a:picLocks noGrp="1" noChangeAspect="1"/>
+          </p:cNvPicPr>
+          <p:nvPr>
+            <p:ph sz="quarter" idx="4"/>
+          </p:nvPr>
+        </p:nvPicPr>
+        <p:blipFill>
+          <a:blip r:embed="rId3"/>
+          <a:stretch>
+            <a:fillRect/>
+          </a:stretch>
+        </p:blipFill>
+        <p:spPr>
+          <a:xfrm>
+            <a:off x="7258736" y="1359876"/>
+            <a:ext cx="3873089" cy="4192786"/>
+          </a:xfrm>
+        </p:spPr>
+      </p:pic>
+    </p:spTree>
+    <p:extLst>
+      <p:ext uri="{BB962C8B-B14F-4D97-AF65-F5344CB8AC3E}">
+        <p14:creationId xmlns:p14="http://schemas.microsoft.com/office/powerpoint/2010/main" val="492284898"/>
+      </p:ext>
+    </p:extLst>
+  </p:cSld>
+  <p:clrMapOvr>
+    <a:masterClrMapping/>
+  </p:clrMapOvr>
+  <p:timing>
+    <p:tnLst>
+      <p:par>
+        <p:cTn id="1" dur="indefinite" restart="never" nodeType="tmRoot"/>
+      </p:par>
+    </p:tnLst>
+  </p:timing>
+</p:sld>
+</file>
+
+<file path=ppt/slides/slide12.xml><?xml version="1.0" encoding="utf-8"?>
+<p:sld xmlns:a="http://schemas.openxmlformats.org/drawingml/2006/main" xmlns:r="http://schemas.openxmlformats.org/officeDocument/2006/relationships" xmlns:p="http://schemas.openxmlformats.org/presentationml/2006/main">
+  <p:cSld>
+    <p:spTree>
+      <p:nvGrpSpPr>
+        <p:cNvPr id="1" name=""/>
+        <p:cNvGrpSpPr/>
+        <p:nvPr/>
+      </p:nvGrpSpPr>
+      <p:grpSpPr>
+        <a:xfrm>
+          <a:off x="0" y="0"/>
+          <a:ext cx="0" cy="0"/>
+          <a:chOff x="0" y="0"/>
+          <a:chExt cx="0" cy="0"/>
+        </a:xfrm>
+      </p:grpSpPr>
+      <p:pic>
+        <p:nvPicPr>
+          <p:cNvPr id="7" name="Content Placeholder 6"/>
+          <p:cNvPicPr>
+            <a:picLocks noGrp="1" noChangeAspect="1"/>
+          </p:cNvPicPr>
+          <p:nvPr>
+            <p:ph sz="half" idx="2"/>
+          </p:nvPr>
+        </p:nvPicPr>
+        <p:blipFill>
+          <a:blip r:embed="rId2"/>
+          <a:stretch>
+            <a:fillRect/>
+          </a:stretch>
+        </p:blipFill>
+        <p:spPr>
+          <a:xfrm>
+            <a:off x="2540660" y="212035"/>
+            <a:ext cx="9437251" cy="6281530"/>
+          </a:xfrm>
+        </p:spPr>
+      </p:pic>
+      <p:sp>
+        <p:nvSpPr>
+          <p:cNvPr id="8" name="TextBox 7"/>
+          <p:cNvSpPr txBox="1"/>
+          <p:nvPr/>
+        </p:nvSpPr>
+        <p:spPr>
+          <a:xfrm>
+            <a:off x="251793" y="1391478"/>
+            <a:ext cx="2394883" cy="1938992"/>
+          </a:xfrm>
+          <a:prstGeom prst="rect">
+            <a:avLst/>
+          </a:prstGeom>
+          <a:noFill/>
+        </p:spPr>
+        <p:txBody>
+          <a:bodyPr wrap="square" rtlCol="0">
+            <a:spAutoFit/>
+          </a:bodyPr>
+          <a:lstStyle/>
+          <a:p>
+            <a:pPr algn="ctr"/>
+            <a:r>
+              <a:rPr lang="en-CA" sz="3000" b="1" dirty="0">
+                <a:solidFill>
+                  <a:srgbClr val="002060"/>
+                </a:solidFill>
+              </a:rPr>
+              <a:t>Transaction steps for submit order</a:t>
+            </a:r>
+          </a:p>
+        </p:txBody>
+      </p:sp>
+    </p:spTree>
+    <p:extLst>
+      <p:ext uri="{BB962C8B-B14F-4D97-AF65-F5344CB8AC3E}">
+        <p14:creationId xmlns:p14="http://schemas.microsoft.com/office/powerpoint/2010/main" val="3707841757"/>
+      </p:ext>
+    </p:extLst>
+  </p:cSld>
+  <p:clrMapOvr>
+    <a:masterClrMapping/>
+  </p:clrMapOvr>
+  <p:timing>
+    <p:tnLst>
+      <p:par>
+        <p:cTn id="1" dur="indefinite" restart="never" nodeType="tmRoot"/>
+      </p:par>
+    </p:tnLst>
+  </p:timing>
+</p:sld>
+</file>
+
+<file path=ppt/slides/slide13.xml><?xml version="1.0" encoding="utf-8"?>
+<p:sld xmlns:a="http://schemas.openxmlformats.org/drawingml/2006/main" xmlns:r="http://schemas.openxmlformats.org/officeDocument/2006/relationships" xmlns:p="http://schemas.openxmlformats.org/presentationml/2006/main">
+  <p:cSld>
+    <p:spTree>
+      <p:nvGrpSpPr>
+        <p:cNvPr id="1" name=""/>
+        <p:cNvGrpSpPr/>
+        <p:nvPr/>
+      </p:nvGrpSpPr>
+      <p:grpSpPr>
+        <a:xfrm>
+          <a:off x="0" y="0"/>
+          <a:ext cx="0" cy="0"/>
+          <a:chOff x="0" y="0"/>
+          <a:chExt cx="0" cy="0"/>
+        </a:xfrm>
+      </p:grpSpPr>
+      <p:pic>
+        <p:nvPicPr>
+          <p:cNvPr id="10" name="Content Placeholder 9"/>
+          <p:cNvPicPr>
+            <a:picLocks noGrp="1" noChangeAspect="1"/>
+          </p:cNvPicPr>
+          <p:nvPr>
+            <p:ph sz="quarter" idx="4"/>
+          </p:nvPr>
+        </p:nvPicPr>
+        <p:blipFill>
+          <a:blip r:embed="rId2"/>
+          <a:stretch>
+            <a:fillRect/>
+          </a:stretch>
+        </p:blipFill>
+        <p:spPr>
+          <a:xfrm>
+            <a:off x="609089" y="2537280"/>
+            <a:ext cx="10895522" cy="1618146"/>
+          </a:xfrm>
+        </p:spPr>
+      </p:pic>
+      <p:pic>
+        <p:nvPicPr>
+          <p:cNvPr id="12" name="Content Placeholder 11"/>
+          <p:cNvPicPr>
+            <a:picLocks noGrp="1" noChangeAspect="1"/>
+          </p:cNvPicPr>
+          <p:nvPr>
+            <p:ph sz="half" idx="2"/>
+          </p:nvPr>
+        </p:nvPicPr>
+        <p:blipFill>
+          <a:blip r:embed="rId3"/>
+          <a:stretch>
+            <a:fillRect/>
+          </a:stretch>
+        </p:blipFill>
+        <p:spPr>
+          <a:xfrm>
+            <a:off x="997217" y="767035"/>
+            <a:ext cx="10148078" cy="1202440"/>
+          </a:xfrm>
+        </p:spPr>
+      </p:pic>
+      <p:pic>
+        <p:nvPicPr>
+          <p:cNvPr id="13" name="Picture 12"/>
+          <p:cNvPicPr>
+            <a:picLocks noChangeAspect="1"/>
+          </p:cNvPicPr>
+          <p:nvPr/>
+        </p:nvPicPr>
+        <p:blipFill>
+          <a:blip r:embed="rId4"/>
+          <a:stretch>
+            <a:fillRect/>
+          </a:stretch>
+        </p:blipFill>
+        <p:spPr>
+          <a:xfrm>
+            <a:off x="222775" y="4442997"/>
+            <a:ext cx="11484929" cy="1413754"/>
+          </a:xfrm>
+          <a:prstGeom prst="rect">
+            <a:avLst/>
+          </a:prstGeom>
+        </p:spPr>
+      </p:pic>
+    </p:spTree>
+    <p:extLst>
+      <p:ext uri="{BB962C8B-B14F-4D97-AF65-F5344CB8AC3E}">
+        <p14:creationId xmlns:p14="http://schemas.microsoft.com/office/powerpoint/2010/main" val="1658409272"/>
+      </p:ext>
+    </p:extLst>
+  </p:cSld>
+  <p:clrMapOvr>
+    <a:masterClrMapping/>
+  </p:clrMapOvr>
+  <p:timing>
+    <p:tnLst>
+      <p:par>
+        <p:cTn id="1" dur="indefinite" restart="never" nodeType="tmRoot"/>
+      </p:par>
+    </p:tnLst>
+  </p:timing>
+</p:sld>
+</file>
+
+<file path=ppt/slides/slide14.xml><?xml version="1.0" encoding="utf-8"?>
+<p:sld xmlns:a="http://schemas.openxmlformats.org/drawingml/2006/main" xmlns:r="http://schemas.openxmlformats.org/officeDocument/2006/relationships" xmlns:p="http://schemas.openxmlformats.org/presentationml/2006/main">
+  <p:cSld>
+    <p:spTree>
+      <p:nvGrpSpPr>
+        <p:cNvPr id="1" name=""/>
+        <p:cNvGrpSpPr/>
+        <p:nvPr/>
+      </p:nvGrpSpPr>
+      <p:grpSpPr>
+        <a:xfrm>
+          <a:off x="0" y="0"/>
+          <a:ext cx="0" cy="0"/>
+          <a:chOff x="0" y="0"/>
+          <a:chExt cx="0" cy="0"/>
+        </a:xfrm>
+      </p:grpSpPr>
       <p:sp>
         <p:nvSpPr>
           <p:cNvPr id="2" name="Title 1"/>
@@ -7790,8 +8321,8 @@
         </p:nvSpPr>
         <p:spPr>
           <a:xfrm>
-            <a:off x="6362301" y="1629411"/>
-            <a:ext cx="5432620" cy="652395"/>
+            <a:off x="3669435" y="211671"/>
+            <a:ext cx="4492432" cy="953003"/>
           </a:xfrm>
         </p:spPr>
         <p:txBody>
@@ -7801,23 +8332,217 @@
           <a:lstStyle/>
           <a:p>
             <a:r>
-              <a:rPr lang="en-US" sz="3200" dirty="0">
-                <a:solidFill>
-                  <a:schemeClr val="bg1"/>
-                </a:solidFill>
-                <a:highlight>
-                  <a:srgbClr val="800000"/>
-                </a:highlight>
-              </a:rPr>
-              <a:t>Ribbon challenge</a:t>
-            </a:r>
-          </a:p>
-        </p:txBody>
-      </p:sp>
+              <a:rPr lang="en-US" dirty="0"/>
+              <a:t>Login page</a:t>
+            </a:r>
+          </a:p>
+        </p:txBody>
+      </p:sp>
+      <p:pic>
+        <p:nvPicPr>
+          <p:cNvPr id="6" name="Content Placeholder 5"/>
+          <p:cNvPicPr>
+            <a:picLocks noGrp="1" noChangeAspect="1"/>
+          </p:cNvPicPr>
+          <p:nvPr>
+            <p:ph idx="1"/>
+          </p:nvPr>
+        </p:nvPicPr>
+        <p:blipFill>
+          <a:blip r:embed="rId2"/>
+          <a:stretch>
+            <a:fillRect/>
+          </a:stretch>
+        </p:blipFill>
+        <p:spPr>
+          <a:xfrm>
+            <a:off x="3643533" y="1903445"/>
+            <a:ext cx="6262291" cy="4149248"/>
+          </a:xfrm>
+        </p:spPr>
+      </p:pic>
     </p:spTree>
     <p:extLst>
       <p:ext uri="{BB962C8B-B14F-4D97-AF65-F5344CB8AC3E}">
-        <p14:creationId xmlns:p14="http://schemas.microsoft.com/office/powerpoint/2010/main" val="3571432278"/>
+        <p14:creationId xmlns:p14="http://schemas.microsoft.com/office/powerpoint/2010/main" val="2848497588"/>
+      </p:ext>
+    </p:extLst>
+  </p:cSld>
+  <p:clrMapOvr>
+    <a:masterClrMapping/>
+  </p:clrMapOvr>
+  <p:timing>
+    <p:tnLst>
+      <p:par>
+        <p:cTn id="1" dur="indefinite" restart="never" nodeType="tmRoot"/>
+      </p:par>
+    </p:tnLst>
+  </p:timing>
+</p:sld>
+</file>
+
+<file path=ppt/slides/slide15.xml><?xml version="1.0" encoding="utf-8"?>
+<p:sld xmlns:a="http://schemas.openxmlformats.org/drawingml/2006/main" xmlns:r="http://schemas.openxmlformats.org/officeDocument/2006/relationships" xmlns:p="http://schemas.openxmlformats.org/presentationml/2006/main">
+  <p:cSld>
+    <p:spTree>
+      <p:nvGrpSpPr>
+        <p:cNvPr id="1" name=""/>
+        <p:cNvGrpSpPr/>
+        <p:nvPr/>
+      </p:nvGrpSpPr>
+      <p:grpSpPr>
+        <a:xfrm>
+          <a:off x="0" y="0"/>
+          <a:ext cx="0" cy="0"/>
+          <a:chOff x="0" y="0"/>
+          <a:chExt cx="0" cy="0"/>
+        </a:xfrm>
+      </p:grpSpPr>
+      <p:sp>
+        <p:nvSpPr>
+          <p:cNvPr id="2" name="Title 1"/>
+          <p:cNvSpPr>
+            <a:spLocks noGrp="1"/>
+          </p:cNvSpPr>
+          <p:nvPr>
+            <p:ph type="title"/>
+          </p:nvPr>
+        </p:nvSpPr>
+        <p:spPr>
+          <a:xfrm>
+            <a:off x="3669435" y="211671"/>
+            <a:ext cx="4492432" cy="953003"/>
+          </a:xfrm>
+        </p:spPr>
+        <p:txBody>
+          <a:bodyPr>
+            <a:normAutofit/>
+          </a:bodyPr>
+          <a:lstStyle/>
+          <a:p>
+            <a:r>
+              <a:rPr lang="en-US" dirty="0"/>
+              <a:t>Admin - File</a:t>
+            </a:r>
+          </a:p>
+        </p:txBody>
+      </p:sp>
+      <p:pic>
+        <p:nvPicPr>
+          <p:cNvPr id="4" name="Content Placeholder 3"/>
+          <p:cNvPicPr>
+            <a:picLocks noGrp="1" noChangeAspect="1"/>
+          </p:cNvPicPr>
+          <p:nvPr>
+            <p:ph idx="1"/>
+          </p:nvPr>
+        </p:nvPicPr>
+        <p:blipFill>
+          <a:blip r:embed="rId2"/>
+          <a:stretch>
+            <a:fillRect/>
+          </a:stretch>
+        </p:blipFill>
+        <p:spPr>
+          <a:xfrm>
+            <a:off x="3669435" y="1011400"/>
+            <a:ext cx="7215401" cy="5730126"/>
+          </a:xfrm>
+        </p:spPr>
+      </p:pic>
+    </p:spTree>
+    <p:extLst>
+      <p:ext uri="{BB962C8B-B14F-4D97-AF65-F5344CB8AC3E}">
+        <p14:creationId xmlns:p14="http://schemas.microsoft.com/office/powerpoint/2010/main" val="3798796465"/>
+      </p:ext>
+    </p:extLst>
+  </p:cSld>
+  <p:clrMapOvr>
+    <a:masterClrMapping/>
+  </p:clrMapOvr>
+  <p:timing>
+    <p:tnLst>
+      <p:par>
+        <p:cTn id="1" dur="indefinite" restart="never" nodeType="tmRoot"/>
+      </p:par>
+    </p:tnLst>
+  </p:timing>
+</p:sld>
+</file>
+
+<file path=ppt/slides/slide16.xml><?xml version="1.0" encoding="utf-8"?>
+<p:sld xmlns:a="http://schemas.openxmlformats.org/drawingml/2006/main" xmlns:r="http://schemas.openxmlformats.org/officeDocument/2006/relationships" xmlns:p="http://schemas.openxmlformats.org/presentationml/2006/main">
+  <p:cSld>
+    <p:spTree>
+      <p:nvGrpSpPr>
+        <p:cNvPr id="1" name=""/>
+        <p:cNvGrpSpPr/>
+        <p:nvPr/>
+      </p:nvGrpSpPr>
+      <p:grpSpPr>
+        <a:xfrm>
+          <a:off x="0" y="0"/>
+          <a:ext cx="0" cy="0"/>
+          <a:chOff x="0" y="0"/>
+          <a:chExt cx="0" cy="0"/>
+        </a:xfrm>
+      </p:grpSpPr>
+      <p:sp>
+        <p:nvSpPr>
+          <p:cNvPr id="2" name="Title 1"/>
+          <p:cNvSpPr>
+            <a:spLocks noGrp="1"/>
+          </p:cNvSpPr>
+          <p:nvPr>
+            <p:ph type="title"/>
+          </p:nvPr>
+        </p:nvSpPr>
+        <p:spPr>
+          <a:xfrm>
+            <a:off x="3669435" y="211671"/>
+            <a:ext cx="6549832" cy="953003"/>
+          </a:xfrm>
+        </p:spPr>
+        <p:txBody>
+          <a:bodyPr>
+            <a:normAutofit/>
+          </a:bodyPr>
+          <a:lstStyle/>
+          <a:p>
+            <a:r>
+              <a:rPr lang="en-US" dirty="0"/>
+              <a:t>Admin - Dashboard</a:t>
+            </a:r>
+          </a:p>
+        </p:txBody>
+      </p:sp>
+      <p:pic>
+        <p:nvPicPr>
+          <p:cNvPr id="4" name="Content Placeholder 3"/>
+          <p:cNvPicPr>
+            <a:picLocks noGrp="1" noChangeAspect="1"/>
+          </p:cNvPicPr>
+          <p:nvPr>
+            <p:ph idx="1"/>
+          </p:nvPr>
+        </p:nvPicPr>
+        <p:blipFill>
+          <a:blip r:embed="rId2"/>
+          <a:stretch>
+            <a:fillRect/>
+          </a:stretch>
+        </p:blipFill>
+        <p:spPr>
+          <a:xfrm>
+            <a:off x="3669435" y="1037509"/>
+            <a:ext cx="7221117" cy="5734665"/>
+          </a:xfrm>
+        </p:spPr>
+      </p:pic>
+    </p:spTree>
+    <p:extLst>
+      <p:ext uri="{BB962C8B-B14F-4D97-AF65-F5344CB8AC3E}">
+        <p14:creationId xmlns:p14="http://schemas.microsoft.com/office/powerpoint/2010/main" val="301979160"/>
       </p:ext>
     </p:extLst>
   </p:cSld>
@@ -7827,7 +8552,506 @@
 </p:sld>
 </file>
 
-<file path=ppt/slides/slide11.xml><?xml version="1.0" encoding="utf-8"?>
+<file path=ppt/slides/slide17.xml><?xml version="1.0" encoding="utf-8"?>
+<p:sld xmlns:a="http://schemas.openxmlformats.org/drawingml/2006/main" xmlns:r="http://schemas.openxmlformats.org/officeDocument/2006/relationships" xmlns:p="http://schemas.openxmlformats.org/presentationml/2006/main">
+  <p:cSld>
+    <p:spTree>
+      <p:nvGrpSpPr>
+        <p:cNvPr id="1" name=""/>
+        <p:cNvGrpSpPr/>
+        <p:nvPr/>
+      </p:nvGrpSpPr>
+      <p:grpSpPr>
+        <a:xfrm>
+          <a:off x="0" y="0"/>
+          <a:ext cx="0" cy="0"/>
+          <a:chOff x="0" y="0"/>
+          <a:chExt cx="0" cy="0"/>
+        </a:xfrm>
+      </p:grpSpPr>
+      <p:sp>
+        <p:nvSpPr>
+          <p:cNvPr id="2" name="Title 1"/>
+          <p:cNvSpPr>
+            <a:spLocks noGrp="1"/>
+          </p:cNvSpPr>
+          <p:nvPr>
+            <p:ph type="title"/>
+          </p:nvPr>
+        </p:nvSpPr>
+        <p:spPr>
+          <a:xfrm>
+            <a:off x="3669435" y="211671"/>
+            <a:ext cx="6549832" cy="953003"/>
+          </a:xfrm>
+        </p:spPr>
+        <p:txBody>
+          <a:bodyPr>
+            <a:normAutofit/>
+          </a:bodyPr>
+          <a:lstStyle/>
+          <a:p>
+            <a:r>
+              <a:rPr lang="en-US" dirty="0"/>
+              <a:t>Admin - Help</a:t>
+            </a:r>
+          </a:p>
+        </p:txBody>
+      </p:sp>
+      <p:pic>
+        <p:nvPicPr>
+          <p:cNvPr id="5" name="Content Placeholder 4"/>
+          <p:cNvPicPr>
+            <a:picLocks noGrp="1" noChangeAspect="1"/>
+          </p:cNvPicPr>
+          <p:nvPr>
+            <p:ph idx="1"/>
+          </p:nvPr>
+        </p:nvPicPr>
+        <p:blipFill>
+          <a:blip r:embed="rId2"/>
+          <a:stretch>
+            <a:fillRect/>
+          </a:stretch>
+        </p:blipFill>
+        <p:spPr>
+          <a:xfrm>
+            <a:off x="3669434" y="1093815"/>
+            <a:ext cx="7164296" cy="5689540"/>
+          </a:xfrm>
+        </p:spPr>
+      </p:pic>
+    </p:spTree>
+    <p:extLst>
+      <p:ext uri="{BB962C8B-B14F-4D97-AF65-F5344CB8AC3E}">
+        <p14:creationId xmlns:p14="http://schemas.microsoft.com/office/powerpoint/2010/main" val="3907889059"/>
+      </p:ext>
+    </p:extLst>
+  </p:cSld>
+  <p:clrMapOvr>
+    <a:masterClrMapping/>
+  </p:clrMapOvr>
+</p:sld>
+</file>
+
+<file path=ppt/slides/slide18.xml><?xml version="1.0" encoding="utf-8"?>
+<p:sld xmlns:a="http://schemas.openxmlformats.org/drawingml/2006/main" xmlns:r="http://schemas.openxmlformats.org/officeDocument/2006/relationships" xmlns:p="http://schemas.openxmlformats.org/presentationml/2006/main">
+  <p:cSld>
+    <p:spTree>
+      <p:nvGrpSpPr>
+        <p:cNvPr id="1" name=""/>
+        <p:cNvGrpSpPr/>
+        <p:nvPr/>
+      </p:nvGrpSpPr>
+      <p:grpSpPr>
+        <a:xfrm>
+          <a:off x="0" y="0"/>
+          <a:ext cx="0" cy="0"/>
+          <a:chOff x="0" y="0"/>
+          <a:chExt cx="0" cy="0"/>
+        </a:xfrm>
+      </p:grpSpPr>
+      <p:sp>
+        <p:nvSpPr>
+          <p:cNvPr id="2" name="Title 1"/>
+          <p:cNvSpPr>
+            <a:spLocks noGrp="1"/>
+          </p:cNvSpPr>
+          <p:nvPr>
+            <p:ph type="title"/>
+          </p:nvPr>
+        </p:nvSpPr>
+        <p:spPr>
+          <a:xfrm>
+            <a:off x="3669435" y="211671"/>
+            <a:ext cx="6549832" cy="953003"/>
+          </a:xfrm>
+        </p:spPr>
+        <p:txBody>
+          <a:bodyPr>
+            <a:normAutofit/>
+          </a:bodyPr>
+          <a:lstStyle/>
+          <a:p>
+            <a:r>
+              <a:rPr lang="en-US" dirty="0"/>
+              <a:t>Dashboard - Category</a:t>
+            </a:r>
+          </a:p>
+        </p:txBody>
+      </p:sp>
+      <p:pic>
+        <p:nvPicPr>
+          <p:cNvPr id="5" name="Content Placeholder 4"/>
+          <p:cNvPicPr>
+            <a:picLocks noGrp="1" noChangeAspect="1"/>
+          </p:cNvPicPr>
+          <p:nvPr>
+            <p:ph idx="1"/>
+          </p:nvPr>
+        </p:nvPicPr>
+        <p:blipFill>
+          <a:blip r:embed="rId2"/>
+          <a:stretch>
+            <a:fillRect/>
+          </a:stretch>
+        </p:blipFill>
+        <p:spPr>
+          <a:xfrm>
+            <a:off x="2178104" y="1380931"/>
+            <a:ext cx="9754621" cy="5053736"/>
+          </a:xfrm>
+        </p:spPr>
+      </p:pic>
+    </p:spTree>
+    <p:extLst>
+      <p:ext uri="{BB962C8B-B14F-4D97-AF65-F5344CB8AC3E}">
+        <p14:creationId xmlns:p14="http://schemas.microsoft.com/office/powerpoint/2010/main" val="693535125"/>
+      </p:ext>
+    </p:extLst>
+  </p:cSld>
+  <p:clrMapOvr>
+    <a:masterClrMapping/>
+  </p:clrMapOvr>
+</p:sld>
+</file>
+
+<file path=ppt/slides/slide19.xml><?xml version="1.0" encoding="utf-8"?>
+<p:sld xmlns:a="http://schemas.openxmlformats.org/drawingml/2006/main" xmlns:r="http://schemas.openxmlformats.org/officeDocument/2006/relationships" xmlns:p="http://schemas.openxmlformats.org/presentationml/2006/main">
+  <p:cSld>
+    <p:spTree>
+      <p:nvGrpSpPr>
+        <p:cNvPr id="1" name=""/>
+        <p:cNvGrpSpPr/>
+        <p:nvPr/>
+      </p:nvGrpSpPr>
+      <p:grpSpPr>
+        <a:xfrm>
+          <a:off x="0" y="0"/>
+          <a:ext cx="0" cy="0"/>
+          <a:chOff x="0" y="0"/>
+          <a:chExt cx="0" cy="0"/>
+        </a:xfrm>
+      </p:grpSpPr>
+      <p:sp>
+        <p:nvSpPr>
+          <p:cNvPr id="2" name="Title 1"/>
+          <p:cNvSpPr>
+            <a:spLocks noGrp="1"/>
+          </p:cNvSpPr>
+          <p:nvPr>
+            <p:ph type="title"/>
+          </p:nvPr>
+        </p:nvSpPr>
+        <p:spPr>
+          <a:xfrm>
+            <a:off x="189116" y="1284691"/>
+            <a:ext cx="2787349" cy="2624836"/>
+          </a:xfrm>
+        </p:spPr>
+        <p:txBody>
+          <a:bodyPr>
+            <a:normAutofit/>
+          </a:bodyPr>
+          <a:lstStyle/>
+          <a:p>
+            <a:r>
+              <a:rPr lang="en-US" dirty="0"/>
+              <a:t>Dashboard - Products</a:t>
+            </a:r>
+          </a:p>
+        </p:txBody>
+      </p:sp>
+      <p:pic>
+        <p:nvPicPr>
+          <p:cNvPr id="5" name="Content Placeholder 4"/>
+          <p:cNvPicPr>
+            <a:picLocks noGrp="1" noChangeAspect="1"/>
+          </p:cNvPicPr>
+          <p:nvPr>
+            <p:ph idx="1"/>
+          </p:nvPr>
+        </p:nvPicPr>
+        <p:blipFill>
+          <a:blip r:embed="rId2"/>
+          <a:stretch>
+            <a:fillRect/>
+          </a:stretch>
+        </p:blipFill>
+        <p:spPr>
+          <a:xfrm>
+            <a:off x="3191068" y="1"/>
+            <a:ext cx="8826215" cy="6858000"/>
+          </a:xfrm>
+        </p:spPr>
+      </p:pic>
+    </p:spTree>
+    <p:extLst>
+      <p:ext uri="{BB962C8B-B14F-4D97-AF65-F5344CB8AC3E}">
+        <p14:creationId xmlns:p14="http://schemas.microsoft.com/office/powerpoint/2010/main" val="3695523249"/>
+      </p:ext>
+    </p:extLst>
+  </p:cSld>
+  <p:clrMapOvr>
+    <a:masterClrMapping/>
+  </p:clrMapOvr>
+</p:sld>
+</file>
+
+<file path=ppt/slides/slide2.xml><?xml version="1.0" encoding="utf-8"?>
+<p:sld xmlns:a="http://schemas.openxmlformats.org/drawingml/2006/main" xmlns:r="http://schemas.openxmlformats.org/officeDocument/2006/relationships" xmlns:p="http://schemas.openxmlformats.org/presentationml/2006/main">
+  <p:cSld>
+    <p:spTree>
+      <p:nvGrpSpPr>
+        <p:cNvPr id="1" name=""/>
+        <p:cNvGrpSpPr/>
+        <p:nvPr/>
+      </p:nvGrpSpPr>
+      <p:grpSpPr>
+        <a:xfrm>
+          <a:off x="0" y="0"/>
+          <a:ext cx="0" cy="0"/>
+          <a:chOff x="0" y="0"/>
+          <a:chExt cx="0" cy="0"/>
+        </a:xfrm>
+      </p:grpSpPr>
+      <p:sp>
+        <p:nvSpPr>
+          <p:cNvPr id="2" name="Title 1"/>
+          <p:cNvSpPr>
+            <a:spLocks noGrp="1"/>
+          </p:cNvSpPr>
+          <p:nvPr>
+            <p:ph type="title"/>
+          </p:nvPr>
+        </p:nvSpPr>
+        <p:spPr>
+          <a:xfrm>
+            <a:off x="2425147" y="887532"/>
+            <a:ext cx="7142922" cy="953003"/>
+          </a:xfrm>
+        </p:spPr>
+        <p:txBody>
+          <a:bodyPr>
+            <a:normAutofit/>
+          </a:bodyPr>
+          <a:lstStyle/>
+          <a:p>
+            <a:r>
+              <a:rPr lang="en-US" dirty="0"/>
+              <a:t>Login page for all employees</a:t>
+            </a:r>
+          </a:p>
+        </p:txBody>
+      </p:sp>
+      <p:pic>
+        <p:nvPicPr>
+          <p:cNvPr id="4" name="Content Placeholder 3"/>
+          <p:cNvPicPr>
+            <a:picLocks noGrp="1" noChangeAspect="1"/>
+          </p:cNvPicPr>
+          <p:nvPr>
+            <p:ph idx="1"/>
+          </p:nvPr>
+        </p:nvPicPr>
+        <p:blipFill>
+          <a:blip r:embed="rId2"/>
+          <a:stretch>
+            <a:fillRect/>
+          </a:stretch>
+        </p:blipFill>
+        <p:spPr>
+          <a:xfrm>
+            <a:off x="2665305" y="1590261"/>
+            <a:ext cx="6608657" cy="3922643"/>
+          </a:xfrm>
+        </p:spPr>
+      </p:pic>
+    </p:spTree>
+    <p:extLst>
+      <p:ext uri="{BB962C8B-B14F-4D97-AF65-F5344CB8AC3E}">
+        <p14:creationId xmlns:p14="http://schemas.microsoft.com/office/powerpoint/2010/main" val="576732689"/>
+      </p:ext>
+    </p:extLst>
+  </p:cSld>
+  <p:clrMapOvr>
+    <a:masterClrMapping/>
+  </p:clrMapOvr>
+</p:sld>
+</file>
+
+<file path=ppt/slides/slide20.xml><?xml version="1.0" encoding="utf-8"?>
+<p:sld xmlns:a="http://schemas.openxmlformats.org/drawingml/2006/main" xmlns:r="http://schemas.openxmlformats.org/officeDocument/2006/relationships" xmlns:p="http://schemas.openxmlformats.org/presentationml/2006/main">
+  <p:cSld>
+    <p:spTree>
+      <p:nvGrpSpPr>
+        <p:cNvPr id="1" name=""/>
+        <p:cNvGrpSpPr/>
+        <p:nvPr/>
+      </p:nvGrpSpPr>
+      <p:grpSpPr>
+        <a:xfrm>
+          <a:off x="0" y="0"/>
+          <a:ext cx="0" cy="0"/>
+          <a:chOff x="0" y="0"/>
+          <a:chExt cx="0" cy="0"/>
+        </a:xfrm>
+      </p:grpSpPr>
+      <p:sp>
+        <p:nvSpPr>
+          <p:cNvPr id="2" name="Title 1"/>
+          <p:cNvSpPr>
+            <a:spLocks noGrp="1"/>
+          </p:cNvSpPr>
+          <p:nvPr>
+            <p:ph type="title"/>
+          </p:nvPr>
+        </p:nvSpPr>
+        <p:spPr>
+          <a:xfrm>
+            <a:off x="205038" y="1351118"/>
+            <a:ext cx="3207227" cy="1568251"/>
+          </a:xfrm>
+        </p:spPr>
+        <p:txBody>
+          <a:bodyPr>
+            <a:normAutofit/>
+          </a:bodyPr>
+          <a:lstStyle/>
+          <a:p>
+            <a:r>
+              <a:rPr lang="en-US" dirty="0"/>
+              <a:t>Dashboard - Employee</a:t>
+            </a:r>
+          </a:p>
+        </p:txBody>
+      </p:sp>
+      <p:pic>
+        <p:nvPicPr>
+          <p:cNvPr id="4" name="Content Placeholder 3"/>
+          <p:cNvPicPr>
+            <a:picLocks noGrp="1" noChangeAspect="1"/>
+          </p:cNvPicPr>
+          <p:nvPr>
+            <p:ph idx="1"/>
+          </p:nvPr>
+        </p:nvPicPr>
+        <p:blipFill>
+          <a:blip r:embed="rId2"/>
+          <a:stretch>
+            <a:fillRect/>
+          </a:stretch>
+        </p:blipFill>
+        <p:spPr>
+          <a:xfrm>
+            <a:off x="3806890" y="41897"/>
+            <a:ext cx="6830350" cy="6786678"/>
+          </a:xfrm>
+        </p:spPr>
+      </p:pic>
+    </p:spTree>
+    <p:extLst>
+      <p:ext uri="{BB962C8B-B14F-4D97-AF65-F5344CB8AC3E}">
+        <p14:creationId xmlns:p14="http://schemas.microsoft.com/office/powerpoint/2010/main" val="1808809744"/>
+      </p:ext>
+    </p:extLst>
+  </p:cSld>
+  <p:clrMapOvr>
+    <a:masterClrMapping/>
+  </p:clrMapOvr>
+</p:sld>
+</file>
+
+<file path=ppt/slides/slide21.xml><?xml version="1.0" encoding="utf-8"?>
+<p:sld xmlns:a="http://schemas.openxmlformats.org/drawingml/2006/main" xmlns:r="http://schemas.openxmlformats.org/officeDocument/2006/relationships" xmlns:p="http://schemas.openxmlformats.org/presentationml/2006/main">
+  <p:cSld>
+    <p:spTree>
+      <p:nvGrpSpPr>
+        <p:cNvPr id="1" name=""/>
+        <p:cNvGrpSpPr/>
+        <p:nvPr/>
+      </p:nvGrpSpPr>
+      <p:grpSpPr>
+        <a:xfrm>
+          <a:off x="0" y="0"/>
+          <a:ext cx="0" cy="0"/>
+          <a:chOff x="0" y="0"/>
+          <a:chExt cx="0" cy="0"/>
+        </a:xfrm>
+      </p:grpSpPr>
+      <p:sp>
+        <p:nvSpPr>
+          <p:cNvPr id="2" name="Title 1"/>
+          <p:cNvSpPr>
+            <a:spLocks noGrp="1"/>
+          </p:cNvSpPr>
+          <p:nvPr>
+            <p:ph type="title"/>
+          </p:nvPr>
+        </p:nvSpPr>
+        <p:spPr>
+          <a:xfrm>
+            <a:off x="3669435" y="211671"/>
+            <a:ext cx="6549832" cy="953003"/>
+          </a:xfrm>
+        </p:spPr>
+        <p:txBody>
+          <a:bodyPr>
+            <a:normAutofit/>
+          </a:bodyPr>
+          <a:lstStyle/>
+          <a:p>
+            <a:r>
+              <a:rPr lang="en-US" dirty="0"/>
+              <a:t>Dashboard - Report</a:t>
+            </a:r>
+          </a:p>
+        </p:txBody>
+      </p:sp>
+      <p:pic>
+        <p:nvPicPr>
+          <p:cNvPr id="4" name="Content Placeholder 3"/>
+          <p:cNvPicPr>
+            <a:picLocks noGrp="1" noChangeAspect="1"/>
+          </p:cNvPicPr>
+          <p:nvPr>
+            <p:ph idx="1"/>
+          </p:nvPr>
+        </p:nvPicPr>
+        <p:blipFill>
+          <a:blip r:embed="rId2"/>
+          <a:stretch>
+            <a:fillRect/>
+          </a:stretch>
+        </p:blipFill>
+        <p:spPr>
+          <a:xfrm>
+            <a:off x="2307164" y="1349633"/>
+            <a:ext cx="9848222" cy="4929870"/>
+          </a:xfrm>
+        </p:spPr>
+      </p:pic>
+    </p:spTree>
+    <p:extLst>
+      <p:ext uri="{BB962C8B-B14F-4D97-AF65-F5344CB8AC3E}">
+        <p14:creationId xmlns:p14="http://schemas.microsoft.com/office/powerpoint/2010/main" val="156837060"/>
+      </p:ext>
+    </p:extLst>
+  </p:cSld>
+  <p:clrMapOvr>
+    <a:masterClrMapping/>
+  </p:clrMapOvr>
+  <p:timing>
+    <p:tnLst>
+      <p:par>
+        <p:cTn id="1" dur="indefinite" restart="never" nodeType="tmRoot"/>
+      </p:par>
+    </p:tnLst>
+  </p:timing>
+</p:sld>
+</file>
+
+<file path=ppt/slides/slide22.xml><?xml version="1.0" encoding="utf-8"?>
 <p:sld xmlns:a="http://schemas.openxmlformats.org/drawingml/2006/main" xmlns:r="http://schemas.openxmlformats.org/officeDocument/2006/relationships" xmlns:p="http://schemas.openxmlformats.org/presentationml/2006/main">
   <p:cSld>
     <p:spTree>
@@ -7862,8 +9086,104 @@
         </p:blipFill>
         <p:spPr>
           <a:xfrm>
-            <a:off x="1751327" y="-1"/>
-            <a:ext cx="10409007" cy="5169159"/>
+            <a:off x="1668503" y="68388"/>
+            <a:ext cx="10317552" cy="6704673"/>
+          </a:xfrm>
+        </p:spPr>
+      </p:pic>
+      <p:sp>
+        <p:nvSpPr>
+          <p:cNvPr id="2" name="Title 1"/>
+          <p:cNvSpPr>
+            <a:spLocks noGrp="1"/>
+          </p:cNvSpPr>
+          <p:nvPr>
+            <p:ph type="title"/>
+          </p:nvPr>
+        </p:nvSpPr>
+        <p:spPr>
+          <a:xfrm>
+            <a:off x="6362301" y="1629411"/>
+            <a:ext cx="5432620" cy="652395"/>
+          </a:xfrm>
+        </p:spPr>
+        <p:txBody>
+          <a:bodyPr>
+            <a:normAutofit/>
+          </a:bodyPr>
+          <a:lstStyle/>
+          <a:p>
+            <a:r>
+              <a:rPr lang="en-US" sz="3200" dirty="0">
+                <a:solidFill>
+                  <a:schemeClr val="bg1"/>
+                </a:solidFill>
+                <a:highlight>
+                  <a:srgbClr val="800000"/>
+                </a:highlight>
+              </a:rPr>
+              <a:t>Ribbon challenge</a:t>
+            </a:r>
+          </a:p>
+        </p:txBody>
+      </p:sp>
+    </p:spTree>
+    <p:extLst>
+      <p:ext uri="{BB962C8B-B14F-4D97-AF65-F5344CB8AC3E}">
+        <p14:creationId xmlns:p14="http://schemas.microsoft.com/office/powerpoint/2010/main" val="3571432278"/>
+      </p:ext>
+    </p:extLst>
+  </p:cSld>
+  <p:clrMapOvr>
+    <a:masterClrMapping/>
+  </p:clrMapOvr>
+  <p:timing>
+    <p:tnLst>
+      <p:par>
+        <p:cTn id="1" dur="indefinite" restart="never" nodeType="tmRoot"/>
+      </p:par>
+    </p:tnLst>
+  </p:timing>
+</p:sld>
+</file>
+
+<file path=ppt/slides/slide23.xml><?xml version="1.0" encoding="utf-8"?>
+<p:sld xmlns:a="http://schemas.openxmlformats.org/drawingml/2006/main" xmlns:r="http://schemas.openxmlformats.org/officeDocument/2006/relationships" xmlns:p="http://schemas.openxmlformats.org/presentationml/2006/main">
+  <p:cSld>
+    <p:spTree>
+      <p:nvGrpSpPr>
+        <p:cNvPr id="1" name=""/>
+        <p:cNvGrpSpPr/>
+        <p:nvPr/>
+      </p:nvGrpSpPr>
+      <p:grpSpPr>
+        <a:xfrm>
+          <a:off x="0" y="0"/>
+          <a:ext cx="0" cy="0"/>
+          <a:chOff x="0" y="0"/>
+          <a:chExt cx="0" cy="0"/>
+        </a:xfrm>
+      </p:grpSpPr>
+      <p:pic>
+        <p:nvPicPr>
+          <p:cNvPr id="4" name="Content Placeholder 3"/>
+          <p:cNvPicPr>
+            <a:picLocks noGrp="1" noChangeAspect="1"/>
+          </p:cNvPicPr>
+          <p:nvPr>
+            <p:ph idx="1"/>
+          </p:nvPr>
+        </p:nvPicPr>
+        <p:blipFill>
+          <a:blip r:embed="rId2"/>
+          <a:stretch>
+            <a:fillRect/>
+          </a:stretch>
+        </p:blipFill>
+        <p:spPr>
+          <a:xfrm>
+            <a:off x="1751327" y="86546"/>
+            <a:ext cx="10234727" cy="5082611"/>
           </a:xfrm>
         </p:spPr>
       </p:pic>
@@ -7995,7 +9315,7 @@
         <p:spPr>
           <a:xfrm>
             <a:off x="1751328" y="5368740"/>
-            <a:ext cx="10303930" cy="1330640"/>
+            <a:ext cx="10234726" cy="1330640"/>
           </a:xfrm>
           <a:prstGeom prst="rect">
             <a:avLst/>
@@ -8012,10 +9332,17 @@
   <p:clrMapOvr>
     <a:masterClrMapping/>
   </p:clrMapOvr>
+  <p:timing>
+    <p:tnLst>
+      <p:par>
+        <p:cTn id="1" dur="indefinite" restart="never" nodeType="tmRoot"/>
+      </p:par>
+    </p:tnLst>
+  </p:timing>
 </p:sld>
 </file>
 
-<file path=ppt/slides/slide12.xml><?xml version="1.0" encoding="utf-8"?>
+<file path=ppt/slides/slide24.xml><?xml version="1.0" encoding="utf-8"?>
 <p:sld xmlns:a="http://schemas.openxmlformats.org/drawingml/2006/main" xmlns:r="http://schemas.openxmlformats.org/officeDocument/2006/relationships" xmlns:p="http://schemas.openxmlformats.org/presentationml/2006/main">
   <p:cSld>
     <p:spTree>
@@ -8050,8 +9377,8 @@
         </p:blipFill>
         <p:spPr>
           <a:xfrm>
-            <a:off x="1744910" y="31879"/>
-            <a:ext cx="10251347" cy="5435496"/>
+            <a:off x="1744910" y="120279"/>
+            <a:ext cx="10084625" cy="5347096"/>
           </a:xfrm>
         </p:spPr>
       </p:pic>
@@ -8091,7 +9418,7 @@
         </p:nvSpPr>
         <p:spPr>
           <a:xfrm>
-            <a:off x="6848862" y="1344186"/>
+            <a:off x="6865338" y="1393614"/>
             <a:ext cx="4098771" cy="652395"/>
           </a:xfrm>
         </p:spPr>
@@ -8128,7 +9455,7 @@
 </p:sld>
 </file>
 
-<file path=ppt/slides/slide13.xml><?xml version="1.0" encoding="utf-8"?>
+<file path=ppt/slides/slide25.xml><?xml version="1.0" encoding="utf-8"?>
 <p:sld xmlns:a="http://schemas.openxmlformats.org/drawingml/2006/main" xmlns:r="http://schemas.openxmlformats.org/officeDocument/2006/relationships" xmlns:p="http://schemas.openxmlformats.org/presentationml/2006/main">
   <p:cSld>
     <p:spTree>
@@ -8298,7 +9625,7 @@
 </p:sld>
 </file>
 
-<file path=ppt/slides/slide14.xml><?xml version="1.0" encoding="utf-8"?>
+<file path=ppt/slides/slide26.xml><?xml version="1.0" encoding="utf-8"?>
 <p:sld xmlns:a="http://schemas.openxmlformats.org/drawingml/2006/main" xmlns:r="http://schemas.openxmlformats.org/officeDocument/2006/relationships" xmlns:p="http://schemas.openxmlformats.org/presentationml/2006/main">
   <p:cSld>
     <p:spTree>
@@ -8354,8 +9681,13 @@
           <a:p>
             <a:r>
               <a:rPr lang="en-US" dirty="0"/>
-              <a:t>Completing report</a:t>
-            </a:r>
+              <a:t>Completing </a:t>
+            </a:r>
+            <a:r>
+              <a:rPr lang="en-US" dirty="0" smtClean="0"/>
+              <a:t>report (such as financial, HR, …)</a:t>
+            </a:r>
+            <a:endParaRPr lang="en-US" dirty="0"/>
           </a:p>
           <a:p>
             <a:r>
@@ -8378,13 +9710,8 @@
           <a:p>
             <a:r>
               <a:rPr lang="en-US" dirty="0"/>
-              <a:t>Making more </a:t>
-            </a:r>
-            <a:r>
-              <a:rPr lang="en-US"/>
-              <a:t>powerful field checking</a:t>
-            </a:r>
-            <a:endParaRPr lang="en-US" dirty="0"/>
+              <a:t>Making more powerful field checking</a:t>
+            </a:r>
           </a:p>
         </p:txBody>
       </p:sp>
@@ -8392,88 +9719,6 @@
     <p:extLst>
       <p:ext uri="{BB962C8B-B14F-4D97-AF65-F5344CB8AC3E}">
         <p14:creationId xmlns:p14="http://schemas.microsoft.com/office/powerpoint/2010/main" val="900369380"/>
-      </p:ext>
-    </p:extLst>
-  </p:cSld>
-  <p:clrMapOvr>
-    <a:masterClrMapping/>
-  </p:clrMapOvr>
-</p:sld>
-</file>
-
-<file path=ppt/slides/slide2.xml><?xml version="1.0" encoding="utf-8"?>
-<p:sld xmlns:a="http://schemas.openxmlformats.org/drawingml/2006/main" xmlns:r="http://schemas.openxmlformats.org/officeDocument/2006/relationships" xmlns:p="http://schemas.openxmlformats.org/presentationml/2006/main">
-  <p:cSld>
-    <p:spTree>
-      <p:nvGrpSpPr>
-        <p:cNvPr id="1" name=""/>
-        <p:cNvGrpSpPr/>
-        <p:nvPr/>
-      </p:nvGrpSpPr>
-      <p:grpSpPr>
-        <a:xfrm>
-          <a:off x="0" y="0"/>
-          <a:ext cx="0" cy="0"/>
-          <a:chOff x="0" y="0"/>
-          <a:chExt cx="0" cy="0"/>
-        </a:xfrm>
-      </p:grpSpPr>
-      <p:sp>
-        <p:nvSpPr>
-          <p:cNvPr id="2" name="Title 1"/>
-          <p:cNvSpPr>
-            <a:spLocks noGrp="1"/>
-          </p:cNvSpPr>
-          <p:nvPr>
-            <p:ph type="title"/>
-          </p:nvPr>
-        </p:nvSpPr>
-        <p:spPr>
-          <a:xfrm>
-            <a:off x="3669435" y="211671"/>
-            <a:ext cx="4492432" cy="953003"/>
-          </a:xfrm>
-        </p:spPr>
-        <p:txBody>
-          <a:bodyPr>
-            <a:normAutofit/>
-          </a:bodyPr>
-          <a:lstStyle/>
-          <a:p>
-            <a:r>
-              <a:rPr lang="en-US" dirty="0"/>
-              <a:t>Login page</a:t>
-            </a:r>
-          </a:p>
-        </p:txBody>
-      </p:sp>
-      <p:pic>
-        <p:nvPicPr>
-          <p:cNvPr id="6" name="Content Placeholder 5"/>
-          <p:cNvPicPr>
-            <a:picLocks noGrp="1" noChangeAspect="1"/>
-          </p:cNvPicPr>
-          <p:nvPr>
-            <p:ph idx="1"/>
-          </p:nvPr>
-        </p:nvPicPr>
-        <p:blipFill>
-          <a:blip r:embed="rId2"/>
-          <a:stretch>
-            <a:fillRect/>
-          </a:stretch>
-        </p:blipFill>
-        <p:spPr>
-          <a:xfrm>
-            <a:off x="3643533" y="1903445"/>
-            <a:ext cx="6262291" cy="4149248"/>
-          </a:xfrm>
-        </p:spPr>
-      </p:pic>
-    </p:spTree>
-    <p:extLst>
-      <p:ext uri="{BB962C8B-B14F-4D97-AF65-F5344CB8AC3E}">
-        <p14:creationId xmlns:p14="http://schemas.microsoft.com/office/powerpoint/2010/main" val="2848497588"/>
       </p:ext>
     </p:extLst>
   </p:cSld>
@@ -8512,19 +9757,17 @@
         </p:nvSpPr>
         <p:spPr>
           <a:xfrm>
-            <a:off x="3669435" y="211671"/>
-            <a:ext cx="4492432" cy="953003"/>
-          </a:xfrm>
-        </p:spPr>
-        <p:txBody>
-          <a:bodyPr>
-            <a:normAutofit/>
-          </a:bodyPr>
+            <a:off x="2208612" y="292805"/>
+            <a:ext cx="8911687" cy="1280890"/>
+          </a:xfrm>
+        </p:spPr>
+        <p:txBody>
+          <a:bodyPr/>
           <a:lstStyle/>
           <a:p>
             <a:r>
-              <a:rPr lang="en-US" dirty="0"/>
-              <a:t>Admin - File</a:t>
+              <a:rPr lang="en-CA" dirty="0"/>
+              <a:t>Cashier Form</a:t>
             </a:r>
           </a:p>
         </p:txBody>
@@ -8547,15 +9790,15 @@
         </p:blipFill>
         <p:spPr>
           <a:xfrm>
-            <a:off x="3669435" y="1011400"/>
-            <a:ext cx="7215401" cy="5730126"/>
+            <a:off x="1344549" y="1150848"/>
+            <a:ext cx="9530930" cy="5263203"/>
           </a:xfrm>
         </p:spPr>
       </p:pic>
     </p:spTree>
     <p:extLst>
       <p:ext uri="{BB962C8B-B14F-4D97-AF65-F5344CB8AC3E}">
-        <p14:creationId xmlns:p14="http://schemas.microsoft.com/office/powerpoint/2010/main" val="3798796465"/>
+        <p14:creationId xmlns:p14="http://schemas.microsoft.com/office/powerpoint/2010/main" val="4184334311"/>
       </p:ext>
     </p:extLst>
   </p:cSld>
@@ -8592,21 +9835,14 @@
             <p:ph type="title"/>
           </p:nvPr>
         </p:nvSpPr>
-        <p:spPr>
-          <a:xfrm>
-            <a:off x="3669435" y="211671"/>
-            <a:ext cx="6549832" cy="953003"/>
-          </a:xfrm>
-        </p:spPr>
-        <p:txBody>
-          <a:bodyPr>
-            <a:normAutofit/>
-          </a:bodyPr>
+        <p:spPr/>
+        <p:txBody>
+          <a:bodyPr/>
           <a:lstStyle/>
           <a:p>
             <a:r>
-              <a:rPr lang="en-US" dirty="0"/>
-              <a:t>Admin - Dashboard</a:t>
+              <a:rPr lang="en-CA" dirty="0"/>
+              <a:t>Find product with barcode</a:t>
             </a:r>
           </a:p>
         </p:txBody>
@@ -8629,15 +9865,15 @@
         </p:blipFill>
         <p:spPr>
           <a:xfrm>
-            <a:off x="3669435" y="1037509"/>
-            <a:ext cx="7221117" cy="5734665"/>
+            <a:off x="1563757" y="1577534"/>
+            <a:ext cx="9300243" cy="4147406"/>
           </a:xfrm>
         </p:spPr>
       </p:pic>
     </p:spTree>
     <p:extLst>
       <p:ext uri="{BB962C8B-B14F-4D97-AF65-F5344CB8AC3E}">
-        <p14:creationId xmlns:p14="http://schemas.microsoft.com/office/powerpoint/2010/main" val="301979160"/>
+        <p14:creationId xmlns:p14="http://schemas.microsoft.com/office/powerpoint/2010/main" val="678316034"/>
       </p:ext>
     </p:extLst>
   </p:cSld>
@@ -8674,28 +9910,21 @@
             <p:ph type="title"/>
           </p:nvPr>
         </p:nvSpPr>
-        <p:spPr>
-          <a:xfrm>
-            <a:off x="3669435" y="211671"/>
-            <a:ext cx="6549832" cy="953003"/>
-          </a:xfrm>
-        </p:spPr>
-        <p:txBody>
-          <a:bodyPr>
-            <a:normAutofit/>
-          </a:bodyPr>
+        <p:spPr/>
+        <p:txBody>
+          <a:bodyPr/>
           <a:lstStyle/>
           <a:p>
             <a:r>
-              <a:rPr lang="en-US" dirty="0"/>
-              <a:t>Admin - Help</a:t>
+              <a:rPr lang="en-CA" dirty="0"/>
+              <a:t>Find product with product name</a:t>
             </a:r>
           </a:p>
         </p:txBody>
       </p:sp>
       <p:pic>
         <p:nvPicPr>
-          <p:cNvPr id="5" name="Content Placeholder 4"/>
+          <p:cNvPr id="4" name="Content Placeholder 3"/>
           <p:cNvPicPr>
             <a:picLocks noGrp="1" noChangeAspect="1"/>
           </p:cNvPicPr>
@@ -8711,15 +9940,15 @@
         </p:blipFill>
         <p:spPr>
           <a:xfrm>
-            <a:off x="3669434" y="1093815"/>
-            <a:ext cx="7164296" cy="5689540"/>
+            <a:off x="1213885" y="2279280"/>
+            <a:ext cx="10290728" cy="3445659"/>
           </a:xfrm>
         </p:spPr>
       </p:pic>
     </p:spTree>
     <p:extLst>
       <p:ext uri="{BB962C8B-B14F-4D97-AF65-F5344CB8AC3E}">
-        <p14:creationId xmlns:p14="http://schemas.microsoft.com/office/powerpoint/2010/main" val="3907889059"/>
+        <p14:creationId xmlns:p14="http://schemas.microsoft.com/office/powerpoint/2010/main" val="2904138339"/>
       </p:ext>
     </p:extLst>
   </p:cSld>
@@ -8756,10 +9985,32 @@
             <p:ph type="title"/>
           </p:nvPr>
         </p:nvSpPr>
+        <p:spPr/>
+        <p:txBody>
+          <a:bodyPr/>
+          <a:lstStyle/>
+          <a:p>
+            <a:r>
+              <a:rPr lang="en-CA" dirty="0"/>
+              <a:t>Main issues in Cashier Side </a:t>
+            </a:r>
+          </a:p>
+        </p:txBody>
+      </p:sp>
+      <p:sp>
+        <p:nvSpPr>
+          <p:cNvPr id="3" name="Content Placeholder 2"/>
+          <p:cNvSpPr>
+            <a:spLocks noGrp="1"/>
+          </p:cNvSpPr>
+          <p:nvPr>
+            <p:ph idx="1"/>
+          </p:nvPr>
+        </p:nvSpPr>
         <p:spPr>
           <a:xfrm>
-            <a:off x="3669435" y="211671"/>
-            <a:ext cx="6549832" cy="953003"/>
+            <a:off x="1749287" y="1683026"/>
+            <a:ext cx="9755325" cy="4228196"/>
           </a:xfrm>
         </p:spPr>
         <p:txBody>
@@ -8769,39 +10020,36 @@
           <a:lstStyle/>
           <a:p>
             <a:r>
-              <a:rPr lang="en-US" dirty="0"/>
-              <a:t>Dashboard - Category</a:t>
-            </a:r>
-          </a:p>
-        </p:txBody>
-      </p:sp>
-      <p:pic>
-        <p:nvPicPr>
-          <p:cNvPr id="5" name="Content Placeholder 4"/>
-          <p:cNvPicPr>
-            <a:picLocks noGrp="1" noChangeAspect="1"/>
-          </p:cNvPicPr>
-          <p:nvPr>
-            <p:ph idx="1"/>
-          </p:nvPr>
-        </p:nvPicPr>
-        <p:blipFill>
-          <a:blip r:embed="rId2"/>
-          <a:stretch>
-            <a:fillRect/>
-          </a:stretch>
-        </p:blipFill>
-        <p:spPr>
-          <a:xfrm>
-            <a:off x="2178104" y="1380931"/>
-            <a:ext cx="9754621" cy="5053736"/>
-          </a:xfrm>
-        </p:spPr>
-      </p:pic>
+              <a:rPr lang="en-CA" sz="2800" dirty="0"/>
+              <a:t>Calculated values(columns) in </a:t>
+            </a:r>
+            <a:r>
+              <a:rPr lang="en-CA" sz="2800" dirty="0" smtClean="0"/>
+              <a:t>Data grids </a:t>
+            </a:r>
+            <a:r>
+              <a:rPr lang="en-CA" sz="2800" dirty="0"/>
+              <a:t>that don’t  exist in DB(in tables)</a:t>
+            </a:r>
+          </a:p>
+          <a:p>
+            <a:r>
+              <a:rPr lang="en-CA" sz="2800" dirty="0"/>
+              <a:t>Db Transaction for submitting customer Order and receipt</a:t>
+            </a:r>
+          </a:p>
+          <a:p>
+            <a:r>
+              <a:rPr lang="en-CA" sz="2800" dirty="0"/>
+              <a:t>Pdf-printing for receipt and reports</a:t>
+            </a:r>
+          </a:p>
+        </p:txBody>
+      </p:sp>
     </p:spTree>
     <p:extLst>
       <p:ext uri="{BB962C8B-B14F-4D97-AF65-F5344CB8AC3E}">
-        <p14:creationId xmlns:p14="http://schemas.microsoft.com/office/powerpoint/2010/main" val="693535125"/>
+        <p14:creationId xmlns:p14="http://schemas.microsoft.com/office/powerpoint/2010/main" val="2762127227"/>
       </p:ext>
     </p:extLst>
   </p:cSld>
@@ -8840,26 +10088,33 @@
         </p:nvSpPr>
         <p:spPr>
           <a:xfrm>
-            <a:off x="189116" y="1284691"/>
-            <a:ext cx="2787349" cy="2624836"/>
-          </a:xfrm>
-        </p:spPr>
-        <p:txBody>
-          <a:bodyPr>
-            <a:normAutofit/>
-          </a:bodyPr>
+            <a:off x="1378227" y="332562"/>
+            <a:ext cx="10389704" cy="1280890"/>
+          </a:xfrm>
+        </p:spPr>
+        <p:txBody>
+          <a:bodyPr/>
           <a:lstStyle/>
           <a:p>
-            <a:r>
-              <a:rPr lang="en-US" dirty="0"/>
-              <a:t>Dashboard - Products</a:t>
+            <a:pPr algn="ctr"/>
+            <a:r>
+              <a:rPr lang="en-CA" dirty="0"/>
+              <a:t>Daily price (Update price)- </a:t>
+            </a:r>
+            <a:r>
+              <a:rPr lang="en-CA" sz="2400" dirty="0">
+                <a:solidFill>
+                  <a:srgbClr val="0070C0"/>
+                </a:solidFill>
+              </a:rPr>
+              <a:t>Calculated column </a:t>
             </a:r>
           </a:p>
         </p:txBody>
       </p:sp>
       <p:pic>
         <p:nvPicPr>
-          <p:cNvPr id="5" name="Content Placeholder 4"/>
+          <p:cNvPr id="4" name="Content Placeholder 3"/>
           <p:cNvPicPr>
             <a:picLocks noGrp="1" noChangeAspect="1"/>
           </p:cNvPicPr>
@@ -8875,15 +10130,15 @@
         </p:blipFill>
         <p:spPr>
           <a:xfrm>
-            <a:off x="3191068" y="1"/>
-            <a:ext cx="8826215" cy="6858000"/>
+            <a:off x="1961323" y="1113348"/>
+            <a:ext cx="8931964" cy="5109819"/>
           </a:xfrm>
         </p:spPr>
       </p:pic>
     </p:spTree>
     <p:extLst>
       <p:ext uri="{BB962C8B-B14F-4D97-AF65-F5344CB8AC3E}">
-        <p14:creationId xmlns:p14="http://schemas.microsoft.com/office/powerpoint/2010/main" val="3695523249"/>
+        <p14:creationId xmlns:p14="http://schemas.microsoft.com/office/powerpoint/2010/main" val="2461246659"/>
       </p:ext>
     </p:extLst>
   </p:cSld>
@@ -8922,20 +10177,36 @@
         </p:nvSpPr>
         <p:spPr>
           <a:xfrm>
-            <a:off x="205038" y="1351118"/>
-            <a:ext cx="3207227" cy="1568251"/>
-          </a:xfrm>
-        </p:spPr>
-        <p:txBody>
-          <a:bodyPr>
-            <a:normAutofit/>
-          </a:bodyPr>
+            <a:off x="1232205" y="955415"/>
+            <a:ext cx="10853529" cy="1280890"/>
+          </a:xfrm>
+        </p:spPr>
+        <p:txBody>
+          <a:bodyPr/>
           <a:lstStyle/>
           <a:p>
-            <a:r>
-              <a:rPr lang="en-US" dirty="0"/>
-              <a:t>Dashboard - Employee</a:t>
-            </a:r>
+            <a:pPr algn="r"/>
+            <a:r>
+              <a:rPr lang="en-CA" dirty="0"/>
+              <a:t>Price based on quantity of items-</a:t>
+            </a:r>
+            <a:r>
+              <a:rPr lang="en-CA" dirty="0">
+                <a:solidFill>
+                  <a:srgbClr val="0070C0"/>
+                </a:solidFill>
+              </a:rPr>
+              <a:t> </a:t>
+            </a:r>
+            <a:r>
+              <a:rPr lang="en-CA" sz="2700" dirty="0">
+                <a:solidFill>
+                  <a:srgbClr val="0070C0"/>
+                </a:solidFill>
+              </a:rPr>
+              <a:t>Calculated column </a:t>
+            </a:r>
+            <a:endParaRPr lang="en-CA" sz="2700" dirty="0"/>
           </a:p>
         </p:txBody>
       </p:sp>
@@ -8957,21 +10228,28 @@
         </p:blipFill>
         <p:spPr>
           <a:xfrm>
-            <a:off x="3806890" y="41897"/>
-            <a:ext cx="6830350" cy="6786678"/>
+            <a:off x="2051868" y="2442335"/>
+            <a:ext cx="9214205" cy="1789165"/>
           </a:xfrm>
         </p:spPr>
       </p:pic>
     </p:spTree>
     <p:extLst>
       <p:ext uri="{BB962C8B-B14F-4D97-AF65-F5344CB8AC3E}">
-        <p14:creationId xmlns:p14="http://schemas.microsoft.com/office/powerpoint/2010/main" val="1808809744"/>
+        <p14:creationId xmlns:p14="http://schemas.microsoft.com/office/powerpoint/2010/main" val="794939313"/>
       </p:ext>
     </p:extLst>
   </p:cSld>
   <p:clrMapOvr>
     <a:masterClrMapping/>
   </p:clrMapOvr>
+  <p:timing>
+    <p:tnLst>
+      <p:par>
+        <p:cTn id="1" dur="indefinite" restart="never" nodeType="tmRoot"/>
+      </p:par>
+    </p:tnLst>
+  </p:timing>
 </p:sld>
 </file>
 
@@ -9004,26 +10282,38 @@
         </p:nvSpPr>
         <p:spPr>
           <a:xfrm>
-            <a:off x="3669435" y="211671"/>
-            <a:ext cx="6549832" cy="953003"/>
+            <a:off x="2014332" y="584353"/>
+            <a:ext cx="10298664" cy="767368"/>
           </a:xfrm>
         </p:spPr>
         <p:txBody>
           <a:bodyPr>
-            <a:normAutofit/>
+            <a:normAutofit fontScale="90000"/>
           </a:bodyPr>
           <a:lstStyle/>
           <a:p>
             <a:r>
-              <a:rPr lang="en-US" dirty="0"/>
-              <a:t>Dashboard - Report</a:t>
-            </a:r>
+              <a:rPr lang="en-CA" dirty="0"/>
+              <a:t>Transfer data between </a:t>
+            </a:r>
+            <a:r>
+              <a:rPr lang="en-CA" dirty="0" err="1"/>
+              <a:t>datagrids</a:t>
+            </a:r>
+            <a:r>
+              <a:rPr lang="en-CA" dirty="0"/>
+              <a:t/>
+            </a:r>
+            <a:br>
+              <a:rPr lang="en-CA" dirty="0"/>
+            </a:br>
+            <a:endParaRPr lang="en-CA" dirty="0"/>
           </a:p>
         </p:txBody>
       </p:sp>
       <p:pic>
         <p:nvPicPr>
-          <p:cNvPr id="4" name="Content Placeholder 3"/>
+          <p:cNvPr id="6" name="Content Placeholder 3"/>
           <p:cNvPicPr>
             <a:picLocks noGrp="1" noChangeAspect="1"/>
           </p:cNvPicPr>
@@ -9039,21 +10329,328 @@
         </p:blipFill>
         <p:spPr>
           <a:xfrm>
-            <a:off x="2307164" y="1349633"/>
-            <a:ext cx="9848222" cy="4929870"/>
+            <a:off x="901109" y="1351721"/>
+            <a:ext cx="10543869" cy="2449756"/>
           </a:xfrm>
         </p:spPr>
       </p:pic>
+      <p:sp>
+        <p:nvSpPr>
+          <p:cNvPr id="8" name="Content Placeholder 2"/>
+          <p:cNvSpPr txBox="1">
+            <a:spLocks/>
+          </p:cNvSpPr>
+          <p:nvPr/>
+        </p:nvSpPr>
+        <p:spPr>
+          <a:xfrm>
+            <a:off x="819163" y="4084232"/>
+            <a:ext cx="10919791" cy="2329819"/>
+          </a:xfrm>
+          <a:prstGeom prst="rect">
+            <a:avLst/>
+          </a:prstGeom>
+        </p:spPr>
+        <p:txBody>
+          <a:bodyPr vert="horz" lIns="91440" tIns="45720" rIns="91440" bIns="45720" rtlCol="0">
+            <a:normAutofit/>
+          </a:bodyPr>
+          <a:lstStyle>
+            <a:lvl1pPr marL="342900" indent="-342900" algn="l" defTabSz="457200" rtl="0" eaLnBrk="1" latinLnBrk="0" hangingPunct="1">
+              <a:spcBef>
+                <a:spcPts val="1000"/>
+              </a:spcBef>
+              <a:spcAft>
+                <a:spcPts val="0"/>
+              </a:spcAft>
+              <a:buClr>
+                <a:schemeClr val="accent1"/>
+              </a:buClr>
+              <a:buFont typeface="Wingdings 3" charset="2"/>
+              <a:buChar char=""/>
+              <a:defRPr sz="1800" kern="1200">
+                <a:solidFill>
+                  <a:schemeClr val="tx1">
+                    <a:lumMod val="75000"/>
+                    <a:lumOff val="25000"/>
+                  </a:schemeClr>
+                </a:solidFill>
+                <a:latin typeface="+mn-lt"/>
+                <a:ea typeface="+mn-ea"/>
+                <a:cs typeface="+mn-cs"/>
+              </a:defRPr>
+            </a:lvl1pPr>
+            <a:lvl2pPr marL="742950" indent="-285750" algn="l" defTabSz="457200" rtl="0" eaLnBrk="1" latinLnBrk="0" hangingPunct="1">
+              <a:spcBef>
+                <a:spcPts val="1000"/>
+              </a:spcBef>
+              <a:spcAft>
+                <a:spcPts val="0"/>
+              </a:spcAft>
+              <a:buClr>
+                <a:schemeClr val="accent1"/>
+              </a:buClr>
+              <a:buFont typeface="Wingdings 3" charset="2"/>
+              <a:buChar char=""/>
+              <a:defRPr sz="1600" kern="1200">
+                <a:solidFill>
+                  <a:schemeClr val="tx1">
+                    <a:lumMod val="75000"/>
+                    <a:lumOff val="25000"/>
+                  </a:schemeClr>
+                </a:solidFill>
+                <a:latin typeface="+mn-lt"/>
+                <a:ea typeface="+mn-ea"/>
+                <a:cs typeface="+mn-cs"/>
+              </a:defRPr>
+            </a:lvl2pPr>
+            <a:lvl3pPr marL="1143000" indent="-228600" algn="l" defTabSz="457200" rtl="0" eaLnBrk="1" latinLnBrk="0" hangingPunct="1">
+              <a:spcBef>
+                <a:spcPts val="1000"/>
+              </a:spcBef>
+              <a:spcAft>
+                <a:spcPts val="0"/>
+              </a:spcAft>
+              <a:buClr>
+                <a:schemeClr val="accent1"/>
+              </a:buClr>
+              <a:buFont typeface="Wingdings 3" charset="2"/>
+              <a:buChar char=""/>
+              <a:defRPr sz="1400" kern="1200">
+                <a:solidFill>
+                  <a:schemeClr val="tx1">
+                    <a:lumMod val="75000"/>
+                    <a:lumOff val="25000"/>
+                  </a:schemeClr>
+                </a:solidFill>
+                <a:latin typeface="+mn-lt"/>
+                <a:ea typeface="+mn-ea"/>
+                <a:cs typeface="+mn-cs"/>
+              </a:defRPr>
+            </a:lvl3pPr>
+            <a:lvl4pPr marL="1600200" indent="-228600" algn="l" defTabSz="457200" rtl="0" eaLnBrk="1" latinLnBrk="0" hangingPunct="1">
+              <a:spcBef>
+                <a:spcPts val="1000"/>
+              </a:spcBef>
+              <a:spcAft>
+                <a:spcPts val="0"/>
+              </a:spcAft>
+              <a:buClr>
+                <a:schemeClr val="accent1"/>
+              </a:buClr>
+              <a:buFont typeface="Wingdings 3" charset="2"/>
+              <a:buChar char=""/>
+              <a:defRPr sz="1200" kern="1200">
+                <a:solidFill>
+                  <a:schemeClr val="tx1">
+                    <a:lumMod val="75000"/>
+                    <a:lumOff val="25000"/>
+                  </a:schemeClr>
+                </a:solidFill>
+                <a:latin typeface="+mn-lt"/>
+                <a:ea typeface="+mn-ea"/>
+                <a:cs typeface="+mn-cs"/>
+              </a:defRPr>
+            </a:lvl4pPr>
+            <a:lvl5pPr marL="2057400" indent="-228600" algn="l" defTabSz="457200" rtl="0" eaLnBrk="1" latinLnBrk="0" hangingPunct="1">
+              <a:spcBef>
+                <a:spcPts val="1000"/>
+              </a:spcBef>
+              <a:spcAft>
+                <a:spcPts val="0"/>
+              </a:spcAft>
+              <a:buClr>
+                <a:schemeClr val="accent1"/>
+              </a:buClr>
+              <a:buFont typeface="Wingdings 3" charset="2"/>
+              <a:buChar char=""/>
+              <a:defRPr sz="1200" kern="1200">
+                <a:solidFill>
+                  <a:schemeClr val="tx1">
+                    <a:lumMod val="75000"/>
+                    <a:lumOff val="25000"/>
+                  </a:schemeClr>
+                </a:solidFill>
+                <a:latin typeface="+mn-lt"/>
+                <a:ea typeface="+mn-ea"/>
+                <a:cs typeface="+mn-cs"/>
+              </a:defRPr>
+            </a:lvl5pPr>
+            <a:lvl6pPr marL="2514600" indent="-228600" algn="l" defTabSz="457200" rtl="0" eaLnBrk="1" latinLnBrk="0" hangingPunct="1">
+              <a:spcBef>
+                <a:spcPts val="1000"/>
+              </a:spcBef>
+              <a:spcAft>
+                <a:spcPts val="0"/>
+              </a:spcAft>
+              <a:buClr>
+                <a:schemeClr val="accent1"/>
+              </a:buClr>
+              <a:buFont typeface="Wingdings 3" charset="2"/>
+              <a:buChar char=""/>
+              <a:defRPr sz="1200" kern="1200">
+                <a:solidFill>
+                  <a:schemeClr val="tx1">
+                    <a:lumMod val="75000"/>
+                    <a:lumOff val="25000"/>
+                  </a:schemeClr>
+                </a:solidFill>
+                <a:latin typeface="+mn-lt"/>
+                <a:ea typeface="+mn-ea"/>
+                <a:cs typeface="+mn-cs"/>
+              </a:defRPr>
+            </a:lvl6pPr>
+            <a:lvl7pPr marL="2971800" indent="-228600" algn="l" defTabSz="457200" rtl="0" eaLnBrk="1" latinLnBrk="0" hangingPunct="1">
+              <a:spcBef>
+                <a:spcPts val="1000"/>
+              </a:spcBef>
+              <a:spcAft>
+                <a:spcPts val="0"/>
+              </a:spcAft>
+              <a:buClr>
+                <a:schemeClr val="accent1"/>
+              </a:buClr>
+              <a:buFont typeface="Wingdings 3" charset="2"/>
+              <a:buChar char=""/>
+              <a:defRPr sz="1200" kern="1200">
+                <a:solidFill>
+                  <a:schemeClr val="tx1">
+                    <a:lumMod val="75000"/>
+                    <a:lumOff val="25000"/>
+                  </a:schemeClr>
+                </a:solidFill>
+                <a:latin typeface="+mn-lt"/>
+                <a:ea typeface="+mn-ea"/>
+                <a:cs typeface="+mn-cs"/>
+              </a:defRPr>
+            </a:lvl7pPr>
+            <a:lvl8pPr marL="3429000" indent="-228600" algn="l" defTabSz="457200" rtl="0" eaLnBrk="1" latinLnBrk="0" hangingPunct="1">
+              <a:spcBef>
+                <a:spcPts val="1000"/>
+              </a:spcBef>
+              <a:spcAft>
+                <a:spcPts val="0"/>
+              </a:spcAft>
+              <a:buClr>
+                <a:schemeClr val="accent1"/>
+              </a:buClr>
+              <a:buFont typeface="Wingdings 3" charset="2"/>
+              <a:buChar char=""/>
+              <a:defRPr sz="1200" kern="1200">
+                <a:solidFill>
+                  <a:schemeClr val="tx1">
+                    <a:lumMod val="75000"/>
+                    <a:lumOff val="25000"/>
+                  </a:schemeClr>
+                </a:solidFill>
+                <a:latin typeface="+mn-lt"/>
+                <a:ea typeface="+mn-ea"/>
+                <a:cs typeface="+mn-cs"/>
+              </a:defRPr>
+            </a:lvl8pPr>
+            <a:lvl9pPr marL="3886200" indent="-228600" algn="l" defTabSz="457200" rtl="0" eaLnBrk="1" latinLnBrk="0" hangingPunct="1">
+              <a:spcBef>
+                <a:spcPts val="1000"/>
+              </a:spcBef>
+              <a:spcAft>
+                <a:spcPts val="0"/>
+              </a:spcAft>
+              <a:buClr>
+                <a:schemeClr val="accent1"/>
+              </a:buClr>
+              <a:buFont typeface="Wingdings 3" charset="2"/>
+              <a:buChar char=""/>
+              <a:defRPr sz="1200" kern="1200">
+                <a:solidFill>
+                  <a:schemeClr val="tx1">
+                    <a:lumMod val="75000"/>
+                    <a:lumOff val="25000"/>
+                  </a:schemeClr>
+                </a:solidFill>
+                <a:latin typeface="+mn-lt"/>
+                <a:ea typeface="+mn-ea"/>
+                <a:cs typeface="+mn-cs"/>
+              </a:defRPr>
+            </a:lvl9pPr>
+          </a:lstStyle>
+          <a:p>
+            <a:r>
+              <a:rPr lang="en-CA" sz="2800" dirty="0">
+                <a:latin typeface="Calibri" panose="020F0502020204030204" pitchFamily="34" charset="0"/>
+              </a:rPr>
+              <a:t>Data just add/delete between  </a:t>
+            </a:r>
+            <a:r>
+              <a:rPr lang="en-CA" sz="2800" dirty="0" smtClean="0">
+                <a:latin typeface="Calibri" panose="020F0502020204030204" pitchFamily="34" charset="0"/>
+              </a:rPr>
+              <a:t>Order grid </a:t>
+            </a:r>
+            <a:r>
+              <a:rPr lang="en-CA" sz="2800" dirty="0">
+                <a:latin typeface="Calibri" panose="020F0502020204030204" pitchFamily="34" charset="0"/>
+              </a:rPr>
+              <a:t>and </a:t>
+            </a:r>
+            <a:r>
+              <a:rPr lang="en-CA" sz="2800" dirty="0" smtClean="0">
+                <a:solidFill>
+                  <a:schemeClr val="tx1"/>
+                </a:solidFill>
+                <a:latin typeface="Calibri" panose="020F0502020204030204" pitchFamily="34" charset="0"/>
+              </a:rPr>
+              <a:t>Product grid</a:t>
+            </a:r>
+            <a:r>
+              <a:rPr lang="en-CA" sz="2800" dirty="0" smtClean="0">
+                <a:solidFill>
+                  <a:srgbClr val="0070C0"/>
+                </a:solidFill>
+                <a:latin typeface="Calibri" panose="020F0502020204030204" pitchFamily="34" charset="0"/>
+              </a:rPr>
+              <a:t> </a:t>
+            </a:r>
+            <a:r>
+              <a:rPr lang="en-CA" sz="2800" dirty="0">
+                <a:solidFill>
+                  <a:srgbClr val="0070C0"/>
+                </a:solidFill>
+                <a:latin typeface="Calibri" panose="020F0502020204030204" pitchFamily="34" charset="0"/>
+              </a:rPr>
+              <a:t>(just in view</a:t>
+            </a:r>
+            <a:r>
+              <a:rPr lang="en-CA" sz="2800" dirty="0">
+                <a:latin typeface="Calibri" panose="020F0502020204030204" pitchFamily="34" charset="0"/>
+              </a:rPr>
+              <a:t>) but no change is not happened in tables for real data</a:t>
+            </a:r>
+          </a:p>
+          <a:p>
+            <a:r>
+              <a:rPr lang="en-CA" sz="2800" dirty="0"/>
+              <a:t>All verification about Qty of items in stack and Qty for order items Is considered </a:t>
+            </a:r>
+          </a:p>
+        </p:txBody>
+      </p:sp>
     </p:spTree>
     <p:extLst>
       <p:ext uri="{BB962C8B-B14F-4D97-AF65-F5344CB8AC3E}">
-        <p14:creationId xmlns:p14="http://schemas.microsoft.com/office/powerpoint/2010/main" val="156837060"/>
+        <p14:creationId xmlns:p14="http://schemas.microsoft.com/office/powerpoint/2010/main" val="2327838196"/>
       </p:ext>
     </p:extLst>
   </p:cSld>
   <p:clrMapOvr>
     <a:masterClrMapping/>
   </p:clrMapOvr>
+  <p:timing>
+    <p:tnLst>
+      <p:par>
+        <p:cTn id="1" dur="indefinite" restart="never" nodeType="tmRoot"/>
+      </p:par>
+    </p:tnLst>
+  </p:timing>
 </p:sld>
 </file>
 

</xml_diff>

<commit_message>
DBScripts and final Presentation
</commit_message>
<xml_diff>
--- a/Documents/Presentation.pptx
+++ b/Documents/Presentation.pptx
@@ -30,7 +30,8 @@
     <p:sldId id="271" r:id="rId24"/>
     <p:sldId id="267" r:id="rId25"/>
     <p:sldId id="268" r:id="rId26"/>
-    <p:sldId id="269" r:id="rId27"/>
+    <p:sldId id="284" r:id="rId27"/>
+    <p:sldId id="269" r:id="rId28"/>
   </p:sldIdLst>
   <p:sldSz cx="12192000" cy="6858000"/>
   <p:notesSz cx="6858000" cy="9144000"/>
@@ -9652,6 +9653,95 @@
             <p:ph type="title"/>
           </p:nvPr>
         </p:nvSpPr>
+        <p:spPr>
+          <a:xfrm>
+            <a:off x="3669435" y="211671"/>
+            <a:ext cx="6549832" cy="953003"/>
+          </a:xfrm>
+        </p:spPr>
+        <p:txBody>
+          <a:bodyPr>
+            <a:normAutofit/>
+          </a:bodyPr>
+          <a:lstStyle/>
+          <a:p>
+            <a:r>
+              <a:rPr lang="en-US" dirty="0" smtClean="0"/>
+              <a:t>Data Model</a:t>
+            </a:r>
+            <a:endParaRPr lang="en-US" dirty="0"/>
+          </a:p>
+        </p:txBody>
+      </p:sp>
+      <p:pic>
+        <p:nvPicPr>
+          <p:cNvPr id="4" name="Content Placeholder 3"/>
+          <p:cNvPicPr>
+            <a:picLocks noGrp="1" noChangeAspect="1"/>
+          </p:cNvPicPr>
+          <p:nvPr>
+            <p:ph idx="1"/>
+          </p:nvPr>
+        </p:nvPicPr>
+        <p:blipFill>
+          <a:blip r:embed="rId2">
+            <a:extLst>
+              <a:ext uri="{28A0092B-C50C-407E-A947-70E740481C1C}">
+                <a14:useLocalDpi xmlns:a14="http://schemas.microsoft.com/office/drawing/2010/main" val="0"/>
+              </a:ext>
+            </a:extLst>
+          </a:blip>
+          <a:stretch>
+            <a:fillRect/>
+          </a:stretch>
+        </p:blipFill>
+        <p:spPr>
+          <a:xfrm>
+            <a:off x="2477317" y="1029729"/>
+            <a:ext cx="9269838" cy="5672729"/>
+          </a:xfrm>
+        </p:spPr>
+      </p:pic>
+    </p:spTree>
+    <p:extLst>
+      <p:ext uri="{BB962C8B-B14F-4D97-AF65-F5344CB8AC3E}">
+        <p14:creationId xmlns:p14="http://schemas.microsoft.com/office/powerpoint/2010/main" val="3360739048"/>
+      </p:ext>
+    </p:extLst>
+  </p:cSld>
+  <p:clrMapOvr>
+    <a:masterClrMapping/>
+  </p:clrMapOvr>
+</p:sld>
+</file>
+
+<file path=ppt/slides/slide27.xml><?xml version="1.0" encoding="utf-8"?>
+<p:sld xmlns:a="http://schemas.openxmlformats.org/drawingml/2006/main" xmlns:r="http://schemas.openxmlformats.org/officeDocument/2006/relationships" xmlns:p="http://schemas.openxmlformats.org/presentationml/2006/main">
+  <p:cSld>
+    <p:spTree>
+      <p:nvGrpSpPr>
+        <p:cNvPr id="1" name=""/>
+        <p:cNvGrpSpPr/>
+        <p:nvPr/>
+      </p:nvGrpSpPr>
+      <p:grpSpPr>
+        <a:xfrm>
+          <a:off x="0" y="0"/>
+          <a:ext cx="0" cy="0"/>
+          <a:chOff x="0" y="0"/>
+          <a:chExt cx="0" cy="0"/>
+        </a:xfrm>
+      </p:grpSpPr>
+      <p:sp>
+        <p:nvSpPr>
+          <p:cNvPr id="2" name="Title 1"/>
+          <p:cNvSpPr>
+            <a:spLocks noGrp="1"/>
+          </p:cNvSpPr>
+          <p:nvPr>
+            <p:ph type="title"/>
+          </p:nvPr>
+        </p:nvSpPr>
         <p:spPr/>
         <p:txBody>
           <a:bodyPr/>

</xml_diff>